<commit_message>
new description for prefixmatch
</commit_message>
<xml_diff>
--- a/doc/cr/fig/rangeopts.pptx
+++ b/doc/cr/fig/rangeopts.pptx
@@ -193,7 +193,7 @@
           <a:p>
             <a:fld id="{A3BA0E75-03DD-AA41-809E-9EBE88800E47}" type="datetimeFigureOut">
               <a:rPr lang="en-US" smtClean="0"/>
-              <a:t>1/7/16</a:t>
+              <a:t>1/30/16</a:t>
             </a:fld>
             <a:endParaRPr lang="en-US"/>
           </a:p>
@@ -810,7 +810,7 @@
           <a:p>
             <a:fld id="{CD6DB08C-E64A-724A-8604-E954791B8CDC}" type="datetimeFigureOut">
               <a:rPr lang="en-US" smtClean="0"/>
-              <a:t>1/7/16</a:t>
+              <a:t>1/30/16</a:t>
             </a:fld>
             <a:endParaRPr lang="en-US"/>
           </a:p>
@@ -980,7 +980,7 @@
           <a:p>
             <a:fld id="{CD6DB08C-E64A-724A-8604-E954791B8CDC}" type="datetimeFigureOut">
               <a:rPr lang="en-US" smtClean="0"/>
-              <a:t>1/7/16</a:t>
+              <a:t>1/30/16</a:t>
             </a:fld>
             <a:endParaRPr lang="en-US"/>
           </a:p>
@@ -1160,7 +1160,7 @@
           <a:p>
             <a:fld id="{CD6DB08C-E64A-724A-8604-E954791B8CDC}" type="datetimeFigureOut">
               <a:rPr lang="en-US" smtClean="0"/>
-              <a:t>1/7/16</a:t>
+              <a:t>1/30/16</a:t>
             </a:fld>
             <a:endParaRPr lang="en-US"/>
           </a:p>
@@ -1330,7 +1330,7 @@
           <a:p>
             <a:fld id="{CD6DB08C-E64A-724A-8604-E954791B8CDC}" type="datetimeFigureOut">
               <a:rPr lang="en-US" smtClean="0"/>
-              <a:t>1/7/16</a:t>
+              <a:t>1/30/16</a:t>
             </a:fld>
             <a:endParaRPr lang="en-US"/>
           </a:p>
@@ -1576,7 +1576,7 @@
           <a:p>
             <a:fld id="{CD6DB08C-E64A-724A-8604-E954791B8CDC}" type="datetimeFigureOut">
               <a:rPr lang="en-US" smtClean="0"/>
-              <a:t>1/7/16</a:t>
+              <a:t>1/30/16</a:t>
             </a:fld>
             <a:endParaRPr lang="en-US"/>
           </a:p>
@@ -1864,7 +1864,7 @@
           <a:p>
             <a:fld id="{CD6DB08C-E64A-724A-8604-E954791B8CDC}" type="datetimeFigureOut">
               <a:rPr lang="en-US" smtClean="0"/>
-              <a:t>1/7/16</a:t>
+              <a:t>1/30/16</a:t>
             </a:fld>
             <a:endParaRPr lang="en-US"/>
           </a:p>
@@ -2286,7 +2286,7 @@
           <a:p>
             <a:fld id="{CD6DB08C-E64A-724A-8604-E954791B8CDC}" type="datetimeFigureOut">
               <a:rPr lang="en-US" smtClean="0"/>
-              <a:t>1/7/16</a:t>
+              <a:t>1/30/16</a:t>
             </a:fld>
             <a:endParaRPr lang="en-US"/>
           </a:p>
@@ -2404,7 +2404,7 @@
           <a:p>
             <a:fld id="{CD6DB08C-E64A-724A-8604-E954791B8CDC}" type="datetimeFigureOut">
               <a:rPr lang="en-US" smtClean="0"/>
-              <a:t>1/7/16</a:t>
+              <a:t>1/30/16</a:t>
             </a:fld>
             <a:endParaRPr lang="en-US"/>
           </a:p>
@@ -2499,7 +2499,7 @@
           <a:p>
             <a:fld id="{CD6DB08C-E64A-724A-8604-E954791B8CDC}" type="datetimeFigureOut">
               <a:rPr lang="en-US" smtClean="0"/>
-              <a:t>1/7/16</a:t>
+              <a:t>1/30/16</a:t>
             </a:fld>
             <a:endParaRPr lang="en-US"/>
           </a:p>
@@ -2776,7 +2776,7 @@
           <a:p>
             <a:fld id="{CD6DB08C-E64A-724A-8604-E954791B8CDC}" type="datetimeFigureOut">
               <a:rPr lang="en-US" smtClean="0"/>
-              <a:t>1/7/16</a:t>
+              <a:t>1/30/16</a:t>
             </a:fld>
             <a:endParaRPr lang="en-US"/>
           </a:p>
@@ -3029,7 +3029,7 @@
           <a:p>
             <a:fld id="{CD6DB08C-E64A-724A-8604-E954791B8CDC}" type="datetimeFigureOut">
               <a:rPr lang="en-US" smtClean="0"/>
-              <a:t>1/7/16</a:t>
+              <a:t>1/30/16</a:t>
             </a:fld>
             <a:endParaRPr lang="en-US"/>
           </a:p>
@@ -3242,7 +3242,7 @@
           <a:p>
             <a:fld id="{CD6DB08C-E64A-724A-8604-E954791B8CDC}" type="datetimeFigureOut">
               <a:rPr lang="en-US" smtClean="0"/>
-              <a:t>1/7/16</a:t>
+              <a:t>1/30/16</a:t>
             </a:fld>
             <a:endParaRPr lang="en-US"/>
           </a:p>
@@ -5556,280 +5556,6 @@
           <a:chExt cx="0" cy="0"/>
         </a:xfrm>
       </p:grpSpPr>
-      <p:sp>
-        <p:nvSpPr>
-          <p:cNvPr id="80" name="Rectangle 79"/>
-          <p:cNvSpPr/>
-          <p:nvPr/>
-        </p:nvSpPr>
-        <p:spPr>
-          <a:xfrm>
-            <a:off x="6260344" y="3806816"/>
-            <a:ext cx="1325873" cy="293459"/>
-          </a:xfrm>
-          <a:prstGeom prst="rect">
-            <a:avLst/>
-          </a:prstGeom>
-          <a:solidFill>
-            <a:schemeClr val="bg1">
-              <a:lumMod val="75000"/>
-            </a:schemeClr>
-          </a:solidFill>
-          <a:ln>
-            <a:solidFill>
-              <a:schemeClr val="bg1">
-                <a:lumMod val="75000"/>
-              </a:schemeClr>
-            </a:solidFill>
-          </a:ln>
-          <a:effectLst/>
-        </p:spPr>
-        <p:style>
-          <a:lnRef idx="1">
-            <a:schemeClr val="accent1"/>
-          </a:lnRef>
-          <a:fillRef idx="3">
-            <a:schemeClr val="accent1"/>
-          </a:fillRef>
-          <a:effectRef idx="2">
-            <a:schemeClr val="accent1"/>
-          </a:effectRef>
-          <a:fontRef idx="minor">
-            <a:schemeClr val="lt1"/>
-          </a:fontRef>
-        </p:style>
-        <p:txBody>
-          <a:bodyPr rtlCol="0" anchor="ctr"/>
-          <a:lstStyle/>
-          <a:p>
-            <a:pPr algn="ctr"/>
-            <a:endParaRPr lang="en-US">
-              <a:solidFill>
-                <a:schemeClr val="tx2">
-                  <a:lumMod val="40000"/>
-                  <a:lumOff val="60000"/>
-                </a:schemeClr>
-              </a:solidFill>
-            </a:endParaRPr>
-          </a:p>
-        </p:txBody>
-      </p:sp>
-      <p:sp>
-        <p:nvSpPr>
-          <p:cNvPr id="79" name="Rectangle 78"/>
-          <p:cNvSpPr/>
-          <p:nvPr/>
-        </p:nvSpPr>
-        <p:spPr>
-          <a:xfrm>
-            <a:off x="4560657" y="3011574"/>
-            <a:ext cx="1669923" cy="293459"/>
-          </a:xfrm>
-          <a:prstGeom prst="rect">
-            <a:avLst/>
-          </a:prstGeom>
-          <a:solidFill>
-            <a:srgbClr val="FFFF00"/>
-          </a:solidFill>
-          <a:ln>
-            <a:noFill/>
-          </a:ln>
-          <a:effectLst/>
-        </p:spPr>
-        <p:style>
-          <a:lnRef idx="1">
-            <a:schemeClr val="accent1"/>
-          </a:lnRef>
-          <a:fillRef idx="3">
-            <a:schemeClr val="accent1"/>
-          </a:fillRef>
-          <a:effectRef idx="2">
-            <a:schemeClr val="accent1"/>
-          </a:effectRef>
-          <a:fontRef idx="minor">
-            <a:schemeClr val="lt1"/>
-          </a:fontRef>
-        </p:style>
-        <p:txBody>
-          <a:bodyPr rtlCol="0" anchor="ctr"/>
-          <a:lstStyle/>
-          <a:p>
-            <a:pPr algn="ctr"/>
-            <a:endParaRPr lang="en-US"/>
-          </a:p>
-        </p:txBody>
-      </p:sp>
-      <p:sp>
-        <p:nvSpPr>
-          <p:cNvPr id="78" name="Rectangle 77"/>
-          <p:cNvSpPr/>
-          <p:nvPr/>
-        </p:nvSpPr>
-        <p:spPr>
-          <a:xfrm>
-            <a:off x="3114696" y="3801058"/>
-            <a:ext cx="1456719" cy="293459"/>
-          </a:xfrm>
-          <a:prstGeom prst="rect">
-            <a:avLst/>
-          </a:prstGeom>
-          <a:solidFill>
-            <a:schemeClr val="tx2">
-              <a:lumMod val="60000"/>
-              <a:lumOff val="40000"/>
-            </a:schemeClr>
-          </a:solidFill>
-          <a:ln>
-            <a:noFill/>
-          </a:ln>
-          <a:effectLst/>
-        </p:spPr>
-        <p:style>
-          <a:lnRef idx="1">
-            <a:schemeClr val="accent1"/>
-          </a:lnRef>
-          <a:fillRef idx="3">
-            <a:schemeClr val="accent1"/>
-          </a:fillRef>
-          <a:effectRef idx="2">
-            <a:schemeClr val="accent1"/>
-          </a:effectRef>
-          <a:fontRef idx="minor">
-            <a:schemeClr val="lt1"/>
-          </a:fontRef>
-        </p:style>
-        <p:txBody>
-          <a:bodyPr rtlCol="0" anchor="ctr"/>
-          <a:lstStyle/>
-          <a:p>
-            <a:pPr algn="ctr"/>
-            <a:endParaRPr lang="en-US">
-              <a:solidFill>
-                <a:schemeClr val="tx2">
-                  <a:lumMod val="40000"/>
-                  <a:lumOff val="60000"/>
-                </a:schemeClr>
-              </a:solidFill>
-            </a:endParaRPr>
-          </a:p>
-        </p:txBody>
-      </p:sp>
-      <p:sp>
-        <p:nvSpPr>
-          <p:cNvPr id="77" name="Rectangle 76"/>
-          <p:cNvSpPr/>
-          <p:nvPr/>
-        </p:nvSpPr>
-        <p:spPr>
-          <a:xfrm>
-            <a:off x="833332" y="3801146"/>
-            <a:ext cx="2276384" cy="293459"/>
-          </a:xfrm>
-          <a:prstGeom prst="rect">
-            <a:avLst/>
-          </a:prstGeom>
-          <a:solidFill>
-            <a:schemeClr val="bg1">
-              <a:lumMod val="75000"/>
-            </a:schemeClr>
-          </a:solidFill>
-          <a:ln>
-            <a:solidFill>
-              <a:schemeClr val="bg1">
-                <a:lumMod val="75000"/>
-              </a:schemeClr>
-            </a:solidFill>
-          </a:ln>
-          <a:effectLst/>
-        </p:spPr>
-        <p:style>
-          <a:lnRef idx="1">
-            <a:schemeClr val="accent1"/>
-          </a:lnRef>
-          <a:fillRef idx="3">
-            <a:schemeClr val="accent1"/>
-          </a:fillRef>
-          <a:effectRef idx="2">
-            <a:schemeClr val="accent1"/>
-          </a:effectRef>
-          <a:fontRef idx="minor">
-            <a:schemeClr val="lt1"/>
-          </a:fontRef>
-        </p:style>
-        <p:txBody>
-          <a:bodyPr rtlCol="0" anchor="ctr"/>
-          <a:lstStyle/>
-          <a:p>
-            <a:pPr algn="ctr"/>
-            <a:endParaRPr lang="en-US">
-              <a:solidFill>
-                <a:schemeClr val="tx2">
-                  <a:lumMod val="40000"/>
-                  <a:lumOff val="60000"/>
-                </a:schemeClr>
-              </a:solidFill>
-            </a:endParaRPr>
-          </a:p>
-        </p:txBody>
-      </p:sp>
-      <p:sp>
-        <p:nvSpPr>
-          <p:cNvPr id="64" name="Rectangle 63"/>
-          <p:cNvSpPr/>
-          <p:nvPr/>
-        </p:nvSpPr>
-        <p:spPr>
-          <a:xfrm>
-            <a:off x="837759" y="1559281"/>
-            <a:ext cx="6748458" cy="293459"/>
-          </a:xfrm>
-          <a:prstGeom prst="rect">
-            <a:avLst/>
-          </a:prstGeom>
-          <a:solidFill>
-            <a:schemeClr val="bg1">
-              <a:lumMod val="75000"/>
-            </a:schemeClr>
-          </a:solidFill>
-          <a:ln>
-            <a:solidFill>
-              <a:schemeClr val="bg1">
-                <a:lumMod val="75000"/>
-              </a:schemeClr>
-            </a:solidFill>
-          </a:ln>
-          <a:effectLst/>
-        </p:spPr>
-        <p:style>
-          <a:lnRef idx="1">
-            <a:schemeClr val="accent1"/>
-          </a:lnRef>
-          <a:fillRef idx="3">
-            <a:schemeClr val="accent1"/>
-          </a:fillRef>
-          <a:effectRef idx="2">
-            <a:schemeClr val="accent1"/>
-          </a:effectRef>
-          <a:fontRef idx="minor">
-            <a:schemeClr val="lt1"/>
-          </a:fontRef>
-        </p:style>
-        <p:txBody>
-          <a:bodyPr rtlCol="0" anchor="ctr"/>
-          <a:lstStyle/>
-          <a:p>
-            <a:pPr algn="ctr"/>
-            <a:endParaRPr lang="en-US">
-              <a:solidFill>
-                <a:schemeClr val="tx2">
-                  <a:lumMod val="40000"/>
-                  <a:lumOff val="60000"/>
-                </a:schemeClr>
-              </a:solidFill>
-            </a:endParaRPr>
-          </a:p>
-        </p:txBody>
-      </p:sp>
       <p:cxnSp>
         <p:nvCxnSpPr>
           <p:cNvPr id="5" name="Straight Connector 4"/>
@@ -5838,7 +5564,7 @@
         </p:nvCxnSpPr>
         <p:spPr>
           <a:xfrm>
-            <a:off x="839133" y="1701033"/>
+            <a:off x="1076195" y="2622036"/>
             <a:ext cx="6747084" cy="0"/>
           </a:xfrm>
           <a:prstGeom prst="line">
@@ -5869,7 +5595,7 @@
         </p:nvCxnSpPr>
         <p:spPr>
           <a:xfrm>
-            <a:off x="7591197" y="1553611"/>
+            <a:off x="7828259" y="2474614"/>
             <a:ext cx="0" cy="293459"/>
           </a:xfrm>
           <a:prstGeom prst="line">
@@ -5900,7 +5626,7 @@
         </p:nvCxnSpPr>
         <p:spPr>
           <a:xfrm>
-            <a:off x="837758" y="1559281"/>
+            <a:off x="1074820" y="2480284"/>
             <a:ext cx="0" cy="293459"/>
           </a:xfrm>
           <a:prstGeom prst="line">
@@ -5931,7 +5657,7 @@
         </p:nvSpPr>
         <p:spPr>
           <a:xfrm>
-            <a:off x="398825" y="1184279"/>
+            <a:off x="635887" y="2773743"/>
             <a:ext cx="890576" cy="369332"/>
           </a:xfrm>
           <a:prstGeom prst="rect">
@@ -5967,7 +5693,7 @@
         </p:nvSpPr>
         <p:spPr>
           <a:xfrm>
-            <a:off x="7145909" y="1189949"/>
+            <a:off x="7249613" y="2754188"/>
             <a:ext cx="1147332" cy="369332"/>
           </a:xfrm>
           <a:prstGeom prst="rect">
@@ -6003,8 +5729,8 @@
         </p:nvCxnSpPr>
         <p:spPr>
           <a:xfrm>
-            <a:off x="834473" y="1881744"/>
-            <a:ext cx="0" cy="1908731"/>
+            <a:off x="1071535" y="1102826"/>
+            <a:ext cx="9640" cy="1377458"/>
           </a:xfrm>
           <a:prstGeom prst="line">
             <a:avLst/>
@@ -6029,72 +5755,15 @@
           </a:fontRef>
         </p:style>
       </p:cxnSp>
-      <p:sp>
-        <p:nvSpPr>
-          <p:cNvPr id="28" name="Rectangle 27"/>
-          <p:cNvSpPr/>
-          <p:nvPr/>
-        </p:nvSpPr>
-        <p:spPr>
-          <a:xfrm>
-            <a:off x="3109716" y="2237433"/>
-            <a:ext cx="2120096" cy="293459"/>
-          </a:xfrm>
-          <a:prstGeom prst="rect">
-            <a:avLst/>
-          </a:prstGeom>
-          <a:solidFill>
-            <a:schemeClr val="tx2">
-              <a:lumMod val="60000"/>
-              <a:lumOff val="40000"/>
-            </a:schemeClr>
-          </a:solidFill>
-          <a:ln>
-            <a:noFill/>
-          </a:ln>
-          <a:effectLst/>
-        </p:spPr>
-        <p:style>
-          <a:lnRef idx="1">
-            <a:schemeClr val="accent1"/>
-          </a:lnRef>
-          <a:fillRef idx="3">
-            <a:schemeClr val="accent1"/>
-          </a:fillRef>
-          <a:effectRef idx="2">
-            <a:schemeClr val="accent1"/>
-          </a:effectRef>
-          <a:fontRef idx="minor">
-            <a:schemeClr val="lt1"/>
-          </a:fontRef>
-        </p:style>
-        <p:txBody>
-          <a:bodyPr rtlCol="0" anchor="ctr"/>
-          <a:lstStyle/>
-          <a:p>
-            <a:pPr algn="ctr"/>
-            <a:endParaRPr lang="en-US">
-              <a:solidFill>
-                <a:schemeClr val="tx2">
-                  <a:lumMod val="40000"/>
-                  <a:lumOff val="60000"/>
-                </a:schemeClr>
-              </a:solidFill>
-            </a:endParaRPr>
-          </a:p>
-        </p:txBody>
-      </p:sp>
       <p:cxnSp>
         <p:nvCxnSpPr>
           <p:cNvPr id="29" name="Straight Connector 28"/>
-          <p:cNvCxnSpPr>
-            <a:endCxn id="28" idx="3"/>
-          </p:cNvCxnSpPr>
+          <p:cNvCxnSpPr/>
           <p:nvPr/>
         </p:nvCxnSpPr>
         <p:spPr>
           <a:xfrm>
-            <a:off x="3109716" y="2379185"/>
+            <a:off x="3346778" y="1959685"/>
             <a:ext cx="2120096" cy="4978"/>
           </a:xfrm>
           <a:prstGeom prst="line">
@@ -6125,7 +5794,7 @@
         </p:nvCxnSpPr>
         <p:spPr>
           <a:xfrm>
-            <a:off x="3109716" y="2231763"/>
+            <a:off x="3346778" y="1812263"/>
             <a:ext cx="0" cy="293459"/>
           </a:xfrm>
           <a:prstGeom prst="line">
@@ -6156,7 +5825,7 @@
         </p:nvCxnSpPr>
         <p:spPr>
           <a:xfrm>
-            <a:off x="5234792" y="2237433"/>
+            <a:off x="5471854" y="1817933"/>
             <a:ext cx="0" cy="293459"/>
           </a:xfrm>
           <a:prstGeom prst="line">
@@ -6187,8 +5856,8 @@
         </p:nvSpPr>
         <p:spPr>
           <a:xfrm>
-            <a:off x="2745862" y="1860486"/>
-            <a:ext cx="727708" cy="369332"/>
+            <a:off x="2982924" y="1992861"/>
+            <a:ext cx="459907" cy="369332"/>
           </a:xfrm>
           <a:prstGeom prst="rect">
             <a:avLst/>
@@ -6206,14 +5875,14 @@
                 <a:latin typeface="Helvetica"/>
                 <a:cs typeface="Helvetica"/>
               </a:rPr>
-              <a:t>R1</a:t>
+              <a:t>s</a:t>
             </a:r>
             <a:r>
               <a:rPr lang="en-US" baseline="-25000" dirty="0" smtClean="0">
                 <a:latin typeface="Helvetica"/>
                 <a:cs typeface="Helvetica"/>
               </a:rPr>
-              <a:t>min</a:t>
+              <a:t>11</a:t>
             </a:r>
             <a:endParaRPr lang="en-US" baseline="-25000" dirty="0">
               <a:latin typeface="Helvetica"/>
@@ -6230,8 +5899,8 @@
         </p:nvSpPr>
         <p:spPr>
           <a:xfrm>
-            <a:off x="4841890" y="1874741"/>
-            <a:ext cx="774571" cy="369332"/>
+            <a:off x="5229746" y="1992861"/>
+            <a:ext cx="484215" cy="369332"/>
           </a:xfrm>
           <a:prstGeom prst="rect">
             <a:avLst/>
@@ -6249,14 +5918,14 @@
                 <a:latin typeface="Helvetica"/>
                 <a:cs typeface="Helvetica"/>
               </a:rPr>
-              <a:t>R1</a:t>
+              <a:t>e</a:t>
             </a:r>
             <a:r>
               <a:rPr lang="en-US" baseline="-25000" dirty="0" smtClean="0">
                 <a:latin typeface="Helvetica"/>
                 <a:cs typeface="Helvetica"/>
               </a:rPr>
-              <a:t>max</a:t>
+              <a:t>01</a:t>
             </a:r>
             <a:endParaRPr lang="en-US" baseline="-25000" dirty="0">
               <a:latin typeface="Helvetica"/>
@@ -6265,51 +5934,6 @@
           </a:p>
         </p:txBody>
       </p:sp>
-      <p:sp>
-        <p:nvSpPr>
-          <p:cNvPr id="45" name="Rectangle 44"/>
-          <p:cNvSpPr/>
-          <p:nvPr/>
-        </p:nvSpPr>
-        <p:spPr>
-          <a:xfrm>
-            <a:off x="4560657" y="3801058"/>
-            <a:ext cx="1669923" cy="293459"/>
-          </a:xfrm>
-          <a:prstGeom prst="rect">
-            <a:avLst/>
-          </a:prstGeom>
-          <a:solidFill>
-            <a:srgbClr val="FFFF00"/>
-          </a:solidFill>
-          <a:ln>
-            <a:noFill/>
-          </a:ln>
-          <a:effectLst/>
-        </p:spPr>
-        <p:style>
-          <a:lnRef idx="1">
-            <a:schemeClr val="accent1"/>
-          </a:lnRef>
-          <a:fillRef idx="3">
-            <a:schemeClr val="accent1"/>
-          </a:fillRef>
-          <a:effectRef idx="2">
-            <a:schemeClr val="accent1"/>
-          </a:effectRef>
-          <a:fontRef idx="minor">
-            <a:schemeClr val="lt1"/>
-          </a:fontRef>
-        </p:style>
-        <p:txBody>
-          <a:bodyPr rtlCol="0" anchor="ctr"/>
-          <a:lstStyle/>
-          <a:p>
-            <a:pPr algn="ctr"/>
-            <a:endParaRPr lang="en-US"/>
-          </a:p>
-        </p:txBody>
-      </p:sp>
       <p:cxnSp>
         <p:nvCxnSpPr>
           <p:cNvPr id="46" name="Straight Connector 45"/>
@@ -6318,7 +5942,7 @@
         </p:nvCxnSpPr>
         <p:spPr>
           <a:xfrm>
-            <a:off x="4571415" y="3158304"/>
+            <a:off x="4808477" y="1443793"/>
             <a:ext cx="1680331" cy="4978"/>
           </a:xfrm>
           <a:prstGeom prst="line">
@@ -6349,7 +5973,7 @@
         </p:nvCxnSpPr>
         <p:spPr>
           <a:xfrm>
-            <a:off x="4580012" y="3011574"/>
+            <a:off x="4817074" y="1328767"/>
             <a:ext cx="0" cy="293459"/>
           </a:xfrm>
           <a:prstGeom prst="line">
@@ -6380,7 +6004,7 @@
         </p:nvCxnSpPr>
         <p:spPr>
           <a:xfrm>
-            <a:off x="6260344" y="3011574"/>
+            <a:off x="6497406" y="1311834"/>
             <a:ext cx="0" cy="293459"/>
           </a:xfrm>
           <a:prstGeom prst="line">
@@ -6411,8 +6035,8 @@
         </p:nvSpPr>
         <p:spPr>
           <a:xfrm>
-            <a:off x="4207561" y="2578959"/>
-            <a:ext cx="727708" cy="369332"/>
+            <a:off x="4566075" y="1499403"/>
+            <a:ext cx="471253" cy="369332"/>
           </a:xfrm>
           <a:prstGeom prst="rect">
             <a:avLst/>
@@ -6430,14 +6054,14 @@
                 <a:latin typeface="Helvetica"/>
                 <a:cs typeface="Helvetica"/>
               </a:rPr>
-              <a:t>R2</a:t>
+              <a:t>s</a:t>
             </a:r>
             <a:r>
               <a:rPr lang="en-US" baseline="-25000" dirty="0" smtClean="0">
                 <a:latin typeface="Helvetica"/>
                 <a:cs typeface="Helvetica"/>
               </a:rPr>
-              <a:t>min</a:t>
+              <a:t>21</a:t>
             </a:r>
             <a:endParaRPr lang="en-US" baseline="-25000" dirty="0">
               <a:latin typeface="Helvetica"/>
@@ -6454,8 +6078,8 @@
         </p:nvSpPr>
         <p:spPr>
           <a:xfrm>
-            <a:off x="5896490" y="2578959"/>
-            <a:ext cx="774571" cy="369332"/>
+            <a:off x="6312001" y="1516336"/>
+            <a:ext cx="484215" cy="369332"/>
           </a:xfrm>
           <a:prstGeom prst="rect">
             <a:avLst/>
@@ -6469,18 +6093,18 @@
           <a:lstStyle/>
           <a:p>
             <a:r>
-              <a:rPr lang="en-US" dirty="0" smtClean="0">
-                <a:latin typeface="Helvetica"/>
-                <a:cs typeface="Helvetica"/>
-              </a:rPr>
-              <a:t>R2</a:t>
+              <a:rPr lang="en-US" dirty="0">
+                <a:latin typeface="Helvetica"/>
+                <a:cs typeface="Helvetica"/>
+              </a:rPr>
+              <a:t>e</a:t>
             </a:r>
             <a:r>
               <a:rPr lang="en-US" baseline="-25000" dirty="0" smtClean="0">
                 <a:latin typeface="Helvetica"/>
                 <a:cs typeface="Helvetica"/>
               </a:rPr>
-              <a:t>max</a:t>
+              <a:t>21</a:t>
             </a:r>
             <a:endParaRPr lang="en-US" baseline="-25000" dirty="0">
               <a:latin typeface="Helvetica"/>
@@ -6497,7 +6121,7 @@
         </p:nvCxnSpPr>
         <p:spPr>
           <a:xfrm>
-            <a:off x="844113" y="3942206"/>
+            <a:off x="1081175" y="900368"/>
             <a:ext cx="6747084" cy="0"/>
           </a:xfrm>
           <a:prstGeom prst="line">
@@ -6528,7 +6152,7 @@
         </p:nvCxnSpPr>
         <p:spPr>
           <a:xfrm>
-            <a:off x="833530" y="3795476"/>
+            <a:off x="1070592" y="753638"/>
             <a:ext cx="0" cy="293459"/>
           </a:xfrm>
           <a:prstGeom prst="line">
@@ -6559,8 +6183,8 @@
         </p:nvCxnSpPr>
         <p:spPr>
           <a:xfrm>
-            <a:off x="3109716" y="2379185"/>
-            <a:ext cx="0" cy="1411290"/>
+            <a:off x="3351758" y="1058437"/>
+            <a:ext cx="0" cy="738410"/>
           </a:xfrm>
           <a:prstGeom prst="line">
             <a:avLst/>
@@ -6593,7 +6217,7 @@
         </p:nvCxnSpPr>
         <p:spPr>
           <a:xfrm>
-            <a:off x="4581998" y="3305033"/>
+            <a:off x="4819060" y="1042096"/>
             <a:ext cx="0" cy="496025"/>
           </a:xfrm>
           <a:prstGeom prst="line">
@@ -6627,8 +6251,8 @@
         </p:nvCxnSpPr>
         <p:spPr>
           <a:xfrm>
-            <a:off x="6260344" y="3305033"/>
-            <a:ext cx="0" cy="496025"/>
+            <a:off x="6497406" y="1047097"/>
+            <a:ext cx="0" cy="396696"/>
           </a:xfrm>
           <a:prstGeom prst="line">
             <a:avLst/>
@@ -6661,8 +6285,8 @@
         </p:nvCxnSpPr>
         <p:spPr>
           <a:xfrm>
-            <a:off x="7591197" y="1847070"/>
-            <a:ext cx="0" cy="1953988"/>
+            <a:off x="7828259" y="1068152"/>
+            <a:ext cx="0" cy="1406462"/>
           </a:xfrm>
           <a:prstGeom prst="line">
             <a:avLst/>
@@ -6695,7 +6319,7 @@
         </p:nvCxnSpPr>
         <p:spPr>
           <a:xfrm>
-            <a:off x="3109716" y="3801146"/>
+            <a:off x="3346778" y="759308"/>
             <a:ext cx="0" cy="293459"/>
           </a:xfrm>
           <a:prstGeom prst="line">
@@ -6726,7 +6350,7 @@
         </p:nvCxnSpPr>
         <p:spPr>
           <a:xfrm>
-            <a:off x="4581998" y="3790475"/>
+            <a:off x="4819060" y="748637"/>
             <a:ext cx="0" cy="293459"/>
           </a:xfrm>
           <a:prstGeom prst="line">
@@ -6757,7 +6381,7 @@
         </p:nvCxnSpPr>
         <p:spPr>
           <a:xfrm>
-            <a:off x="6260344" y="3790475"/>
+            <a:off x="6497406" y="748637"/>
             <a:ext cx="0" cy="293459"/>
           </a:xfrm>
           <a:prstGeom prst="line">
@@ -6788,7 +6412,7 @@
         </p:nvCxnSpPr>
         <p:spPr>
           <a:xfrm>
-            <a:off x="7586217" y="3801146"/>
+            <a:off x="7823279" y="759308"/>
             <a:ext cx="0" cy="293459"/>
           </a:xfrm>
           <a:prstGeom prst="line">
@@ -6813,14 +6437,14 @@
       </p:cxnSp>
       <p:sp>
         <p:nvSpPr>
-          <p:cNvPr id="86" name="TextBox 85"/>
+          <p:cNvPr id="87" name="TextBox 86"/>
           <p:cNvSpPr txBox="1"/>
           <p:nvPr/>
         </p:nvSpPr>
         <p:spPr>
           <a:xfrm>
-            <a:off x="1212886" y="4358599"/>
-            <a:ext cx="1339842" cy="369332"/>
+            <a:off x="3786460" y="1953325"/>
+            <a:ext cx="1211464" cy="369332"/>
           </a:xfrm>
           <a:prstGeom prst="rect">
             <a:avLst/>
@@ -6835,10 +6459,215 @@
           <a:p>
             <a:r>
               <a:rPr lang="en-US" dirty="0" smtClean="0">
+                <a:solidFill>
+                  <a:srgbClr val="FF0000"/>
+                </a:solidFill>
+                <a:latin typeface="Helvetica"/>
+                <a:cs typeface="Helvetica"/>
+              </a:rPr>
+              <a:t>84.0.0.0/8</a:t>
+            </a:r>
+            <a:endParaRPr lang="en-US" baseline="-25000" dirty="0">
+              <a:solidFill>
+                <a:srgbClr val="FF0000"/>
+              </a:solidFill>
+              <a:latin typeface="Helvetica"/>
+              <a:cs typeface="Helvetica"/>
+            </a:endParaRPr>
+          </a:p>
+        </p:txBody>
+      </p:sp>
+      <p:sp>
+        <p:nvSpPr>
+          <p:cNvPr id="88" name="TextBox 87"/>
+          <p:cNvSpPr txBox="1"/>
+          <p:nvPr/>
+        </p:nvSpPr>
+        <p:spPr>
+          <a:xfrm>
+            <a:off x="5100537" y="1427515"/>
+            <a:ext cx="1211464" cy="369332"/>
+          </a:xfrm>
+          <a:prstGeom prst="rect">
+            <a:avLst/>
+          </a:prstGeom>
+          <a:noFill/>
+        </p:spPr>
+        <p:txBody>
+          <a:bodyPr wrap="none" rtlCol="0">
+            <a:spAutoFit/>
+          </a:bodyPr>
+          <a:lstStyle/>
+          <a:p>
+            <a:r>
+              <a:rPr lang="en-US" dirty="0" smtClean="0">
+                <a:solidFill>
+                  <a:srgbClr val="FF0000"/>
+                </a:solidFill>
+                <a:latin typeface="Helvetica"/>
+                <a:cs typeface="Helvetica"/>
+              </a:rPr>
+              <a:t>14.0.0.0/8</a:t>
+            </a:r>
+            <a:endParaRPr lang="en-US" baseline="-25000" dirty="0">
+              <a:solidFill>
+                <a:srgbClr val="FF0000"/>
+              </a:solidFill>
+              <a:latin typeface="Helvetica"/>
+              <a:cs typeface="Helvetica"/>
+            </a:endParaRPr>
+          </a:p>
+        </p:txBody>
+      </p:sp>
+      <p:sp>
+        <p:nvSpPr>
+          <p:cNvPr id="41" name="TextBox 40"/>
+          <p:cNvSpPr txBox="1"/>
+          <p:nvPr/>
+        </p:nvSpPr>
+        <p:spPr>
+          <a:xfrm>
+            <a:off x="3638596" y="2650993"/>
+            <a:ext cx="1339842" cy="369332"/>
+          </a:xfrm>
+          <a:prstGeom prst="rect">
+            <a:avLst/>
+          </a:prstGeom>
+          <a:noFill/>
+        </p:spPr>
+        <p:txBody>
+          <a:bodyPr wrap="none" rtlCol="0">
+            <a:spAutoFit/>
+          </a:bodyPr>
+          <a:lstStyle/>
+          <a:p>
+            <a:r>
+              <a:rPr lang="en-US" dirty="0" smtClean="0">
+                <a:solidFill>
+                  <a:srgbClr val="FF0000"/>
+                </a:solidFill>
                 <a:latin typeface="Helvetica"/>
                 <a:cs typeface="Helvetica"/>
               </a:rPr>
               <a:t>123.0.0.0/8</a:t>
+            </a:r>
+            <a:endParaRPr lang="en-US" baseline="-25000" dirty="0">
+              <a:solidFill>
+                <a:srgbClr val="FF0000"/>
+              </a:solidFill>
+              <a:latin typeface="Helvetica"/>
+              <a:cs typeface="Helvetica"/>
+            </a:endParaRPr>
+          </a:p>
+        </p:txBody>
+      </p:sp>
+      <p:cxnSp>
+        <p:nvCxnSpPr>
+          <p:cNvPr id="42" name="Straight Connector 41"/>
+          <p:cNvCxnSpPr/>
+          <p:nvPr/>
+        </p:nvCxnSpPr>
+        <p:spPr>
+          <a:xfrm>
+            <a:off x="5471854" y="968100"/>
+            <a:ext cx="0" cy="900635"/>
+          </a:xfrm>
+          <a:prstGeom prst="line">
+            <a:avLst/>
+          </a:prstGeom>
+          <a:ln w="28575" cmpd="sng">
+            <a:prstDash val="sysDash"/>
+          </a:ln>
+          <a:effectLst/>
+        </p:spPr>
+        <p:style>
+          <a:lnRef idx="3">
+            <a:schemeClr val="dk1"/>
+          </a:lnRef>
+          <a:fillRef idx="0">
+            <a:schemeClr val="dk1"/>
+          </a:fillRef>
+          <a:effectRef idx="2">
+            <a:schemeClr val="dk1"/>
+          </a:effectRef>
+          <a:fontRef idx="minor">
+            <a:schemeClr val="tx1"/>
+          </a:fontRef>
+        </p:style>
+      </p:cxnSp>
+      <p:cxnSp>
+        <p:nvCxnSpPr>
+          <p:cNvPr id="44" name="Straight Connector 43"/>
+          <p:cNvCxnSpPr/>
+          <p:nvPr/>
+        </p:nvCxnSpPr>
+        <p:spPr>
+          <a:xfrm>
+            <a:off x="5471854" y="759308"/>
+            <a:ext cx="0" cy="293459"/>
+          </a:xfrm>
+          <a:prstGeom prst="line">
+            <a:avLst/>
+          </a:prstGeom>
+          <a:effectLst/>
+        </p:spPr>
+        <p:style>
+          <a:lnRef idx="3">
+            <a:schemeClr val="dk1"/>
+          </a:lnRef>
+          <a:fillRef idx="0">
+            <a:schemeClr val="dk1"/>
+          </a:fillRef>
+          <a:effectRef idx="2">
+            <a:schemeClr val="dk1"/>
+          </a:effectRef>
+          <a:fontRef idx="minor">
+            <a:schemeClr val="tx1"/>
+          </a:fontRef>
+        </p:style>
+      </p:cxnSp>
+      <p:sp>
+        <p:nvSpPr>
+          <p:cNvPr id="48" name="TextBox 47"/>
+          <p:cNvSpPr txBox="1"/>
+          <p:nvPr/>
+        </p:nvSpPr>
+        <p:spPr>
+          <a:xfrm>
+            <a:off x="569707" y="2437370"/>
+            <a:ext cx="471253" cy="369332"/>
+          </a:xfrm>
+          <a:prstGeom prst="rect">
+            <a:avLst/>
+          </a:prstGeom>
+          <a:noFill/>
+        </p:spPr>
+        <p:txBody>
+          <a:bodyPr wrap="none" rtlCol="0">
+            <a:spAutoFit/>
+          </a:bodyPr>
+          <a:lstStyle/>
+          <a:p>
+            <a:r>
+              <a:rPr lang="en-US" dirty="0" smtClean="0">
+                <a:latin typeface="Helvetica"/>
+                <a:cs typeface="Helvetica"/>
+              </a:rPr>
+              <a:t>s</a:t>
+            </a:r>
+            <a:r>
+              <a:rPr lang="en-US" baseline="-25000" dirty="0">
+                <a:latin typeface="Helvetica"/>
+                <a:cs typeface="Helvetica"/>
+              </a:rPr>
+              <a:t>0</a:t>
+            </a:r>
+            <a:r>
+              <a:rPr lang="en-US" baseline="-25000" dirty="0" smtClean="0">
+                <a:latin typeface="Helvetica"/>
+                <a:cs typeface="Helvetica"/>
+              </a:rPr>
+              <a:t>1</a:t>
             </a:r>
             <a:endParaRPr lang="en-US" baseline="-25000" dirty="0">
               <a:latin typeface="Helvetica"/>
@@ -6849,14 +6678,14 @@
       </p:sp>
       <p:sp>
         <p:nvSpPr>
-          <p:cNvPr id="87" name="TextBox 86"/>
+          <p:cNvPr id="49" name="TextBox 48"/>
           <p:cNvSpPr txBox="1"/>
           <p:nvPr/>
         </p:nvSpPr>
         <p:spPr>
           <a:xfrm>
-            <a:off x="3210232" y="4358599"/>
-            <a:ext cx="1211464" cy="369332"/>
+            <a:off x="7874195" y="2438863"/>
+            <a:ext cx="484215" cy="369332"/>
           </a:xfrm>
           <a:prstGeom prst="rect">
             <a:avLst/>
@@ -6874,7 +6703,14 @@
                 <a:latin typeface="Helvetica"/>
                 <a:cs typeface="Helvetica"/>
               </a:rPr>
-              <a:t>84.0.0.0/8</a:t>
+              <a:t>e</a:t>
+            </a:r>
+            <a:r>
+              <a:rPr lang="en-US" baseline="-25000" dirty="0" smtClean="0">
+                <a:latin typeface="Helvetica"/>
+                <a:cs typeface="Helvetica"/>
+              </a:rPr>
+              <a:t>01</a:t>
             </a:r>
             <a:endParaRPr lang="en-US" baseline="-25000" dirty="0">
               <a:latin typeface="Helvetica"/>
@@ -6885,14 +6721,14 @@
       </p:sp>
       <p:sp>
         <p:nvSpPr>
-          <p:cNvPr id="88" name="TextBox 87"/>
+          <p:cNvPr id="56" name="TextBox 55"/>
           <p:cNvSpPr txBox="1"/>
           <p:nvPr/>
         </p:nvSpPr>
         <p:spPr>
           <a:xfrm>
-            <a:off x="4741376" y="4358599"/>
-            <a:ext cx="1211464" cy="369332"/>
+            <a:off x="1814324" y="503335"/>
+            <a:ext cx="436951" cy="369332"/>
           </a:xfrm>
           <a:prstGeom prst="rect">
             <a:avLst/>
@@ -6907,10 +6743,560 @@
           <a:p>
             <a:r>
               <a:rPr lang="en-US" dirty="0" smtClean="0">
-                <a:latin typeface="Helvetica"/>
-                <a:cs typeface="Helvetica"/>
-              </a:rPr>
-              <a:t>14.0.0.0/8</a:t>
+                <a:solidFill>
+                  <a:schemeClr val="tx2">
+                    <a:lumMod val="60000"/>
+                    <a:lumOff val="40000"/>
+                  </a:schemeClr>
+                </a:solidFill>
+                <a:latin typeface="Helvetica"/>
+                <a:cs typeface="Helvetica"/>
+              </a:rPr>
+              <a:t>R</a:t>
+            </a:r>
+            <a:r>
+              <a:rPr lang="en-US" baseline="-25000" dirty="0" smtClean="0">
+                <a:solidFill>
+                  <a:schemeClr val="tx2">
+                    <a:lumMod val="60000"/>
+                    <a:lumOff val="40000"/>
+                  </a:schemeClr>
+                </a:solidFill>
+                <a:latin typeface="Helvetica"/>
+                <a:cs typeface="Helvetica"/>
+              </a:rPr>
+              <a:t>0</a:t>
+            </a:r>
+            <a:endParaRPr lang="en-US" baseline="-25000" dirty="0">
+              <a:solidFill>
+                <a:schemeClr val="tx2">
+                  <a:lumMod val="60000"/>
+                  <a:lumOff val="40000"/>
+                </a:schemeClr>
+              </a:solidFill>
+              <a:latin typeface="Helvetica"/>
+              <a:cs typeface="Helvetica"/>
+            </a:endParaRPr>
+          </a:p>
+        </p:txBody>
+      </p:sp>
+      <p:sp>
+        <p:nvSpPr>
+          <p:cNvPr id="57" name="TextBox 56"/>
+          <p:cNvSpPr txBox="1"/>
+          <p:nvPr/>
+        </p:nvSpPr>
+        <p:spPr>
+          <a:xfrm>
+            <a:off x="3856677" y="230968"/>
+            <a:ext cx="436951" cy="646331"/>
+          </a:xfrm>
+          <a:prstGeom prst="rect">
+            <a:avLst/>
+          </a:prstGeom>
+          <a:noFill/>
+        </p:spPr>
+        <p:txBody>
+          <a:bodyPr wrap="none" rtlCol="0">
+            <a:spAutoFit/>
+          </a:bodyPr>
+          <a:lstStyle/>
+          <a:p>
+            <a:r>
+              <a:rPr lang="en-US" dirty="0" smtClean="0">
+                <a:solidFill>
+                  <a:schemeClr val="tx2">
+                    <a:lumMod val="60000"/>
+                    <a:lumOff val="40000"/>
+                  </a:schemeClr>
+                </a:solidFill>
+                <a:latin typeface="Helvetica"/>
+                <a:cs typeface="Helvetica"/>
+              </a:rPr>
+              <a:t>R</a:t>
+            </a:r>
+            <a:r>
+              <a:rPr lang="en-US" baseline="-25000" dirty="0" smtClean="0">
+                <a:solidFill>
+                  <a:schemeClr val="tx2">
+                    <a:lumMod val="60000"/>
+                    <a:lumOff val="40000"/>
+                  </a:schemeClr>
+                </a:solidFill>
+                <a:latin typeface="Helvetica"/>
+                <a:cs typeface="Helvetica"/>
+              </a:rPr>
+              <a:t>0</a:t>
+            </a:r>
+            <a:endParaRPr lang="en-US" dirty="0" smtClean="0">
+              <a:solidFill>
+                <a:schemeClr val="tx2">
+                  <a:lumMod val="60000"/>
+                  <a:lumOff val="40000"/>
+                </a:schemeClr>
+              </a:solidFill>
+              <a:latin typeface="Helvetica"/>
+              <a:cs typeface="Helvetica"/>
+            </a:endParaRPr>
+          </a:p>
+          <a:p>
+            <a:r>
+              <a:rPr lang="en-US" dirty="0" smtClean="0">
+                <a:solidFill>
+                  <a:schemeClr val="tx2">
+                    <a:lumMod val="60000"/>
+                    <a:lumOff val="40000"/>
+                  </a:schemeClr>
+                </a:solidFill>
+                <a:latin typeface="Helvetica"/>
+                <a:cs typeface="Helvetica"/>
+              </a:rPr>
+              <a:t>R</a:t>
+            </a:r>
+            <a:r>
+              <a:rPr lang="en-US" baseline="-25000" dirty="0" smtClean="0">
+                <a:solidFill>
+                  <a:schemeClr val="tx2">
+                    <a:lumMod val="60000"/>
+                    <a:lumOff val="40000"/>
+                  </a:schemeClr>
+                </a:solidFill>
+                <a:latin typeface="Helvetica"/>
+                <a:cs typeface="Helvetica"/>
+              </a:rPr>
+              <a:t>1</a:t>
+            </a:r>
+            <a:endParaRPr lang="en-US" baseline="-25000" dirty="0">
+              <a:solidFill>
+                <a:schemeClr val="tx2">
+                  <a:lumMod val="60000"/>
+                  <a:lumOff val="40000"/>
+                </a:schemeClr>
+              </a:solidFill>
+              <a:latin typeface="Helvetica"/>
+              <a:cs typeface="Helvetica"/>
+            </a:endParaRPr>
+          </a:p>
+        </p:txBody>
+      </p:sp>
+      <p:sp>
+        <p:nvSpPr>
+          <p:cNvPr id="58" name="TextBox 57"/>
+          <p:cNvSpPr txBox="1"/>
+          <p:nvPr/>
+        </p:nvSpPr>
+        <p:spPr>
+          <a:xfrm>
+            <a:off x="4978439" y="-22962"/>
+            <a:ext cx="488436" cy="923330"/>
+          </a:xfrm>
+          <a:prstGeom prst="rect">
+            <a:avLst/>
+          </a:prstGeom>
+          <a:noFill/>
+        </p:spPr>
+        <p:txBody>
+          <a:bodyPr wrap="square" rtlCol="0">
+            <a:spAutoFit/>
+          </a:bodyPr>
+          <a:lstStyle/>
+          <a:p>
+            <a:r>
+              <a:rPr lang="en-US" dirty="0" smtClean="0">
+                <a:solidFill>
+                  <a:schemeClr val="tx2">
+                    <a:lumMod val="60000"/>
+                    <a:lumOff val="40000"/>
+                  </a:schemeClr>
+                </a:solidFill>
+                <a:latin typeface="Helvetica"/>
+                <a:cs typeface="Helvetica"/>
+              </a:rPr>
+              <a:t>R</a:t>
+            </a:r>
+            <a:r>
+              <a:rPr lang="en-US" baseline="-25000" dirty="0" smtClean="0">
+                <a:solidFill>
+                  <a:schemeClr val="tx2">
+                    <a:lumMod val="60000"/>
+                    <a:lumOff val="40000"/>
+                  </a:schemeClr>
+                </a:solidFill>
+                <a:latin typeface="Helvetica"/>
+                <a:cs typeface="Helvetica"/>
+              </a:rPr>
+              <a:t>0</a:t>
+            </a:r>
+            <a:endParaRPr lang="en-US" dirty="0" smtClean="0">
+              <a:solidFill>
+                <a:schemeClr val="tx2">
+                  <a:lumMod val="60000"/>
+                  <a:lumOff val="40000"/>
+                </a:schemeClr>
+              </a:solidFill>
+              <a:latin typeface="Helvetica"/>
+              <a:cs typeface="Helvetica"/>
+            </a:endParaRPr>
+          </a:p>
+          <a:p>
+            <a:r>
+              <a:rPr lang="en-US" dirty="0" smtClean="0">
+                <a:solidFill>
+                  <a:schemeClr val="tx2">
+                    <a:lumMod val="60000"/>
+                    <a:lumOff val="40000"/>
+                  </a:schemeClr>
+                </a:solidFill>
+                <a:latin typeface="Helvetica"/>
+                <a:cs typeface="Helvetica"/>
+              </a:rPr>
+              <a:t>R</a:t>
+            </a:r>
+            <a:r>
+              <a:rPr lang="en-US" baseline="-25000" dirty="0" smtClean="0">
+                <a:solidFill>
+                  <a:schemeClr val="tx2">
+                    <a:lumMod val="60000"/>
+                    <a:lumOff val="40000"/>
+                  </a:schemeClr>
+                </a:solidFill>
+                <a:latin typeface="Helvetica"/>
+                <a:cs typeface="Helvetica"/>
+              </a:rPr>
+              <a:t>1</a:t>
+            </a:r>
+            <a:endParaRPr lang="en-US" dirty="0">
+              <a:solidFill>
+                <a:schemeClr val="tx2">
+                  <a:lumMod val="60000"/>
+                  <a:lumOff val="40000"/>
+                </a:schemeClr>
+              </a:solidFill>
+              <a:latin typeface="Helvetica"/>
+              <a:cs typeface="Helvetica"/>
+            </a:endParaRPr>
+          </a:p>
+          <a:p>
+            <a:r>
+              <a:rPr lang="en-US" dirty="0" smtClean="0">
+                <a:solidFill>
+                  <a:schemeClr val="tx2">
+                    <a:lumMod val="60000"/>
+                    <a:lumOff val="40000"/>
+                  </a:schemeClr>
+                </a:solidFill>
+                <a:latin typeface="Helvetica"/>
+                <a:cs typeface="Helvetica"/>
+              </a:rPr>
+              <a:t>R</a:t>
+            </a:r>
+            <a:r>
+              <a:rPr lang="en-US" baseline="-25000" dirty="0" smtClean="0">
+                <a:solidFill>
+                  <a:schemeClr val="tx2">
+                    <a:lumMod val="60000"/>
+                    <a:lumOff val="40000"/>
+                  </a:schemeClr>
+                </a:solidFill>
+                <a:latin typeface="Helvetica"/>
+                <a:cs typeface="Helvetica"/>
+              </a:rPr>
+              <a:t>2</a:t>
+            </a:r>
+            <a:endParaRPr lang="en-US" dirty="0" smtClean="0">
+              <a:solidFill>
+                <a:schemeClr val="tx2">
+                  <a:lumMod val="60000"/>
+                  <a:lumOff val="40000"/>
+                </a:schemeClr>
+              </a:solidFill>
+              <a:latin typeface="Helvetica"/>
+              <a:cs typeface="Helvetica"/>
+            </a:endParaRPr>
+          </a:p>
+        </p:txBody>
+      </p:sp>
+      <p:sp>
+        <p:nvSpPr>
+          <p:cNvPr id="59" name="TextBox 58"/>
+          <p:cNvSpPr txBox="1"/>
+          <p:nvPr/>
+        </p:nvSpPr>
+        <p:spPr>
+          <a:xfrm>
+            <a:off x="5789699" y="230968"/>
+            <a:ext cx="488436" cy="646331"/>
+          </a:xfrm>
+          <a:prstGeom prst="rect">
+            <a:avLst/>
+          </a:prstGeom>
+          <a:noFill/>
+        </p:spPr>
+        <p:txBody>
+          <a:bodyPr wrap="square" rtlCol="0">
+            <a:spAutoFit/>
+          </a:bodyPr>
+          <a:lstStyle/>
+          <a:p>
+            <a:r>
+              <a:rPr lang="en-US" dirty="0" smtClean="0">
+                <a:solidFill>
+                  <a:schemeClr val="tx2">
+                    <a:lumMod val="60000"/>
+                    <a:lumOff val="40000"/>
+                  </a:schemeClr>
+                </a:solidFill>
+                <a:latin typeface="Helvetica"/>
+                <a:cs typeface="Helvetica"/>
+              </a:rPr>
+              <a:t>R</a:t>
+            </a:r>
+            <a:r>
+              <a:rPr lang="en-US" baseline="-25000" dirty="0" smtClean="0">
+                <a:solidFill>
+                  <a:schemeClr val="tx2">
+                    <a:lumMod val="60000"/>
+                    <a:lumOff val="40000"/>
+                  </a:schemeClr>
+                </a:solidFill>
+                <a:latin typeface="Helvetica"/>
+                <a:cs typeface="Helvetica"/>
+              </a:rPr>
+              <a:t>0</a:t>
+            </a:r>
+            <a:endParaRPr lang="en-US" dirty="0">
+              <a:solidFill>
+                <a:schemeClr val="tx2">
+                  <a:lumMod val="60000"/>
+                  <a:lumOff val="40000"/>
+                </a:schemeClr>
+              </a:solidFill>
+              <a:latin typeface="Helvetica"/>
+              <a:cs typeface="Helvetica"/>
+            </a:endParaRPr>
+          </a:p>
+          <a:p>
+            <a:r>
+              <a:rPr lang="en-US" dirty="0" smtClean="0">
+                <a:solidFill>
+                  <a:schemeClr val="tx2">
+                    <a:lumMod val="60000"/>
+                    <a:lumOff val="40000"/>
+                  </a:schemeClr>
+                </a:solidFill>
+                <a:latin typeface="Helvetica"/>
+                <a:cs typeface="Helvetica"/>
+              </a:rPr>
+              <a:t>R</a:t>
+            </a:r>
+            <a:r>
+              <a:rPr lang="en-US" baseline="-25000" dirty="0">
+                <a:solidFill>
+                  <a:schemeClr val="tx2">
+                    <a:lumMod val="60000"/>
+                    <a:lumOff val="40000"/>
+                  </a:schemeClr>
+                </a:solidFill>
+                <a:latin typeface="Helvetica"/>
+                <a:cs typeface="Helvetica"/>
+              </a:rPr>
+              <a:t>2</a:t>
+            </a:r>
+            <a:endParaRPr lang="en-US" dirty="0" smtClean="0">
+              <a:solidFill>
+                <a:schemeClr val="tx2">
+                  <a:lumMod val="60000"/>
+                  <a:lumOff val="40000"/>
+                </a:schemeClr>
+              </a:solidFill>
+              <a:latin typeface="Helvetica"/>
+              <a:cs typeface="Helvetica"/>
+            </a:endParaRPr>
+          </a:p>
+        </p:txBody>
+      </p:sp>
+      <p:sp>
+        <p:nvSpPr>
+          <p:cNvPr id="60" name="TextBox 59"/>
+          <p:cNvSpPr txBox="1"/>
+          <p:nvPr/>
+        </p:nvSpPr>
+        <p:spPr>
+          <a:xfrm>
+            <a:off x="7009741" y="471069"/>
+            <a:ext cx="436951" cy="369332"/>
+          </a:xfrm>
+          <a:prstGeom prst="rect">
+            <a:avLst/>
+          </a:prstGeom>
+          <a:noFill/>
+        </p:spPr>
+        <p:txBody>
+          <a:bodyPr wrap="none" rtlCol="0">
+            <a:spAutoFit/>
+          </a:bodyPr>
+          <a:lstStyle/>
+          <a:p>
+            <a:r>
+              <a:rPr lang="en-US" dirty="0" smtClean="0">
+                <a:solidFill>
+                  <a:schemeClr val="tx2">
+                    <a:lumMod val="60000"/>
+                    <a:lumOff val="40000"/>
+                  </a:schemeClr>
+                </a:solidFill>
+                <a:latin typeface="Helvetica"/>
+                <a:cs typeface="Helvetica"/>
+              </a:rPr>
+              <a:t>R</a:t>
+            </a:r>
+            <a:r>
+              <a:rPr lang="en-US" baseline="-25000" dirty="0">
+                <a:solidFill>
+                  <a:schemeClr val="tx2">
+                    <a:lumMod val="60000"/>
+                    <a:lumOff val="40000"/>
+                  </a:schemeClr>
+                </a:solidFill>
+                <a:latin typeface="Helvetica"/>
+                <a:cs typeface="Helvetica"/>
+              </a:rPr>
+              <a:t>0</a:t>
+            </a:r>
+            <a:endParaRPr lang="en-US" baseline="-25000" dirty="0">
+              <a:solidFill>
+                <a:schemeClr val="tx2">
+                  <a:lumMod val="60000"/>
+                  <a:lumOff val="40000"/>
+                </a:schemeClr>
+              </a:solidFill>
+              <a:latin typeface="Helvetica"/>
+              <a:cs typeface="Helvetica"/>
+            </a:endParaRPr>
+          </a:p>
+        </p:txBody>
+      </p:sp>
+      <p:cxnSp>
+        <p:nvCxnSpPr>
+          <p:cNvPr id="61" name="Straight Connector 60"/>
+          <p:cNvCxnSpPr/>
+          <p:nvPr/>
+        </p:nvCxnSpPr>
+        <p:spPr>
+          <a:xfrm>
+            <a:off x="1074820" y="5873235"/>
+            <a:ext cx="6747084" cy="0"/>
+          </a:xfrm>
+          <a:prstGeom prst="line">
+            <a:avLst/>
+          </a:prstGeom>
+          <a:effectLst/>
+        </p:spPr>
+        <p:style>
+          <a:lnRef idx="3">
+            <a:schemeClr val="dk1"/>
+          </a:lnRef>
+          <a:fillRef idx="0">
+            <a:schemeClr val="dk1"/>
+          </a:fillRef>
+          <a:effectRef idx="2">
+            <a:schemeClr val="dk1"/>
+          </a:effectRef>
+          <a:fontRef idx="minor">
+            <a:schemeClr val="tx1"/>
+          </a:fontRef>
+        </p:style>
+      </p:cxnSp>
+      <p:cxnSp>
+        <p:nvCxnSpPr>
+          <p:cNvPr id="62" name="Straight Connector 61"/>
+          <p:cNvCxnSpPr/>
+          <p:nvPr/>
+        </p:nvCxnSpPr>
+        <p:spPr>
+          <a:xfrm>
+            <a:off x="7826884" y="5725813"/>
+            <a:ext cx="0" cy="293459"/>
+          </a:xfrm>
+          <a:prstGeom prst="line">
+            <a:avLst/>
+          </a:prstGeom>
+          <a:effectLst/>
+        </p:spPr>
+        <p:style>
+          <a:lnRef idx="3">
+            <a:schemeClr val="dk1"/>
+          </a:lnRef>
+          <a:fillRef idx="0">
+            <a:schemeClr val="dk1"/>
+          </a:fillRef>
+          <a:effectRef idx="2">
+            <a:schemeClr val="dk1"/>
+          </a:effectRef>
+          <a:fontRef idx="minor">
+            <a:schemeClr val="tx1"/>
+          </a:fontRef>
+        </p:style>
+      </p:cxnSp>
+      <p:cxnSp>
+        <p:nvCxnSpPr>
+          <p:cNvPr id="63" name="Straight Connector 62"/>
+          <p:cNvCxnSpPr/>
+          <p:nvPr/>
+        </p:nvCxnSpPr>
+        <p:spPr>
+          <a:xfrm>
+            <a:off x="1073445" y="5731483"/>
+            <a:ext cx="0" cy="293459"/>
+          </a:xfrm>
+          <a:prstGeom prst="line">
+            <a:avLst/>
+          </a:prstGeom>
+          <a:effectLst/>
+        </p:spPr>
+        <p:style>
+          <a:lnRef idx="3">
+            <a:schemeClr val="dk1"/>
+          </a:lnRef>
+          <a:fillRef idx="0">
+            <a:schemeClr val="dk1"/>
+          </a:fillRef>
+          <a:effectRef idx="2">
+            <a:schemeClr val="dk1"/>
+          </a:effectRef>
+          <a:fontRef idx="minor">
+            <a:schemeClr val="tx1"/>
+          </a:fontRef>
+        </p:style>
+      </p:cxnSp>
+      <p:sp>
+        <p:nvSpPr>
+          <p:cNvPr id="69" name="TextBox 68"/>
+          <p:cNvSpPr txBox="1"/>
+          <p:nvPr/>
+        </p:nvSpPr>
+        <p:spPr>
+          <a:xfrm>
+            <a:off x="922373" y="5957210"/>
+            <a:ext cx="313044" cy="369332"/>
+          </a:xfrm>
+          <a:prstGeom prst="rect">
+            <a:avLst/>
+          </a:prstGeom>
+          <a:noFill/>
+        </p:spPr>
+        <p:txBody>
+          <a:bodyPr wrap="none" rtlCol="0">
+            <a:spAutoFit/>
+          </a:bodyPr>
+          <a:lstStyle/>
+          <a:p>
+            <a:r>
+              <a:rPr lang="en-US" dirty="0" smtClean="0">
+                <a:latin typeface="Helvetica"/>
+                <a:cs typeface="Helvetica"/>
+              </a:rPr>
+              <a:t>0</a:t>
             </a:r>
             <a:endParaRPr lang="en-US" baseline="-25000" dirty="0">
               <a:latin typeface="Helvetica"/>
@@ -6921,14 +7307,14 @@
       </p:sp>
       <p:sp>
         <p:nvSpPr>
-          <p:cNvPr id="89" name="TextBox 88"/>
+          <p:cNvPr id="72" name="TextBox 71"/>
           <p:cNvSpPr txBox="1"/>
           <p:nvPr/>
         </p:nvSpPr>
         <p:spPr>
           <a:xfrm>
-            <a:off x="6313259" y="4358599"/>
-            <a:ext cx="1211464" cy="369332"/>
+            <a:off x="7417568" y="6022320"/>
+            <a:ext cx="826556" cy="369332"/>
           </a:xfrm>
           <a:prstGeom prst="rect">
             <a:avLst/>
@@ -6946,9 +7332,1347 @@
                 <a:latin typeface="Helvetica"/>
                 <a:cs typeface="Helvetica"/>
               </a:rPr>
-              <a:t>35.0.0.0/8</a:t>
+              <a:t>65536</a:t>
             </a:r>
             <a:endParaRPr lang="en-US" baseline="-25000" dirty="0">
+              <a:latin typeface="Helvetica"/>
+              <a:cs typeface="Helvetica"/>
+            </a:endParaRPr>
+          </a:p>
+        </p:txBody>
+      </p:sp>
+      <p:cxnSp>
+        <p:nvCxnSpPr>
+          <p:cNvPr id="81" name="Straight Connector 80"/>
+          <p:cNvCxnSpPr/>
+          <p:nvPr/>
+        </p:nvCxnSpPr>
+        <p:spPr>
+          <a:xfrm>
+            <a:off x="1070160" y="4303226"/>
+            <a:ext cx="9640" cy="1377458"/>
+          </a:xfrm>
+          <a:prstGeom prst="line">
+            <a:avLst/>
+          </a:prstGeom>
+          <a:ln w="28575" cmpd="sng">
+            <a:prstDash val="sysDash"/>
+          </a:ln>
+          <a:effectLst/>
+        </p:spPr>
+        <p:style>
+          <a:lnRef idx="3">
+            <a:schemeClr val="dk1"/>
+          </a:lnRef>
+          <a:fillRef idx="0">
+            <a:schemeClr val="dk1"/>
+          </a:fillRef>
+          <a:effectRef idx="2">
+            <a:schemeClr val="dk1"/>
+          </a:effectRef>
+          <a:fontRef idx="minor">
+            <a:schemeClr val="tx1"/>
+          </a:fontRef>
+        </p:style>
+      </p:cxnSp>
+      <p:cxnSp>
+        <p:nvCxnSpPr>
+          <p:cNvPr id="82" name="Straight Connector 81"/>
+          <p:cNvCxnSpPr/>
+          <p:nvPr/>
+        </p:nvCxnSpPr>
+        <p:spPr>
+          <a:xfrm>
+            <a:off x="3345403" y="5160085"/>
+            <a:ext cx="946850" cy="0"/>
+          </a:xfrm>
+          <a:prstGeom prst="line">
+            <a:avLst/>
+          </a:prstGeom>
+          <a:effectLst/>
+        </p:spPr>
+        <p:style>
+          <a:lnRef idx="3">
+            <a:schemeClr val="dk1"/>
+          </a:lnRef>
+          <a:fillRef idx="0">
+            <a:schemeClr val="dk1"/>
+          </a:fillRef>
+          <a:effectRef idx="2">
+            <a:schemeClr val="dk1"/>
+          </a:effectRef>
+          <a:fontRef idx="minor">
+            <a:schemeClr val="tx1"/>
+          </a:fontRef>
+        </p:style>
+      </p:cxnSp>
+      <p:cxnSp>
+        <p:nvCxnSpPr>
+          <p:cNvPr id="83" name="Straight Connector 82"/>
+          <p:cNvCxnSpPr/>
+          <p:nvPr/>
+        </p:nvCxnSpPr>
+        <p:spPr>
+          <a:xfrm>
+            <a:off x="3345403" y="5012663"/>
+            <a:ext cx="0" cy="293459"/>
+          </a:xfrm>
+          <a:prstGeom prst="line">
+            <a:avLst/>
+          </a:prstGeom>
+          <a:effectLst/>
+        </p:spPr>
+        <p:style>
+          <a:lnRef idx="3">
+            <a:schemeClr val="dk1"/>
+          </a:lnRef>
+          <a:fillRef idx="0">
+            <a:schemeClr val="dk1"/>
+          </a:fillRef>
+          <a:effectRef idx="2">
+            <a:schemeClr val="dk1"/>
+          </a:effectRef>
+          <a:fontRef idx="minor">
+            <a:schemeClr val="tx1"/>
+          </a:fontRef>
+        </p:style>
+      </p:cxnSp>
+      <p:cxnSp>
+        <p:nvCxnSpPr>
+          <p:cNvPr id="84" name="Straight Connector 83"/>
+          <p:cNvCxnSpPr/>
+          <p:nvPr/>
+        </p:nvCxnSpPr>
+        <p:spPr>
+          <a:xfrm>
+            <a:off x="4302102" y="5018333"/>
+            <a:ext cx="0" cy="293459"/>
+          </a:xfrm>
+          <a:prstGeom prst="line">
+            <a:avLst/>
+          </a:prstGeom>
+          <a:effectLst/>
+        </p:spPr>
+        <p:style>
+          <a:lnRef idx="3">
+            <a:schemeClr val="dk1"/>
+          </a:lnRef>
+          <a:fillRef idx="0">
+            <a:schemeClr val="dk1"/>
+          </a:fillRef>
+          <a:effectRef idx="2">
+            <a:schemeClr val="dk1"/>
+          </a:effectRef>
+          <a:fontRef idx="minor">
+            <a:schemeClr val="tx1"/>
+          </a:fontRef>
+        </p:style>
+      </p:cxnSp>
+      <p:sp>
+        <p:nvSpPr>
+          <p:cNvPr id="85" name="TextBox 84"/>
+          <p:cNvSpPr txBox="1"/>
+          <p:nvPr/>
+        </p:nvSpPr>
+        <p:spPr>
+          <a:xfrm>
+            <a:off x="2879951" y="4905400"/>
+            <a:ext cx="471253" cy="369332"/>
+          </a:xfrm>
+          <a:prstGeom prst="rect">
+            <a:avLst/>
+          </a:prstGeom>
+          <a:noFill/>
+        </p:spPr>
+        <p:txBody>
+          <a:bodyPr wrap="none" rtlCol="0">
+            <a:spAutoFit/>
+          </a:bodyPr>
+          <a:lstStyle/>
+          <a:p>
+            <a:r>
+              <a:rPr lang="en-US" dirty="0" smtClean="0">
+                <a:latin typeface="Helvetica"/>
+                <a:cs typeface="Helvetica"/>
+              </a:rPr>
+              <a:t>s</a:t>
+            </a:r>
+            <a:r>
+              <a:rPr lang="en-US" baseline="-25000" dirty="0" smtClean="0">
+                <a:latin typeface="Helvetica"/>
+                <a:cs typeface="Helvetica"/>
+              </a:rPr>
+              <a:t>12</a:t>
+            </a:r>
+            <a:endParaRPr lang="en-US" baseline="-25000" dirty="0">
+              <a:latin typeface="Helvetica"/>
+              <a:cs typeface="Helvetica"/>
+            </a:endParaRPr>
+          </a:p>
+        </p:txBody>
+      </p:sp>
+      <p:sp>
+        <p:nvSpPr>
+          <p:cNvPr id="90" name="TextBox 89"/>
+          <p:cNvSpPr txBox="1"/>
+          <p:nvPr/>
+        </p:nvSpPr>
+        <p:spPr>
+          <a:xfrm>
+            <a:off x="4326032" y="4940863"/>
+            <a:ext cx="484215" cy="369332"/>
+          </a:xfrm>
+          <a:prstGeom prst="rect">
+            <a:avLst/>
+          </a:prstGeom>
+          <a:noFill/>
+        </p:spPr>
+        <p:txBody>
+          <a:bodyPr wrap="none" rtlCol="0">
+            <a:spAutoFit/>
+          </a:bodyPr>
+          <a:lstStyle/>
+          <a:p>
+            <a:r>
+              <a:rPr lang="en-US" dirty="0" smtClean="0">
+                <a:latin typeface="Helvetica"/>
+                <a:cs typeface="Helvetica"/>
+              </a:rPr>
+              <a:t>e</a:t>
+            </a:r>
+            <a:r>
+              <a:rPr lang="en-US" baseline="-25000" dirty="0" smtClean="0">
+                <a:latin typeface="Helvetica"/>
+                <a:cs typeface="Helvetica"/>
+              </a:rPr>
+              <a:t>12</a:t>
+            </a:r>
+            <a:endParaRPr lang="en-US" baseline="-25000" dirty="0">
+              <a:latin typeface="Helvetica"/>
+              <a:cs typeface="Helvetica"/>
+            </a:endParaRPr>
+          </a:p>
+        </p:txBody>
+      </p:sp>
+      <p:cxnSp>
+        <p:nvCxnSpPr>
+          <p:cNvPr id="91" name="Straight Connector 90"/>
+          <p:cNvCxnSpPr/>
+          <p:nvPr/>
+        </p:nvCxnSpPr>
+        <p:spPr>
+          <a:xfrm>
+            <a:off x="4807102" y="4644193"/>
+            <a:ext cx="3021157" cy="0"/>
+          </a:xfrm>
+          <a:prstGeom prst="line">
+            <a:avLst/>
+          </a:prstGeom>
+          <a:effectLst/>
+        </p:spPr>
+        <p:style>
+          <a:lnRef idx="3">
+            <a:schemeClr val="dk1"/>
+          </a:lnRef>
+          <a:fillRef idx="0">
+            <a:schemeClr val="dk1"/>
+          </a:fillRef>
+          <a:effectRef idx="2">
+            <a:schemeClr val="dk1"/>
+          </a:effectRef>
+          <a:fontRef idx="minor">
+            <a:schemeClr val="tx1"/>
+          </a:fontRef>
+        </p:style>
+      </p:cxnSp>
+      <p:cxnSp>
+        <p:nvCxnSpPr>
+          <p:cNvPr id="92" name="Straight Connector 91"/>
+          <p:cNvCxnSpPr/>
+          <p:nvPr/>
+        </p:nvCxnSpPr>
+        <p:spPr>
+          <a:xfrm>
+            <a:off x="4815699" y="4529167"/>
+            <a:ext cx="0" cy="293459"/>
+          </a:xfrm>
+          <a:prstGeom prst="line">
+            <a:avLst/>
+          </a:prstGeom>
+          <a:effectLst/>
+        </p:spPr>
+        <p:style>
+          <a:lnRef idx="3">
+            <a:schemeClr val="dk1"/>
+          </a:lnRef>
+          <a:fillRef idx="0">
+            <a:schemeClr val="dk1"/>
+          </a:fillRef>
+          <a:effectRef idx="2">
+            <a:schemeClr val="dk1"/>
+          </a:effectRef>
+          <a:fontRef idx="minor">
+            <a:schemeClr val="tx1"/>
+          </a:fontRef>
+        </p:style>
+      </p:cxnSp>
+      <p:cxnSp>
+        <p:nvCxnSpPr>
+          <p:cNvPr id="93" name="Straight Connector 92"/>
+          <p:cNvCxnSpPr/>
+          <p:nvPr/>
+        </p:nvCxnSpPr>
+        <p:spPr>
+          <a:xfrm>
+            <a:off x="7816805" y="4512234"/>
+            <a:ext cx="0" cy="293459"/>
+          </a:xfrm>
+          <a:prstGeom prst="line">
+            <a:avLst/>
+          </a:prstGeom>
+          <a:effectLst/>
+        </p:spPr>
+        <p:style>
+          <a:lnRef idx="3">
+            <a:schemeClr val="dk1"/>
+          </a:lnRef>
+          <a:fillRef idx="0">
+            <a:schemeClr val="dk1"/>
+          </a:fillRef>
+          <a:effectRef idx="2">
+            <a:schemeClr val="dk1"/>
+          </a:effectRef>
+          <a:fontRef idx="minor">
+            <a:schemeClr val="tx1"/>
+          </a:fontRef>
+        </p:style>
+      </p:cxnSp>
+      <p:sp>
+        <p:nvSpPr>
+          <p:cNvPr id="94" name="TextBox 93"/>
+          <p:cNvSpPr txBox="1"/>
+          <p:nvPr/>
+        </p:nvSpPr>
+        <p:spPr>
+          <a:xfrm>
+            <a:off x="4355927" y="4458623"/>
+            <a:ext cx="471253" cy="369332"/>
+          </a:xfrm>
+          <a:prstGeom prst="rect">
+            <a:avLst/>
+          </a:prstGeom>
+          <a:noFill/>
+        </p:spPr>
+        <p:txBody>
+          <a:bodyPr wrap="none" rtlCol="0">
+            <a:spAutoFit/>
+          </a:bodyPr>
+          <a:lstStyle/>
+          <a:p>
+            <a:r>
+              <a:rPr lang="en-US" dirty="0" smtClean="0">
+                <a:latin typeface="Helvetica"/>
+                <a:cs typeface="Helvetica"/>
+              </a:rPr>
+              <a:t>s</a:t>
+            </a:r>
+            <a:r>
+              <a:rPr lang="en-US" baseline="-25000" dirty="0" smtClean="0">
+                <a:latin typeface="Helvetica"/>
+                <a:cs typeface="Helvetica"/>
+              </a:rPr>
+              <a:t>22</a:t>
+            </a:r>
+            <a:endParaRPr lang="en-US" baseline="-25000" dirty="0">
+              <a:latin typeface="Helvetica"/>
+              <a:cs typeface="Helvetica"/>
+            </a:endParaRPr>
+          </a:p>
+        </p:txBody>
+      </p:sp>
+      <p:sp>
+        <p:nvSpPr>
+          <p:cNvPr id="95" name="TextBox 94"/>
+          <p:cNvSpPr txBox="1"/>
+          <p:nvPr/>
+        </p:nvSpPr>
+        <p:spPr>
+          <a:xfrm>
+            <a:off x="7777266" y="4478368"/>
+            <a:ext cx="484215" cy="369332"/>
+          </a:xfrm>
+          <a:prstGeom prst="rect">
+            <a:avLst/>
+          </a:prstGeom>
+          <a:noFill/>
+        </p:spPr>
+        <p:txBody>
+          <a:bodyPr wrap="none" rtlCol="0">
+            <a:spAutoFit/>
+          </a:bodyPr>
+          <a:lstStyle/>
+          <a:p>
+            <a:r>
+              <a:rPr lang="en-US" dirty="0" smtClean="0">
+                <a:latin typeface="Helvetica"/>
+                <a:cs typeface="Helvetica"/>
+              </a:rPr>
+              <a:t>e</a:t>
+            </a:r>
+            <a:r>
+              <a:rPr lang="en-US" baseline="-25000" dirty="0" smtClean="0">
+                <a:latin typeface="Helvetica"/>
+                <a:cs typeface="Helvetica"/>
+              </a:rPr>
+              <a:t>22</a:t>
+            </a:r>
+            <a:endParaRPr lang="en-US" baseline="-25000" dirty="0">
+              <a:latin typeface="Helvetica"/>
+              <a:cs typeface="Helvetica"/>
+            </a:endParaRPr>
+          </a:p>
+        </p:txBody>
+      </p:sp>
+      <p:cxnSp>
+        <p:nvCxnSpPr>
+          <p:cNvPr id="96" name="Straight Connector 95"/>
+          <p:cNvCxnSpPr/>
+          <p:nvPr/>
+        </p:nvCxnSpPr>
+        <p:spPr>
+          <a:xfrm>
+            <a:off x="1079800" y="4100768"/>
+            <a:ext cx="6747084" cy="0"/>
+          </a:xfrm>
+          <a:prstGeom prst="line">
+            <a:avLst/>
+          </a:prstGeom>
+          <a:effectLst/>
+        </p:spPr>
+        <p:style>
+          <a:lnRef idx="3">
+            <a:schemeClr val="dk1"/>
+          </a:lnRef>
+          <a:fillRef idx="0">
+            <a:schemeClr val="dk1"/>
+          </a:fillRef>
+          <a:effectRef idx="2">
+            <a:schemeClr val="dk1"/>
+          </a:effectRef>
+          <a:fontRef idx="minor">
+            <a:schemeClr val="tx1"/>
+          </a:fontRef>
+        </p:style>
+      </p:cxnSp>
+      <p:cxnSp>
+        <p:nvCxnSpPr>
+          <p:cNvPr id="97" name="Straight Connector 96"/>
+          <p:cNvCxnSpPr/>
+          <p:nvPr/>
+        </p:nvCxnSpPr>
+        <p:spPr>
+          <a:xfrm>
+            <a:off x="1069217" y="3954038"/>
+            <a:ext cx="0" cy="293459"/>
+          </a:xfrm>
+          <a:prstGeom prst="line">
+            <a:avLst/>
+          </a:prstGeom>
+          <a:effectLst/>
+        </p:spPr>
+        <p:style>
+          <a:lnRef idx="3">
+            <a:schemeClr val="dk1"/>
+          </a:lnRef>
+          <a:fillRef idx="0">
+            <a:schemeClr val="dk1"/>
+          </a:fillRef>
+          <a:effectRef idx="2">
+            <a:schemeClr val="dk1"/>
+          </a:effectRef>
+          <a:fontRef idx="minor">
+            <a:schemeClr val="tx1"/>
+          </a:fontRef>
+        </p:style>
+      </p:cxnSp>
+      <p:cxnSp>
+        <p:nvCxnSpPr>
+          <p:cNvPr id="98" name="Straight Connector 97"/>
+          <p:cNvCxnSpPr/>
+          <p:nvPr/>
+        </p:nvCxnSpPr>
+        <p:spPr>
+          <a:xfrm>
+            <a:off x="3350383" y="4258837"/>
+            <a:ext cx="0" cy="738410"/>
+          </a:xfrm>
+          <a:prstGeom prst="line">
+            <a:avLst/>
+          </a:prstGeom>
+          <a:ln w="28575" cmpd="sng">
+            <a:prstDash val="sysDash"/>
+          </a:ln>
+          <a:effectLst/>
+        </p:spPr>
+        <p:style>
+          <a:lnRef idx="3">
+            <a:schemeClr val="dk1"/>
+          </a:lnRef>
+          <a:fillRef idx="0">
+            <a:schemeClr val="dk1"/>
+          </a:fillRef>
+          <a:effectRef idx="2">
+            <a:schemeClr val="dk1"/>
+          </a:effectRef>
+          <a:fontRef idx="minor">
+            <a:schemeClr val="tx1"/>
+          </a:fontRef>
+        </p:style>
+      </p:cxnSp>
+      <p:cxnSp>
+        <p:nvCxnSpPr>
+          <p:cNvPr id="99" name="Straight Connector 98"/>
+          <p:cNvCxnSpPr/>
+          <p:nvPr/>
+        </p:nvCxnSpPr>
+        <p:spPr>
+          <a:xfrm>
+            <a:off x="4817685" y="4242496"/>
+            <a:ext cx="0" cy="496025"/>
+          </a:xfrm>
+          <a:prstGeom prst="line">
+            <a:avLst/>
+          </a:prstGeom>
+          <a:ln w="28575" cmpd="sng">
+            <a:prstDash val="sysDash"/>
+          </a:ln>
+          <a:effectLst/>
+        </p:spPr>
+        <p:style>
+          <a:lnRef idx="3">
+            <a:schemeClr val="dk1"/>
+          </a:lnRef>
+          <a:fillRef idx="0">
+            <a:schemeClr val="dk1"/>
+          </a:fillRef>
+          <a:effectRef idx="2">
+            <a:schemeClr val="dk1"/>
+          </a:effectRef>
+          <a:fontRef idx="minor">
+            <a:schemeClr val="tx1"/>
+          </a:fontRef>
+        </p:style>
+      </p:cxnSp>
+      <p:cxnSp>
+        <p:nvCxnSpPr>
+          <p:cNvPr id="100" name="Straight Connector 99"/>
+          <p:cNvCxnSpPr/>
+          <p:nvPr/>
+        </p:nvCxnSpPr>
+        <p:spPr>
+          <a:xfrm>
+            <a:off x="7816805" y="4247497"/>
+            <a:ext cx="0" cy="396696"/>
+          </a:xfrm>
+          <a:prstGeom prst="line">
+            <a:avLst/>
+          </a:prstGeom>
+          <a:ln w="28575" cmpd="sng">
+            <a:prstDash val="sysDash"/>
+          </a:ln>
+          <a:effectLst/>
+        </p:spPr>
+        <p:style>
+          <a:lnRef idx="3">
+            <a:schemeClr val="dk1"/>
+          </a:lnRef>
+          <a:fillRef idx="0">
+            <a:schemeClr val="dk1"/>
+          </a:fillRef>
+          <a:effectRef idx="2">
+            <a:schemeClr val="dk1"/>
+          </a:effectRef>
+          <a:fontRef idx="minor">
+            <a:schemeClr val="tx1"/>
+          </a:fontRef>
+        </p:style>
+      </p:cxnSp>
+      <p:cxnSp>
+        <p:nvCxnSpPr>
+          <p:cNvPr id="101" name="Straight Connector 100"/>
+          <p:cNvCxnSpPr/>
+          <p:nvPr/>
+        </p:nvCxnSpPr>
+        <p:spPr>
+          <a:xfrm>
+            <a:off x="7826884" y="4268552"/>
+            <a:ext cx="0" cy="1406462"/>
+          </a:xfrm>
+          <a:prstGeom prst="line">
+            <a:avLst/>
+          </a:prstGeom>
+          <a:ln w="28575" cmpd="sng">
+            <a:prstDash val="sysDash"/>
+          </a:ln>
+          <a:effectLst/>
+        </p:spPr>
+        <p:style>
+          <a:lnRef idx="3">
+            <a:schemeClr val="dk1"/>
+          </a:lnRef>
+          <a:fillRef idx="0">
+            <a:schemeClr val="dk1"/>
+          </a:fillRef>
+          <a:effectRef idx="2">
+            <a:schemeClr val="dk1"/>
+          </a:effectRef>
+          <a:fontRef idx="minor">
+            <a:schemeClr val="tx1"/>
+          </a:fontRef>
+        </p:style>
+      </p:cxnSp>
+      <p:cxnSp>
+        <p:nvCxnSpPr>
+          <p:cNvPr id="102" name="Straight Connector 101"/>
+          <p:cNvCxnSpPr/>
+          <p:nvPr/>
+        </p:nvCxnSpPr>
+        <p:spPr>
+          <a:xfrm>
+            <a:off x="3345403" y="3959708"/>
+            <a:ext cx="0" cy="293459"/>
+          </a:xfrm>
+          <a:prstGeom prst="line">
+            <a:avLst/>
+          </a:prstGeom>
+          <a:effectLst/>
+        </p:spPr>
+        <p:style>
+          <a:lnRef idx="3">
+            <a:schemeClr val="dk1"/>
+          </a:lnRef>
+          <a:fillRef idx="0">
+            <a:schemeClr val="dk1"/>
+          </a:fillRef>
+          <a:effectRef idx="2">
+            <a:schemeClr val="dk1"/>
+          </a:effectRef>
+          <a:fontRef idx="minor">
+            <a:schemeClr val="tx1"/>
+          </a:fontRef>
+        </p:style>
+      </p:cxnSp>
+      <p:cxnSp>
+        <p:nvCxnSpPr>
+          <p:cNvPr id="103" name="Straight Connector 102"/>
+          <p:cNvCxnSpPr/>
+          <p:nvPr/>
+        </p:nvCxnSpPr>
+        <p:spPr>
+          <a:xfrm>
+            <a:off x="4817685" y="3949037"/>
+            <a:ext cx="0" cy="293459"/>
+          </a:xfrm>
+          <a:prstGeom prst="line">
+            <a:avLst/>
+          </a:prstGeom>
+          <a:effectLst/>
+        </p:spPr>
+        <p:style>
+          <a:lnRef idx="3">
+            <a:schemeClr val="dk1"/>
+          </a:lnRef>
+          <a:fillRef idx="0">
+            <a:schemeClr val="dk1"/>
+          </a:fillRef>
+          <a:effectRef idx="2">
+            <a:schemeClr val="dk1"/>
+          </a:effectRef>
+          <a:fontRef idx="minor">
+            <a:schemeClr val="tx1"/>
+          </a:fontRef>
+        </p:style>
+      </p:cxnSp>
+      <p:cxnSp>
+        <p:nvCxnSpPr>
+          <p:cNvPr id="104" name="Straight Connector 103"/>
+          <p:cNvCxnSpPr/>
+          <p:nvPr/>
+        </p:nvCxnSpPr>
+        <p:spPr>
+          <a:xfrm>
+            <a:off x="7816805" y="3949037"/>
+            <a:ext cx="0" cy="293459"/>
+          </a:xfrm>
+          <a:prstGeom prst="line">
+            <a:avLst/>
+          </a:prstGeom>
+          <a:effectLst/>
+        </p:spPr>
+        <p:style>
+          <a:lnRef idx="3">
+            <a:schemeClr val="dk1"/>
+          </a:lnRef>
+          <a:fillRef idx="0">
+            <a:schemeClr val="dk1"/>
+          </a:fillRef>
+          <a:effectRef idx="2">
+            <a:schemeClr val="dk1"/>
+          </a:effectRef>
+          <a:fontRef idx="minor">
+            <a:schemeClr val="tx1"/>
+          </a:fontRef>
+        </p:style>
+      </p:cxnSp>
+      <p:cxnSp>
+        <p:nvCxnSpPr>
+          <p:cNvPr id="105" name="Straight Connector 104"/>
+          <p:cNvCxnSpPr/>
+          <p:nvPr/>
+        </p:nvCxnSpPr>
+        <p:spPr>
+          <a:xfrm>
+            <a:off x="7821904" y="3959708"/>
+            <a:ext cx="0" cy="293459"/>
+          </a:xfrm>
+          <a:prstGeom prst="line">
+            <a:avLst/>
+          </a:prstGeom>
+          <a:effectLst/>
+        </p:spPr>
+        <p:style>
+          <a:lnRef idx="3">
+            <a:schemeClr val="dk1"/>
+          </a:lnRef>
+          <a:fillRef idx="0">
+            <a:schemeClr val="dk1"/>
+          </a:fillRef>
+          <a:effectRef idx="2">
+            <a:schemeClr val="dk1"/>
+          </a:effectRef>
+          <a:fontRef idx="minor">
+            <a:schemeClr val="tx1"/>
+          </a:fontRef>
+        </p:style>
+      </p:cxnSp>
+      <p:sp>
+        <p:nvSpPr>
+          <p:cNvPr id="106" name="TextBox 105"/>
+          <p:cNvSpPr txBox="1"/>
+          <p:nvPr/>
+        </p:nvSpPr>
+        <p:spPr>
+          <a:xfrm>
+            <a:off x="2814935" y="5289189"/>
+            <a:ext cx="2148207" cy="369332"/>
+          </a:xfrm>
+          <a:prstGeom prst="rect">
+            <a:avLst/>
+          </a:prstGeom>
+          <a:noFill/>
+        </p:spPr>
+        <p:txBody>
+          <a:bodyPr wrap="none" rtlCol="0">
+            <a:spAutoFit/>
+          </a:bodyPr>
+          <a:lstStyle/>
+          <a:p>
+            <a:r>
+              <a:rPr lang="en-US" dirty="0" smtClean="0">
+                <a:solidFill>
+                  <a:srgbClr val="FF0000"/>
+                </a:solidFill>
+                <a:latin typeface="Helvetica"/>
+                <a:cs typeface="Helvetica"/>
+              </a:rPr>
+              <a:t>17.0/8 (</a:t>
+            </a:r>
+            <a:r>
+              <a:rPr lang="is-IS" dirty="0" smtClean="0">
+                <a:solidFill>
+                  <a:srgbClr val="FF0000"/>
+                </a:solidFill>
+                <a:latin typeface="Helvetica"/>
+                <a:cs typeface="Helvetica"/>
+              </a:rPr>
+              <a:t>4352-4607</a:t>
+            </a:r>
+            <a:r>
+              <a:rPr lang="en-US" dirty="0" smtClean="0">
+                <a:solidFill>
+                  <a:srgbClr val="FF0000"/>
+                </a:solidFill>
+                <a:latin typeface="Helvetica"/>
+                <a:cs typeface="Helvetica"/>
+              </a:rPr>
+              <a:t>)</a:t>
+            </a:r>
+            <a:endParaRPr lang="en-US" baseline="-25000" dirty="0">
+              <a:solidFill>
+                <a:srgbClr val="FF0000"/>
+              </a:solidFill>
+              <a:latin typeface="Helvetica"/>
+              <a:cs typeface="Helvetica"/>
+            </a:endParaRPr>
+          </a:p>
+        </p:txBody>
+      </p:sp>
+      <p:sp>
+        <p:nvSpPr>
+          <p:cNvPr id="107" name="TextBox 106"/>
+          <p:cNvSpPr txBox="1"/>
+          <p:nvPr/>
+        </p:nvSpPr>
+        <p:spPr>
+          <a:xfrm>
+            <a:off x="5044164" y="4640833"/>
+            <a:ext cx="2404963" cy="369332"/>
+          </a:xfrm>
+          <a:prstGeom prst="rect">
+            <a:avLst/>
+          </a:prstGeom>
+          <a:noFill/>
+        </p:spPr>
+        <p:txBody>
+          <a:bodyPr wrap="none" rtlCol="0">
+            <a:spAutoFit/>
+          </a:bodyPr>
+          <a:lstStyle/>
+          <a:p>
+            <a:r>
+              <a:rPr lang="en-US" dirty="0" smtClean="0">
+                <a:solidFill>
+                  <a:srgbClr val="FF0000"/>
+                </a:solidFill>
+                <a:latin typeface="Helvetica"/>
+                <a:cs typeface="Helvetica"/>
+              </a:rPr>
+              <a:t>89.0/8 (22784-23039)</a:t>
+            </a:r>
+            <a:endParaRPr lang="en-US" baseline="-25000" dirty="0">
+              <a:solidFill>
+                <a:srgbClr val="FF0000"/>
+              </a:solidFill>
+              <a:latin typeface="Helvetica"/>
+              <a:cs typeface="Helvetica"/>
+            </a:endParaRPr>
+          </a:p>
+        </p:txBody>
+      </p:sp>
+      <p:sp>
+        <p:nvSpPr>
+          <p:cNvPr id="108" name="TextBox 107"/>
+          <p:cNvSpPr txBox="1"/>
+          <p:nvPr/>
+        </p:nvSpPr>
+        <p:spPr>
+          <a:xfrm>
+            <a:off x="3501757" y="5902192"/>
+            <a:ext cx="2533341" cy="369332"/>
+          </a:xfrm>
+          <a:prstGeom prst="rect">
+            <a:avLst/>
+          </a:prstGeom>
+          <a:noFill/>
+        </p:spPr>
+        <p:txBody>
+          <a:bodyPr wrap="none" rtlCol="0">
+            <a:spAutoFit/>
+          </a:bodyPr>
+          <a:lstStyle/>
+          <a:p>
+            <a:r>
+              <a:rPr lang="en-US" dirty="0" smtClean="0">
+                <a:solidFill>
+                  <a:srgbClr val="FF0000"/>
+                </a:solidFill>
+                <a:latin typeface="Helvetica"/>
+                <a:cs typeface="Helvetica"/>
+              </a:rPr>
+              <a:t>123.0/8 (31488-31743)</a:t>
+            </a:r>
+            <a:endParaRPr lang="en-US" baseline="-25000" dirty="0">
+              <a:solidFill>
+                <a:srgbClr val="FF0000"/>
+              </a:solidFill>
+              <a:latin typeface="Helvetica"/>
+              <a:cs typeface="Helvetica"/>
+            </a:endParaRPr>
+          </a:p>
+        </p:txBody>
+      </p:sp>
+      <p:cxnSp>
+        <p:nvCxnSpPr>
+          <p:cNvPr id="109" name="Straight Connector 108"/>
+          <p:cNvCxnSpPr/>
+          <p:nvPr/>
+        </p:nvCxnSpPr>
+        <p:spPr>
+          <a:xfrm>
+            <a:off x="4302102" y="4168500"/>
+            <a:ext cx="0" cy="900635"/>
+          </a:xfrm>
+          <a:prstGeom prst="line">
+            <a:avLst/>
+          </a:prstGeom>
+          <a:ln w="28575" cmpd="sng">
+            <a:prstDash val="sysDash"/>
+          </a:ln>
+          <a:effectLst/>
+        </p:spPr>
+        <p:style>
+          <a:lnRef idx="3">
+            <a:schemeClr val="dk1"/>
+          </a:lnRef>
+          <a:fillRef idx="0">
+            <a:schemeClr val="dk1"/>
+          </a:fillRef>
+          <a:effectRef idx="2">
+            <a:schemeClr val="dk1"/>
+          </a:effectRef>
+          <a:fontRef idx="minor">
+            <a:schemeClr val="tx1"/>
+          </a:fontRef>
+        </p:style>
+      </p:cxnSp>
+      <p:cxnSp>
+        <p:nvCxnSpPr>
+          <p:cNvPr id="110" name="Straight Connector 109"/>
+          <p:cNvCxnSpPr/>
+          <p:nvPr/>
+        </p:nvCxnSpPr>
+        <p:spPr>
+          <a:xfrm>
+            <a:off x="4302102" y="3959708"/>
+            <a:ext cx="0" cy="293459"/>
+          </a:xfrm>
+          <a:prstGeom prst="line">
+            <a:avLst/>
+          </a:prstGeom>
+          <a:effectLst/>
+        </p:spPr>
+        <p:style>
+          <a:lnRef idx="3">
+            <a:schemeClr val="dk1"/>
+          </a:lnRef>
+          <a:fillRef idx="0">
+            <a:schemeClr val="dk1"/>
+          </a:fillRef>
+          <a:effectRef idx="2">
+            <a:schemeClr val="dk1"/>
+          </a:effectRef>
+          <a:fontRef idx="minor">
+            <a:schemeClr val="tx1"/>
+          </a:fontRef>
+        </p:style>
+      </p:cxnSp>
+      <p:sp>
+        <p:nvSpPr>
+          <p:cNvPr id="111" name="TextBox 110"/>
+          <p:cNvSpPr txBox="1"/>
+          <p:nvPr/>
+        </p:nvSpPr>
+        <p:spPr>
+          <a:xfrm>
+            <a:off x="568332" y="5637770"/>
+            <a:ext cx="471253" cy="369332"/>
+          </a:xfrm>
+          <a:prstGeom prst="rect">
+            <a:avLst/>
+          </a:prstGeom>
+          <a:noFill/>
+        </p:spPr>
+        <p:txBody>
+          <a:bodyPr wrap="none" rtlCol="0">
+            <a:spAutoFit/>
+          </a:bodyPr>
+          <a:lstStyle/>
+          <a:p>
+            <a:r>
+              <a:rPr lang="en-US" dirty="0" smtClean="0">
+                <a:latin typeface="Helvetica"/>
+                <a:cs typeface="Helvetica"/>
+              </a:rPr>
+              <a:t>s</a:t>
+            </a:r>
+            <a:r>
+              <a:rPr lang="en-US" baseline="-25000" dirty="0" smtClean="0">
+                <a:latin typeface="Helvetica"/>
+                <a:cs typeface="Helvetica"/>
+              </a:rPr>
+              <a:t>0</a:t>
+            </a:r>
+            <a:r>
+              <a:rPr lang="en-US" baseline="-25000" dirty="0">
+                <a:latin typeface="Helvetica"/>
+                <a:cs typeface="Helvetica"/>
+              </a:rPr>
+              <a:t>2</a:t>
+            </a:r>
+            <a:endParaRPr lang="en-US" baseline="-25000" dirty="0">
+              <a:latin typeface="Helvetica"/>
+              <a:cs typeface="Helvetica"/>
+            </a:endParaRPr>
+          </a:p>
+        </p:txBody>
+      </p:sp>
+      <p:sp>
+        <p:nvSpPr>
+          <p:cNvPr id="112" name="TextBox 111"/>
+          <p:cNvSpPr txBox="1"/>
+          <p:nvPr/>
+        </p:nvSpPr>
+        <p:spPr>
+          <a:xfrm>
+            <a:off x="7872820" y="5639263"/>
+            <a:ext cx="484215" cy="369332"/>
+          </a:xfrm>
+          <a:prstGeom prst="rect">
+            <a:avLst/>
+          </a:prstGeom>
+          <a:noFill/>
+        </p:spPr>
+        <p:txBody>
+          <a:bodyPr wrap="none" rtlCol="0">
+            <a:spAutoFit/>
+          </a:bodyPr>
+          <a:lstStyle/>
+          <a:p>
+            <a:r>
+              <a:rPr lang="en-US" dirty="0" smtClean="0">
+                <a:latin typeface="Helvetica"/>
+                <a:cs typeface="Helvetica"/>
+              </a:rPr>
+              <a:t>e</a:t>
+            </a:r>
+            <a:r>
+              <a:rPr lang="en-US" baseline="-25000" dirty="0" smtClean="0">
+                <a:latin typeface="Helvetica"/>
+                <a:cs typeface="Helvetica"/>
+              </a:rPr>
+              <a:t>02</a:t>
+            </a:r>
+            <a:endParaRPr lang="en-US" baseline="-25000" dirty="0">
+              <a:latin typeface="Helvetica"/>
+              <a:cs typeface="Helvetica"/>
+            </a:endParaRPr>
+          </a:p>
+        </p:txBody>
+      </p:sp>
+      <p:sp>
+        <p:nvSpPr>
+          <p:cNvPr id="113" name="TextBox 112"/>
+          <p:cNvSpPr txBox="1"/>
+          <p:nvPr/>
+        </p:nvSpPr>
+        <p:spPr>
+          <a:xfrm>
+            <a:off x="1812949" y="3703735"/>
+            <a:ext cx="436951" cy="369332"/>
+          </a:xfrm>
+          <a:prstGeom prst="rect">
+            <a:avLst/>
+          </a:prstGeom>
+          <a:noFill/>
+        </p:spPr>
+        <p:txBody>
+          <a:bodyPr wrap="none" rtlCol="0">
+            <a:spAutoFit/>
+          </a:bodyPr>
+          <a:lstStyle/>
+          <a:p>
+            <a:r>
+              <a:rPr lang="en-US" dirty="0" smtClean="0">
+                <a:solidFill>
+                  <a:schemeClr val="tx2">
+                    <a:lumMod val="60000"/>
+                    <a:lumOff val="40000"/>
+                  </a:schemeClr>
+                </a:solidFill>
+                <a:latin typeface="Helvetica"/>
+                <a:cs typeface="Helvetica"/>
+              </a:rPr>
+              <a:t>R</a:t>
+            </a:r>
+            <a:r>
+              <a:rPr lang="en-US" baseline="-25000" dirty="0" smtClean="0">
+                <a:solidFill>
+                  <a:schemeClr val="tx2">
+                    <a:lumMod val="60000"/>
+                    <a:lumOff val="40000"/>
+                  </a:schemeClr>
+                </a:solidFill>
+                <a:latin typeface="Helvetica"/>
+                <a:cs typeface="Helvetica"/>
+              </a:rPr>
+              <a:t>0</a:t>
+            </a:r>
+            <a:endParaRPr lang="en-US" baseline="-25000" dirty="0">
+              <a:solidFill>
+                <a:schemeClr val="tx2">
+                  <a:lumMod val="60000"/>
+                  <a:lumOff val="40000"/>
+                </a:schemeClr>
+              </a:solidFill>
+              <a:latin typeface="Helvetica"/>
+              <a:cs typeface="Helvetica"/>
+            </a:endParaRPr>
+          </a:p>
+        </p:txBody>
+      </p:sp>
+      <p:sp>
+        <p:nvSpPr>
+          <p:cNvPr id="114" name="TextBox 113"/>
+          <p:cNvSpPr txBox="1"/>
+          <p:nvPr/>
+        </p:nvSpPr>
+        <p:spPr>
+          <a:xfrm>
+            <a:off x="3567984" y="3431368"/>
+            <a:ext cx="436951" cy="646331"/>
+          </a:xfrm>
+          <a:prstGeom prst="rect">
+            <a:avLst/>
+          </a:prstGeom>
+          <a:noFill/>
+        </p:spPr>
+        <p:txBody>
+          <a:bodyPr wrap="none" rtlCol="0">
+            <a:spAutoFit/>
+          </a:bodyPr>
+          <a:lstStyle/>
+          <a:p>
+            <a:r>
+              <a:rPr lang="en-US" dirty="0" smtClean="0">
+                <a:solidFill>
+                  <a:schemeClr val="tx2">
+                    <a:lumMod val="60000"/>
+                    <a:lumOff val="40000"/>
+                  </a:schemeClr>
+                </a:solidFill>
+                <a:latin typeface="Helvetica"/>
+                <a:cs typeface="Helvetica"/>
+              </a:rPr>
+              <a:t>R</a:t>
+            </a:r>
+            <a:r>
+              <a:rPr lang="en-US" baseline="-25000" dirty="0" smtClean="0">
+                <a:solidFill>
+                  <a:schemeClr val="tx2">
+                    <a:lumMod val="60000"/>
+                    <a:lumOff val="40000"/>
+                  </a:schemeClr>
+                </a:solidFill>
+                <a:latin typeface="Helvetica"/>
+                <a:cs typeface="Helvetica"/>
+              </a:rPr>
+              <a:t>0</a:t>
+            </a:r>
+            <a:endParaRPr lang="en-US" dirty="0" smtClean="0">
+              <a:solidFill>
+                <a:schemeClr val="tx2">
+                  <a:lumMod val="60000"/>
+                  <a:lumOff val="40000"/>
+                </a:schemeClr>
+              </a:solidFill>
+              <a:latin typeface="Helvetica"/>
+              <a:cs typeface="Helvetica"/>
+            </a:endParaRPr>
+          </a:p>
+          <a:p>
+            <a:r>
+              <a:rPr lang="en-US" dirty="0" smtClean="0">
+                <a:solidFill>
+                  <a:schemeClr val="tx2">
+                    <a:lumMod val="60000"/>
+                    <a:lumOff val="40000"/>
+                  </a:schemeClr>
+                </a:solidFill>
+                <a:latin typeface="Helvetica"/>
+                <a:cs typeface="Helvetica"/>
+              </a:rPr>
+              <a:t>R</a:t>
+            </a:r>
+            <a:r>
+              <a:rPr lang="en-US" baseline="-25000" dirty="0" smtClean="0">
+                <a:solidFill>
+                  <a:schemeClr val="tx2">
+                    <a:lumMod val="60000"/>
+                    <a:lumOff val="40000"/>
+                  </a:schemeClr>
+                </a:solidFill>
+                <a:latin typeface="Helvetica"/>
+                <a:cs typeface="Helvetica"/>
+              </a:rPr>
+              <a:t>1</a:t>
+            </a:r>
+            <a:endParaRPr lang="en-US" baseline="-25000" dirty="0">
+              <a:solidFill>
+                <a:schemeClr val="tx2">
+                  <a:lumMod val="60000"/>
+                  <a:lumOff val="40000"/>
+                </a:schemeClr>
+              </a:solidFill>
+              <a:latin typeface="Helvetica"/>
+              <a:cs typeface="Helvetica"/>
+            </a:endParaRPr>
+          </a:p>
+        </p:txBody>
+      </p:sp>
+      <p:sp>
+        <p:nvSpPr>
+          <p:cNvPr id="115" name="TextBox 114"/>
+          <p:cNvSpPr txBox="1"/>
+          <p:nvPr/>
+        </p:nvSpPr>
+        <p:spPr>
+          <a:xfrm>
+            <a:off x="6093118" y="3431368"/>
+            <a:ext cx="488436" cy="646331"/>
+          </a:xfrm>
+          <a:prstGeom prst="rect">
+            <a:avLst/>
+          </a:prstGeom>
+          <a:noFill/>
+        </p:spPr>
+        <p:txBody>
+          <a:bodyPr wrap="square" rtlCol="0">
+            <a:spAutoFit/>
+          </a:bodyPr>
+          <a:lstStyle/>
+          <a:p>
+            <a:r>
+              <a:rPr lang="en-US" dirty="0" smtClean="0">
+                <a:solidFill>
+                  <a:schemeClr val="tx2">
+                    <a:lumMod val="60000"/>
+                    <a:lumOff val="40000"/>
+                  </a:schemeClr>
+                </a:solidFill>
+                <a:latin typeface="Helvetica"/>
+                <a:cs typeface="Helvetica"/>
+              </a:rPr>
+              <a:t>R</a:t>
+            </a:r>
+            <a:r>
+              <a:rPr lang="en-US" baseline="-25000" dirty="0" smtClean="0">
+                <a:solidFill>
+                  <a:schemeClr val="tx2">
+                    <a:lumMod val="60000"/>
+                    <a:lumOff val="40000"/>
+                  </a:schemeClr>
+                </a:solidFill>
+                <a:latin typeface="Helvetica"/>
+                <a:cs typeface="Helvetica"/>
+              </a:rPr>
+              <a:t>0</a:t>
+            </a:r>
+            <a:endParaRPr lang="en-US" dirty="0">
+              <a:solidFill>
+                <a:schemeClr val="tx2">
+                  <a:lumMod val="60000"/>
+                  <a:lumOff val="40000"/>
+                </a:schemeClr>
+              </a:solidFill>
+              <a:latin typeface="Helvetica"/>
+              <a:cs typeface="Helvetica"/>
+            </a:endParaRPr>
+          </a:p>
+          <a:p>
+            <a:r>
+              <a:rPr lang="en-US" dirty="0" smtClean="0">
+                <a:solidFill>
+                  <a:schemeClr val="tx2">
+                    <a:lumMod val="60000"/>
+                    <a:lumOff val="40000"/>
+                  </a:schemeClr>
+                </a:solidFill>
+                <a:latin typeface="Helvetica"/>
+                <a:cs typeface="Helvetica"/>
+              </a:rPr>
+              <a:t>R</a:t>
+            </a:r>
+            <a:r>
+              <a:rPr lang="en-US" baseline="-25000" dirty="0">
+                <a:solidFill>
+                  <a:schemeClr val="tx2">
+                    <a:lumMod val="60000"/>
+                    <a:lumOff val="40000"/>
+                  </a:schemeClr>
+                </a:solidFill>
+                <a:latin typeface="Helvetica"/>
+                <a:cs typeface="Helvetica"/>
+              </a:rPr>
+              <a:t>2</a:t>
+            </a:r>
+            <a:endParaRPr lang="en-US" dirty="0" smtClean="0">
+              <a:solidFill>
+                <a:schemeClr val="tx2">
+                  <a:lumMod val="60000"/>
+                  <a:lumOff val="40000"/>
+                </a:schemeClr>
+              </a:solidFill>
+              <a:latin typeface="Helvetica"/>
+              <a:cs typeface="Helvetica"/>
+            </a:endParaRPr>
+          </a:p>
+        </p:txBody>
+      </p:sp>
+      <p:sp>
+        <p:nvSpPr>
+          <p:cNvPr id="117" name="TextBox 116"/>
+          <p:cNvSpPr txBox="1"/>
+          <p:nvPr/>
+        </p:nvSpPr>
+        <p:spPr>
+          <a:xfrm>
+            <a:off x="4326032" y="3703735"/>
+            <a:ext cx="436951" cy="369332"/>
+          </a:xfrm>
+          <a:prstGeom prst="rect">
+            <a:avLst/>
+          </a:prstGeom>
+          <a:noFill/>
+        </p:spPr>
+        <p:txBody>
+          <a:bodyPr wrap="none" rtlCol="0">
+            <a:spAutoFit/>
+          </a:bodyPr>
+          <a:lstStyle/>
+          <a:p>
+            <a:r>
+              <a:rPr lang="en-US" dirty="0" smtClean="0">
+                <a:solidFill>
+                  <a:schemeClr val="tx2">
+                    <a:lumMod val="60000"/>
+                    <a:lumOff val="40000"/>
+                  </a:schemeClr>
+                </a:solidFill>
+                <a:latin typeface="Helvetica"/>
+                <a:cs typeface="Helvetica"/>
+              </a:rPr>
+              <a:t>R</a:t>
+            </a:r>
+            <a:r>
+              <a:rPr lang="en-US" baseline="-25000" dirty="0" smtClean="0">
+                <a:solidFill>
+                  <a:schemeClr val="tx2">
+                    <a:lumMod val="60000"/>
+                    <a:lumOff val="40000"/>
+                  </a:schemeClr>
+                </a:solidFill>
+                <a:latin typeface="Helvetica"/>
+                <a:cs typeface="Helvetica"/>
+              </a:rPr>
+              <a:t>0</a:t>
+            </a:r>
+            <a:endParaRPr lang="en-US" baseline="-25000" dirty="0">
+              <a:solidFill>
+                <a:schemeClr val="tx2">
+                  <a:lumMod val="60000"/>
+                  <a:lumOff val="40000"/>
+                </a:schemeClr>
+              </a:solidFill>
               <a:latin typeface="Helvetica"/>
               <a:cs typeface="Helvetica"/>
             </a:endParaRPr>

</xml_diff>

<commit_message>
rewrote prefix match section
</commit_message>
<xml_diff>
--- a/doc/cr/fig/rangeopts.pptx
+++ b/doc/cr/fig/rangeopts.pptx
@@ -5,11 +5,12 @@
     <p:sldMasterId id="2147483648" r:id="rId1"/>
   </p:sldMasterIdLst>
   <p:notesMasterIdLst>
-    <p:notesMasterId r:id="rId4"/>
+    <p:notesMasterId r:id="rId5"/>
   </p:notesMasterIdLst>
   <p:sldIdLst>
     <p:sldId id="256" r:id="rId2"/>
     <p:sldId id="257" r:id="rId3"/>
+    <p:sldId id="258" r:id="rId4"/>
   </p:sldIdLst>
   <p:sldSz cx="9144000" cy="6858000" type="screen4x3"/>
   <p:notesSz cx="6858000" cy="9144000"/>
@@ -108,6 +109,22 @@
       </a:defRPr>
     </a:lvl9pPr>
   </p:defaultTextStyle>
+  <p:extLst>
+    <p:ext uri="{EFAFB233-063F-42B5-8137-9DF3F51BA10A}">
+      <p15:sldGuideLst xmlns:p15="http://schemas.microsoft.com/office/powerpoint/2012/main">
+        <p15:guide id="1" orient="horz" pos="3878">
+          <p15:clr>
+            <a:srgbClr val="A4A3A4"/>
+          </p15:clr>
+        </p15:guide>
+        <p15:guide id="2" pos="5759">
+          <p15:clr>
+            <a:srgbClr val="A4A3A4"/>
+          </p15:clr>
+        </p15:guide>
+      </p15:sldGuideLst>
+    </p:ext>
+  </p:extLst>
 </p:presentation>
 </file>
 
@@ -193,7 +210,7 @@
           <a:p>
             <a:fld id="{A3BA0E75-03DD-AA41-809E-9EBE88800E47}" type="datetimeFigureOut">
               <a:rPr lang="en-US" smtClean="0"/>
-              <a:t>1/30/16</a:t>
+              <a:t>2/6/16</a:t>
             </a:fld>
             <a:endParaRPr lang="en-US"/>
           </a:p>
@@ -629,6 +646,90 @@
 </p:notes>
 </file>
 
+<file path=ppt/notesSlides/notesSlide3.xml><?xml version="1.0" encoding="utf-8"?>
+<p:notes xmlns:a="http://schemas.openxmlformats.org/drawingml/2006/main" xmlns:r="http://schemas.openxmlformats.org/officeDocument/2006/relationships" xmlns:p="http://schemas.openxmlformats.org/presentationml/2006/main">
+  <p:cSld>
+    <p:spTree>
+      <p:nvGrpSpPr>
+        <p:cNvPr id="1" name=""/>
+        <p:cNvGrpSpPr/>
+        <p:nvPr/>
+      </p:nvGrpSpPr>
+      <p:grpSpPr>
+        <a:xfrm>
+          <a:off x="0" y="0"/>
+          <a:ext cx="0" cy="0"/>
+          <a:chOff x="0" y="0"/>
+          <a:chExt cx="0" cy="0"/>
+        </a:xfrm>
+      </p:grpSpPr>
+      <p:sp>
+        <p:nvSpPr>
+          <p:cNvPr id="2" name="Slide Image Placeholder 1"/>
+          <p:cNvSpPr>
+            <a:spLocks noGrp="1" noRot="1" noChangeAspect="1"/>
+          </p:cNvSpPr>
+          <p:nvPr>
+            <p:ph type="sldImg"/>
+          </p:nvPr>
+        </p:nvSpPr>
+        <p:spPr/>
+      </p:sp>
+      <p:sp>
+        <p:nvSpPr>
+          <p:cNvPr id="3" name="Notes Placeholder 2"/>
+          <p:cNvSpPr>
+            <a:spLocks noGrp="1"/>
+          </p:cNvSpPr>
+          <p:nvPr>
+            <p:ph type="body" idx="1"/>
+          </p:nvPr>
+        </p:nvSpPr>
+        <p:spPr/>
+        <p:txBody>
+          <a:bodyPr/>
+          <a:lstStyle/>
+          <a:p>
+            <a:endParaRPr lang="en-US" dirty="0"/>
+          </a:p>
+        </p:txBody>
+      </p:sp>
+      <p:sp>
+        <p:nvSpPr>
+          <p:cNvPr id="4" name="Slide Number Placeholder 3"/>
+          <p:cNvSpPr>
+            <a:spLocks noGrp="1"/>
+          </p:cNvSpPr>
+          <p:nvPr>
+            <p:ph type="sldNum" sz="quarter" idx="10"/>
+          </p:nvPr>
+        </p:nvSpPr>
+        <p:spPr/>
+        <p:txBody>
+          <a:bodyPr/>
+          <a:lstStyle/>
+          <a:p>
+            <a:fld id="{05911EE1-F41E-3F42-9F27-2C31B6DC382D}" type="slidenum">
+              <a:rPr lang="en-US" smtClean="0"/>
+              <a:t>3</a:t>
+            </a:fld>
+            <a:endParaRPr lang="en-US"/>
+          </a:p>
+        </p:txBody>
+      </p:sp>
+    </p:spTree>
+    <p:extLst>
+      <p:ext uri="{BB962C8B-B14F-4D97-AF65-F5344CB8AC3E}">
+        <p14:creationId xmlns:p14="http://schemas.microsoft.com/office/powerpoint/2010/main" val="659387814"/>
+      </p:ext>
+    </p:extLst>
+  </p:cSld>
+  <p:clrMapOvr>
+    <a:masterClrMapping/>
+  </p:clrMapOvr>
+</p:notes>
+</file>
+
 <file path=ppt/slideLayouts/slideLayout1.xml><?xml version="1.0" encoding="utf-8"?>
 <p:sldLayout xmlns:a="http://schemas.openxmlformats.org/drawingml/2006/main" xmlns:r="http://schemas.openxmlformats.org/officeDocument/2006/relationships" xmlns:p="http://schemas.openxmlformats.org/presentationml/2006/main" type="title" preserve="1">
   <p:cSld name="Title Slide">
@@ -810,7 +911,7 @@
           <a:p>
             <a:fld id="{CD6DB08C-E64A-724A-8604-E954791B8CDC}" type="datetimeFigureOut">
               <a:rPr lang="en-US" smtClean="0"/>
-              <a:t>1/30/16</a:t>
+              <a:t>2/6/16</a:t>
             </a:fld>
             <a:endParaRPr lang="en-US"/>
           </a:p>
@@ -980,7 +1081,7 @@
           <a:p>
             <a:fld id="{CD6DB08C-E64A-724A-8604-E954791B8CDC}" type="datetimeFigureOut">
               <a:rPr lang="en-US" smtClean="0"/>
-              <a:t>1/30/16</a:t>
+              <a:t>2/6/16</a:t>
             </a:fld>
             <a:endParaRPr lang="en-US"/>
           </a:p>
@@ -1160,7 +1261,7 @@
           <a:p>
             <a:fld id="{CD6DB08C-E64A-724A-8604-E954791B8CDC}" type="datetimeFigureOut">
               <a:rPr lang="en-US" smtClean="0"/>
-              <a:t>1/30/16</a:t>
+              <a:t>2/6/16</a:t>
             </a:fld>
             <a:endParaRPr lang="en-US"/>
           </a:p>
@@ -1330,7 +1431,7 @@
           <a:p>
             <a:fld id="{CD6DB08C-E64A-724A-8604-E954791B8CDC}" type="datetimeFigureOut">
               <a:rPr lang="en-US" smtClean="0"/>
-              <a:t>1/30/16</a:t>
+              <a:t>2/6/16</a:t>
             </a:fld>
             <a:endParaRPr lang="en-US"/>
           </a:p>
@@ -1576,7 +1677,7 @@
           <a:p>
             <a:fld id="{CD6DB08C-E64A-724A-8604-E954791B8CDC}" type="datetimeFigureOut">
               <a:rPr lang="en-US" smtClean="0"/>
-              <a:t>1/30/16</a:t>
+              <a:t>2/6/16</a:t>
             </a:fld>
             <a:endParaRPr lang="en-US"/>
           </a:p>
@@ -1864,7 +1965,7 @@
           <a:p>
             <a:fld id="{CD6DB08C-E64A-724A-8604-E954791B8CDC}" type="datetimeFigureOut">
               <a:rPr lang="en-US" smtClean="0"/>
-              <a:t>1/30/16</a:t>
+              <a:t>2/6/16</a:t>
             </a:fld>
             <a:endParaRPr lang="en-US"/>
           </a:p>
@@ -2286,7 +2387,7 @@
           <a:p>
             <a:fld id="{CD6DB08C-E64A-724A-8604-E954791B8CDC}" type="datetimeFigureOut">
               <a:rPr lang="en-US" smtClean="0"/>
-              <a:t>1/30/16</a:t>
+              <a:t>2/6/16</a:t>
             </a:fld>
             <a:endParaRPr lang="en-US"/>
           </a:p>
@@ -2404,7 +2505,7 @@
           <a:p>
             <a:fld id="{CD6DB08C-E64A-724A-8604-E954791B8CDC}" type="datetimeFigureOut">
               <a:rPr lang="en-US" smtClean="0"/>
-              <a:t>1/30/16</a:t>
+              <a:t>2/6/16</a:t>
             </a:fld>
             <a:endParaRPr lang="en-US"/>
           </a:p>
@@ -2499,7 +2600,7 @@
           <a:p>
             <a:fld id="{CD6DB08C-E64A-724A-8604-E954791B8CDC}" type="datetimeFigureOut">
               <a:rPr lang="en-US" smtClean="0"/>
-              <a:t>1/30/16</a:t>
+              <a:t>2/6/16</a:t>
             </a:fld>
             <a:endParaRPr lang="en-US"/>
           </a:p>
@@ -2776,7 +2877,7 @@
           <a:p>
             <a:fld id="{CD6DB08C-E64A-724A-8604-E954791B8CDC}" type="datetimeFigureOut">
               <a:rPr lang="en-US" smtClean="0"/>
-              <a:t>1/30/16</a:t>
+              <a:t>2/6/16</a:t>
             </a:fld>
             <a:endParaRPr lang="en-US"/>
           </a:p>
@@ -3029,7 +3130,7 @@
           <a:p>
             <a:fld id="{CD6DB08C-E64A-724A-8604-E954791B8CDC}" type="datetimeFigureOut">
               <a:rPr lang="en-US" smtClean="0"/>
-              <a:t>1/30/16</a:t>
+              <a:t>2/6/16</a:t>
             </a:fld>
             <a:endParaRPr lang="en-US"/>
           </a:p>
@@ -3242,7 +3343,7 @@
           <a:p>
             <a:fld id="{CD6DB08C-E64A-724A-8604-E954791B8CDC}" type="datetimeFigureOut">
               <a:rPr lang="en-US" smtClean="0"/>
-              <a:t>1/30/16</a:t>
+              <a:t>2/6/16</a:t>
             </a:fld>
             <a:endParaRPr lang="en-US"/>
           </a:p>
@@ -7163,6 +7264,1236 @@
               </a:rPr>
               <a:t>0</a:t>
             </a:r>
+          </a:p>
+        </p:txBody>
+      </p:sp>
+      <p:cxnSp>
+        <p:nvCxnSpPr>
+          <p:cNvPr id="61" name="Straight Connector 60"/>
+          <p:cNvCxnSpPr/>
+          <p:nvPr/>
+        </p:nvCxnSpPr>
+        <p:spPr>
+          <a:xfrm>
+            <a:off x="1074820" y="5873235"/>
+            <a:ext cx="6747084" cy="0"/>
+          </a:xfrm>
+          <a:prstGeom prst="line">
+            <a:avLst/>
+          </a:prstGeom>
+          <a:effectLst/>
+        </p:spPr>
+        <p:style>
+          <a:lnRef idx="3">
+            <a:schemeClr val="dk1"/>
+          </a:lnRef>
+          <a:fillRef idx="0">
+            <a:schemeClr val="dk1"/>
+          </a:fillRef>
+          <a:effectRef idx="2">
+            <a:schemeClr val="dk1"/>
+          </a:effectRef>
+          <a:fontRef idx="minor">
+            <a:schemeClr val="tx1"/>
+          </a:fontRef>
+        </p:style>
+      </p:cxnSp>
+      <p:cxnSp>
+        <p:nvCxnSpPr>
+          <p:cNvPr id="62" name="Straight Connector 61"/>
+          <p:cNvCxnSpPr/>
+          <p:nvPr/>
+        </p:nvCxnSpPr>
+        <p:spPr>
+          <a:xfrm>
+            <a:off x="7826884" y="5725813"/>
+            <a:ext cx="0" cy="293459"/>
+          </a:xfrm>
+          <a:prstGeom prst="line">
+            <a:avLst/>
+          </a:prstGeom>
+          <a:effectLst/>
+        </p:spPr>
+        <p:style>
+          <a:lnRef idx="3">
+            <a:schemeClr val="dk1"/>
+          </a:lnRef>
+          <a:fillRef idx="0">
+            <a:schemeClr val="dk1"/>
+          </a:fillRef>
+          <a:effectRef idx="2">
+            <a:schemeClr val="dk1"/>
+          </a:effectRef>
+          <a:fontRef idx="minor">
+            <a:schemeClr val="tx1"/>
+          </a:fontRef>
+        </p:style>
+      </p:cxnSp>
+      <p:cxnSp>
+        <p:nvCxnSpPr>
+          <p:cNvPr id="63" name="Straight Connector 62"/>
+          <p:cNvCxnSpPr/>
+          <p:nvPr/>
+        </p:nvCxnSpPr>
+        <p:spPr>
+          <a:xfrm>
+            <a:off x="1073445" y="5731483"/>
+            <a:ext cx="0" cy="293459"/>
+          </a:xfrm>
+          <a:prstGeom prst="line">
+            <a:avLst/>
+          </a:prstGeom>
+          <a:effectLst/>
+        </p:spPr>
+        <p:style>
+          <a:lnRef idx="3">
+            <a:schemeClr val="dk1"/>
+          </a:lnRef>
+          <a:fillRef idx="0">
+            <a:schemeClr val="dk1"/>
+          </a:fillRef>
+          <a:effectRef idx="2">
+            <a:schemeClr val="dk1"/>
+          </a:effectRef>
+          <a:fontRef idx="minor">
+            <a:schemeClr val="tx1"/>
+          </a:fontRef>
+        </p:style>
+      </p:cxnSp>
+      <p:sp>
+        <p:nvSpPr>
+          <p:cNvPr id="69" name="TextBox 68"/>
+          <p:cNvSpPr txBox="1"/>
+          <p:nvPr/>
+        </p:nvSpPr>
+        <p:spPr>
+          <a:xfrm>
+            <a:off x="922373" y="5957210"/>
+            <a:ext cx="313044" cy="369332"/>
+          </a:xfrm>
+          <a:prstGeom prst="rect">
+            <a:avLst/>
+          </a:prstGeom>
+          <a:noFill/>
+        </p:spPr>
+        <p:txBody>
+          <a:bodyPr wrap="none" rtlCol="0">
+            <a:spAutoFit/>
+          </a:bodyPr>
+          <a:lstStyle/>
+          <a:p>
+            <a:r>
+              <a:rPr lang="en-US" dirty="0" smtClean="0">
+                <a:latin typeface="Helvetica"/>
+                <a:cs typeface="Helvetica"/>
+              </a:rPr>
+              <a:t>0</a:t>
+            </a:r>
+            <a:endParaRPr lang="en-US" baseline="-25000" dirty="0">
+              <a:latin typeface="Helvetica"/>
+              <a:cs typeface="Helvetica"/>
+            </a:endParaRPr>
+          </a:p>
+        </p:txBody>
+      </p:sp>
+      <p:sp>
+        <p:nvSpPr>
+          <p:cNvPr id="72" name="TextBox 71"/>
+          <p:cNvSpPr txBox="1"/>
+          <p:nvPr/>
+        </p:nvSpPr>
+        <p:spPr>
+          <a:xfrm>
+            <a:off x="7417568" y="6022320"/>
+            <a:ext cx="826556" cy="369332"/>
+          </a:xfrm>
+          <a:prstGeom prst="rect">
+            <a:avLst/>
+          </a:prstGeom>
+          <a:noFill/>
+        </p:spPr>
+        <p:txBody>
+          <a:bodyPr wrap="none" rtlCol="0">
+            <a:spAutoFit/>
+          </a:bodyPr>
+          <a:lstStyle/>
+          <a:p>
+            <a:r>
+              <a:rPr lang="en-US" dirty="0" smtClean="0">
+                <a:latin typeface="Helvetica"/>
+                <a:cs typeface="Helvetica"/>
+              </a:rPr>
+              <a:t>65536</a:t>
+            </a:r>
+            <a:endParaRPr lang="en-US" baseline="-25000" dirty="0">
+              <a:latin typeface="Helvetica"/>
+              <a:cs typeface="Helvetica"/>
+            </a:endParaRPr>
+          </a:p>
+        </p:txBody>
+      </p:sp>
+      <p:cxnSp>
+        <p:nvCxnSpPr>
+          <p:cNvPr id="81" name="Straight Connector 80"/>
+          <p:cNvCxnSpPr/>
+          <p:nvPr/>
+        </p:nvCxnSpPr>
+        <p:spPr>
+          <a:xfrm>
+            <a:off x="1070160" y="4303226"/>
+            <a:ext cx="9640" cy="1377458"/>
+          </a:xfrm>
+          <a:prstGeom prst="line">
+            <a:avLst/>
+          </a:prstGeom>
+          <a:ln w="28575" cmpd="sng">
+            <a:prstDash val="sysDash"/>
+          </a:ln>
+          <a:effectLst/>
+        </p:spPr>
+        <p:style>
+          <a:lnRef idx="3">
+            <a:schemeClr val="dk1"/>
+          </a:lnRef>
+          <a:fillRef idx="0">
+            <a:schemeClr val="dk1"/>
+          </a:fillRef>
+          <a:effectRef idx="2">
+            <a:schemeClr val="dk1"/>
+          </a:effectRef>
+          <a:fontRef idx="minor">
+            <a:schemeClr val="tx1"/>
+          </a:fontRef>
+        </p:style>
+      </p:cxnSp>
+      <p:cxnSp>
+        <p:nvCxnSpPr>
+          <p:cNvPr id="82" name="Straight Connector 81"/>
+          <p:cNvCxnSpPr/>
+          <p:nvPr/>
+        </p:nvCxnSpPr>
+        <p:spPr>
+          <a:xfrm>
+            <a:off x="3345403" y="5160085"/>
+            <a:ext cx="946850" cy="0"/>
+          </a:xfrm>
+          <a:prstGeom prst="line">
+            <a:avLst/>
+          </a:prstGeom>
+          <a:effectLst/>
+        </p:spPr>
+        <p:style>
+          <a:lnRef idx="3">
+            <a:schemeClr val="dk1"/>
+          </a:lnRef>
+          <a:fillRef idx="0">
+            <a:schemeClr val="dk1"/>
+          </a:fillRef>
+          <a:effectRef idx="2">
+            <a:schemeClr val="dk1"/>
+          </a:effectRef>
+          <a:fontRef idx="minor">
+            <a:schemeClr val="tx1"/>
+          </a:fontRef>
+        </p:style>
+      </p:cxnSp>
+      <p:cxnSp>
+        <p:nvCxnSpPr>
+          <p:cNvPr id="83" name="Straight Connector 82"/>
+          <p:cNvCxnSpPr/>
+          <p:nvPr/>
+        </p:nvCxnSpPr>
+        <p:spPr>
+          <a:xfrm>
+            <a:off x="3345403" y="5012663"/>
+            <a:ext cx="0" cy="293459"/>
+          </a:xfrm>
+          <a:prstGeom prst="line">
+            <a:avLst/>
+          </a:prstGeom>
+          <a:effectLst/>
+        </p:spPr>
+        <p:style>
+          <a:lnRef idx="3">
+            <a:schemeClr val="dk1"/>
+          </a:lnRef>
+          <a:fillRef idx="0">
+            <a:schemeClr val="dk1"/>
+          </a:fillRef>
+          <a:effectRef idx="2">
+            <a:schemeClr val="dk1"/>
+          </a:effectRef>
+          <a:fontRef idx="minor">
+            <a:schemeClr val="tx1"/>
+          </a:fontRef>
+        </p:style>
+      </p:cxnSp>
+      <p:cxnSp>
+        <p:nvCxnSpPr>
+          <p:cNvPr id="84" name="Straight Connector 83"/>
+          <p:cNvCxnSpPr/>
+          <p:nvPr/>
+        </p:nvCxnSpPr>
+        <p:spPr>
+          <a:xfrm>
+            <a:off x="4302102" y="5018333"/>
+            <a:ext cx="0" cy="293459"/>
+          </a:xfrm>
+          <a:prstGeom prst="line">
+            <a:avLst/>
+          </a:prstGeom>
+          <a:effectLst/>
+        </p:spPr>
+        <p:style>
+          <a:lnRef idx="3">
+            <a:schemeClr val="dk1"/>
+          </a:lnRef>
+          <a:fillRef idx="0">
+            <a:schemeClr val="dk1"/>
+          </a:fillRef>
+          <a:effectRef idx="2">
+            <a:schemeClr val="dk1"/>
+          </a:effectRef>
+          <a:fontRef idx="minor">
+            <a:schemeClr val="tx1"/>
+          </a:fontRef>
+        </p:style>
+      </p:cxnSp>
+      <p:sp>
+        <p:nvSpPr>
+          <p:cNvPr id="85" name="TextBox 84"/>
+          <p:cNvSpPr txBox="1"/>
+          <p:nvPr/>
+        </p:nvSpPr>
+        <p:spPr>
+          <a:xfrm>
+            <a:off x="2879951" y="4905400"/>
+            <a:ext cx="471253" cy="369332"/>
+          </a:xfrm>
+          <a:prstGeom prst="rect">
+            <a:avLst/>
+          </a:prstGeom>
+          <a:noFill/>
+        </p:spPr>
+        <p:txBody>
+          <a:bodyPr wrap="none" rtlCol="0">
+            <a:spAutoFit/>
+          </a:bodyPr>
+          <a:lstStyle/>
+          <a:p>
+            <a:r>
+              <a:rPr lang="en-US" dirty="0" smtClean="0">
+                <a:latin typeface="Helvetica"/>
+                <a:cs typeface="Helvetica"/>
+              </a:rPr>
+              <a:t>s</a:t>
+            </a:r>
+            <a:r>
+              <a:rPr lang="en-US" baseline="-25000" dirty="0" smtClean="0">
+                <a:latin typeface="Helvetica"/>
+                <a:cs typeface="Helvetica"/>
+              </a:rPr>
+              <a:t>12</a:t>
+            </a:r>
+            <a:endParaRPr lang="en-US" baseline="-25000" dirty="0">
+              <a:latin typeface="Helvetica"/>
+              <a:cs typeface="Helvetica"/>
+            </a:endParaRPr>
+          </a:p>
+        </p:txBody>
+      </p:sp>
+      <p:sp>
+        <p:nvSpPr>
+          <p:cNvPr id="90" name="TextBox 89"/>
+          <p:cNvSpPr txBox="1"/>
+          <p:nvPr/>
+        </p:nvSpPr>
+        <p:spPr>
+          <a:xfrm>
+            <a:off x="4326032" y="4940863"/>
+            <a:ext cx="484215" cy="369332"/>
+          </a:xfrm>
+          <a:prstGeom prst="rect">
+            <a:avLst/>
+          </a:prstGeom>
+          <a:noFill/>
+        </p:spPr>
+        <p:txBody>
+          <a:bodyPr wrap="none" rtlCol="0">
+            <a:spAutoFit/>
+          </a:bodyPr>
+          <a:lstStyle/>
+          <a:p>
+            <a:r>
+              <a:rPr lang="en-US" dirty="0" smtClean="0">
+                <a:latin typeface="Helvetica"/>
+                <a:cs typeface="Helvetica"/>
+              </a:rPr>
+              <a:t>e</a:t>
+            </a:r>
+            <a:r>
+              <a:rPr lang="en-US" baseline="-25000" dirty="0" smtClean="0">
+                <a:latin typeface="Helvetica"/>
+                <a:cs typeface="Helvetica"/>
+              </a:rPr>
+              <a:t>12</a:t>
+            </a:r>
+            <a:endParaRPr lang="en-US" baseline="-25000" dirty="0">
+              <a:latin typeface="Helvetica"/>
+              <a:cs typeface="Helvetica"/>
+            </a:endParaRPr>
+          </a:p>
+        </p:txBody>
+      </p:sp>
+      <p:cxnSp>
+        <p:nvCxnSpPr>
+          <p:cNvPr id="91" name="Straight Connector 90"/>
+          <p:cNvCxnSpPr/>
+          <p:nvPr/>
+        </p:nvCxnSpPr>
+        <p:spPr>
+          <a:xfrm>
+            <a:off x="4807102" y="4644193"/>
+            <a:ext cx="3021157" cy="0"/>
+          </a:xfrm>
+          <a:prstGeom prst="line">
+            <a:avLst/>
+          </a:prstGeom>
+          <a:effectLst/>
+        </p:spPr>
+        <p:style>
+          <a:lnRef idx="3">
+            <a:schemeClr val="dk1"/>
+          </a:lnRef>
+          <a:fillRef idx="0">
+            <a:schemeClr val="dk1"/>
+          </a:fillRef>
+          <a:effectRef idx="2">
+            <a:schemeClr val="dk1"/>
+          </a:effectRef>
+          <a:fontRef idx="minor">
+            <a:schemeClr val="tx1"/>
+          </a:fontRef>
+        </p:style>
+      </p:cxnSp>
+      <p:cxnSp>
+        <p:nvCxnSpPr>
+          <p:cNvPr id="92" name="Straight Connector 91"/>
+          <p:cNvCxnSpPr/>
+          <p:nvPr/>
+        </p:nvCxnSpPr>
+        <p:spPr>
+          <a:xfrm>
+            <a:off x="4815699" y="4529167"/>
+            <a:ext cx="0" cy="293459"/>
+          </a:xfrm>
+          <a:prstGeom prst="line">
+            <a:avLst/>
+          </a:prstGeom>
+          <a:effectLst/>
+        </p:spPr>
+        <p:style>
+          <a:lnRef idx="3">
+            <a:schemeClr val="dk1"/>
+          </a:lnRef>
+          <a:fillRef idx="0">
+            <a:schemeClr val="dk1"/>
+          </a:fillRef>
+          <a:effectRef idx="2">
+            <a:schemeClr val="dk1"/>
+          </a:effectRef>
+          <a:fontRef idx="minor">
+            <a:schemeClr val="tx1"/>
+          </a:fontRef>
+        </p:style>
+      </p:cxnSp>
+      <p:cxnSp>
+        <p:nvCxnSpPr>
+          <p:cNvPr id="93" name="Straight Connector 92"/>
+          <p:cNvCxnSpPr/>
+          <p:nvPr/>
+        </p:nvCxnSpPr>
+        <p:spPr>
+          <a:xfrm>
+            <a:off x="7816805" y="4512234"/>
+            <a:ext cx="0" cy="293459"/>
+          </a:xfrm>
+          <a:prstGeom prst="line">
+            <a:avLst/>
+          </a:prstGeom>
+          <a:effectLst/>
+        </p:spPr>
+        <p:style>
+          <a:lnRef idx="3">
+            <a:schemeClr val="dk1"/>
+          </a:lnRef>
+          <a:fillRef idx="0">
+            <a:schemeClr val="dk1"/>
+          </a:fillRef>
+          <a:effectRef idx="2">
+            <a:schemeClr val="dk1"/>
+          </a:effectRef>
+          <a:fontRef idx="minor">
+            <a:schemeClr val="tx1"/>
+          </a:fontRef>
+        </p:style>
+      </p:cxnSp>
+      <p:sp>
+        <p:nvSpPr>
+          <p:cNvPr id="94" name="TextBox 93"/>
+          <p:cNvSpPr txBox="1"/>
+          <p:nvPr/>
+        </p:nvSpPr>
+        <p:spPr>
+          <a:xfrm>
+            <a:off x="4355927" y="4458623"/>
+            <a:ext cx="471253" cy="369332"/>
+          </a:xfrm>
+          <a:prstGeom prst="rect">
+            <a:avLst/>
+          </a:prstGeom>
+          <a:noFill/>
+        </p:spPr>
+        <p:txBody>
+          <a:bodyPr wrap="none" rtlCol="0">
+            <a:spAutoFit/>
+          </a:bodyPr>
+          <a:lstStyle/>
+          <a:p>
+            <a:r>
+              <a:rPr lang="en-US" dirty="0" smtClean="0">
+                <a:latin typeface="Helvetica"/>
+                <a:cs typeface="Helvetica"/>
+              </a:rPr>
+              <a:t>s</a:t>
+            </a:r>
+            <a:r>
+              <a:rPr lang="en-US" baseline="-25000" dirty="0" smtClean="0">
+                <a:latin typeface="Helvetica"/>
+                <a:cs typeface="Helvetica"/>
+              </a:rPr>
+              <a:t>22</a:t>
+            </a:r>
+            <a:endParaRPr lang="en-US" baseline="-25000" dirty="0">
+              <a:latin typeface="Helvetica"/>
+              <a:cs typeface="Helvetica"/>
+            </a:endParaRPr>
+          </a:p>
+        </p:txBody>
+      </p:sp>
+      <p:sp>
+        <p:nvSpPr>
+          <p:cNvPr id="95" name="TextBox 94"/>
+          <p:cNvSpPr txBox="1"/>
+          <p:nvPr/>
+        </p:nvSpPr>
+        <p:spPr>
+          <a:xfrm>
+            <a:off x="7777266" y="4478368"/>
+            <a:ext cx="484215" cy="369332"/>
+          </a:xfrm>
+          <a:prstGeom prst="rect">
+            <a:avLst/>
+          </a:prstGeom>
+          <a:noFill/>
+        </p:spPr>
+        <p:txBody>
+          <a:bodyPr wrap="none" rtlCol="0">
+            <a:spAutoFit/>
+          </a:bodyPr>
+          <a:lstStyle/>
+          <a:p>
+            <a:r>
+              <a:rPr lang="en-US" dirty="0" smtClean="0">
+                <a:latin typeface="Helvetica"/>
+                <a:cs typeface="Helvetica"/>
+              </a:rPr>
+              <a:t>e</a:t>
+            </a:r>
+            <a:r>
+              <a:rPr lang="en-US" baseline="-25000" dirty="0" smtClean="0">
+                <a:latin typeface="Helvetica"/>
+                <a:cs typeface="Helvetica"/>
+              </a:rPr>
+              <a:t>22</a:t>
+            </a:r>
+            <a:endParaRPr lang="en-US" baseline="-25000" dirty="0">
+              <a:latin typeface="Helvetica"/>
+              <a:cs typeface="Helvetica"/>
+            </a:endParaRPr>
+          </a:p>
+        </p:txBody>
+      </p:sp>
+      <p:cxnSp>
+        <p:nvCxnSpPr>
+          <p:cNvPr id="96" name="Straight Connector 95"/>
+          <p:cNvCxnSpPr/>
+          <p:nvPr/>
+        </p:nvCxnSpPr>
+        <p:spPr>
+          <a:xfrm>
+            <a:off x="1079800" y="4100768"/>
+            <a:ext cx="6747084" cy="0"/>
+          </a:xfrm>
+          <a:prstGeom prst="line">
+            <a:avLst/>
+          </a:prstGeom>
+          <a:effectLst/>
+        </p:spPr>
+        <p:style>
+          <a:lnRef idx="3">
+            <a:schemeClr val="dk1"/>
+          </a:lnRef>
+          <a:fillRef idx="0">
+            <a:schemeClr val="dk1"/>
+          </a:fillRef>
+          <a:effectRef idx="2">
+            <a:schemeClr val="dk1"/>
+          </a:effectRef>
+          <a:fontRef idx="minor">
+            <a:schemeClr val="tx1"/>
+          </a:fontRef>
+        </p:style>
+      </p:cxnSp>
+      <p:cxnSp>
+        <p:nvCxnSpPr>
+          <p:cNvPr id="97" name="Straight Connector 96"/>
+          <p:cNvCxnSpPr/>
+          <p:nvPr/>
+        </p:nvCxnSpPr>
+        <p:spPr>
+          <a:xfrm>
+            <a:off x="1069217" y="3954038"/>
+            <a:ext cx="0" cy="293459"/>
+          </a:xfrm>
+          <a:prstGeom prst="line">
+            <a:avLst/>
+          </a:prstGeom>
+          <a:effectLst/>
+        </p:spPr>
+        <p:style>
+          <a:lnRef idx="3">
+            <a:schemeClr val="dk1"/>
+          </a:lnRef>
+          <a:fillRef idx="0">
+            <a:schemeClr val="dk1"/>
+          </a:fillRef>
+          <a:effectRef idx="2">
+            <a:schemeClr val="dk1"/>
+          </a:effectRef>
+          <a:fontRef idx="minor">
+            <a:schemeClr val="tx1"/>
+          </a:fontRef>
+        </p:style>
+      </p:cxnSp>
+      <p:cxnSp>
+        <p:nvCxnSpPr>
+          <p:cNvPr id="98" name="Straight Connector 97"/>
+          <p:cNvCxnSpPr/>
+          <p:nvPr/>
+        </p:nvCxnSpPr>
+        <p:spPr>
+          <a:xfrm>
+            <a:off x="3350383" y="4258837"/>
+            <a:ext cx="0" cy="738410"/>
+          </a:xfrm>
+          <a:prstGeom prst="line">
+            <a:avLst/>
+          </a:prstGeom>
+          <a:ln w="28575" cmpd="sng">
+            <a:prstDash val="sysDash"/>
+          </a:ln>
+          <a:effectLst/>
+        </p:spPr>
+        <p:style>
+          <a:lnRef idx="3">
+            <a:schemeClr val="dk1"/>
+          </a:lnRef>
+          <a:fillRef idx="0">
+            <a:schemeClr val="dk1"/>
+          </a:fillRef>
+          <a:effectRef idx="2">
+            <a:schemeClr val="dk1"/>
+          </a:effectRef>
+          <a:fontRef idx="minor">
+            <a:schemeClr val="tx1"/>
+          </a:fontRef>
+        </p:style>
+      </p:cxnSp>
+      <p:cxnSp>
+        <p:nvCxnSpPr>
+          <p:cNvPr id="99" name="Straight Connector 98"/>
+          <p:cNvCxnSpPr/>
+          <p:nvPr/>
+        </p:nvCxnSpPr>
+        <p:spPr>
+          <a:xfrm>
+            <a:off x="4817685" y="4242496"/>
+            <a:ext cx="0" cy="496025"/>
+          </a:xfrm>
+          <a:prstGeom prst="line">
+            <a:avLst/>
+          </a:prstGeom>
+          <a:ln w="28575" cmpd="sng">
+            <a:prstDash val="sysDash"/>
+          </a:ln>
+          <a:effectLst/>
+        </p:spPr>
+        <p:style>
+          <a:lnRef idx="3">
+            <a:schemeClr val="dk1"/>
+          </a:lnRef>
+          <a:fillRef idx="0">
+            <a:schemeClr val="dk1"/>
+          </a:fillRef>
+          <a:effectRef idx="2">
+            <a:schemeClr val="dk1"/>
+          </a:effectRef>
+          <a:fontRef idx="minor">
+            <a:schemeClr val="tx1"/>
+          </a:fontRef>
+        </p:style>
+      </p:cxnSp>
+      <p:cxnSp>
+        <p:nvCxnSpPr>
+          <p:cNvPr id="100" name="Straight Connector 99"/>
+          <p:cNvCxnSpPr/>
+          <p:nvPr/>
+        </p:nvCxnSpPr>
+        <p:spPr>
+          <a:xfrm>
+            <a:off x="7816805" y="4247497"/>
+            <a:ext cx="0" cy="396696"/>
+          </a:xfrm>
+          <a:prstGeom prst="line">
+            <a:avLst/>
+          </a:prstGeom>
+          <a:ln w="28575" cmpd="sng">
+            <a:prstDash val="sysDash"/>
+          </a:ln>
+          <a:effectLst/>
+        </p:spPr>
+        <p:style>
+          <a:lnRef idx="3">
+            <a:schemeClr val="dk1"/>
+          </a:lnRef>
+          <a:fillRef idx="0">
+            <a:schemeClr val="dk1"/>
+          </a:fillRef>
+          <a:effectRef idx="2">
+            <a:schemeClr val="dk1"/>
+          </a:effectRef>
+          <a:fontRef idx="minor">
+            <a:schemeClr val="tx1"/>
+          </a:fontRef>
+        </p:style>
+      </p:cxnSp>
+      <p:cxnSp>
+        <p:nvCxnSpPr>
+          <p:cNvPr id="101" name="Straight Connector 100"/>
+          <p:cNvCxnSpPr/>
+          <p:nvPr/>
+        </p:nvCxnSpPr>
+        <p:spPr>
+          <a:xfrm>
+            <a:off x="7826884" y="4268552"/>
+            <a:ext cx="0" cy="1406462"/>
+          </a:xfrm>
+          <a:prstGeom prst="line">
+            <a:avLst/>
+          </a:prstGeom>
+          <a:ln w="28575" cmpd="sng">
+            <a:prstDash val="sysDash"/>
+          </a:ln>
+          <a:effectLst/>
+        </p:spPr>
+        <p:style>
+          <a:lnRef idx="3">
+            <a:schemeClr val="dk1"/>
+          </a:lnRef>
+          <a:fillRef idx="0">
+            <a:schemeClr val="dk1"/>
+          </a:fillRef>
+          <a:effectRef idx="2">
+            <a:schemeClr val="dk1"/>
+          </a:effectRef>
+          <a:fontRef idx="minor">
+            <a:schemeClr val="tx1"/>
+          </a:fontRef>
+        </p:style>
+      </p:cxnSp>
+      <p:cxnSp>
+        <p:nvCxnSpPr>
+          <p:cNvPr id="102" name="Straight Connector 101"/>
+          <p:cNvCxnSpPr/>
+          <p:nvPr/>
+        </p:nvCxnSpPr>
+        <p:spPr>
+          <a:xfrm>
+            <a:off x="3345403" y="3959708"/>
+            <a:ext cx="0" cy="293459"/>
+          </a:xfrm>
+          <a:prstGeom prst="line">
+            <a:avLst/>
+          </a:prstGeom>
+          <a:effectLst/>
+        </p:spPr>
+        <p:style>
+          <a:lnRef idx="3">
+            <a:schemeClr val="dk1"/>
+          </a:lnRef>
+          <a:fillRef idx="0">
+            <a:schemeClr val="dk1"/>
+          </a:fillRef>
+          <a:effectRef idx="2">
+            <a:schemeClr val="dk1"/>
+          </a:effectRef>
+          <a:fontRef idx="minor">
+            <a:schemeClr val="tx1"/>
+          </a:fontRef>
+        </p:style>
+      </p:cxnSp>
+      <p:cxnSp>
+        <p:nvCxnSpPr>
+          <p:cNvPr id="103" name="Straight Connector 102"/>
+          <p:cNvCxnSpPr/>
+          <p:nvPr/>
+        </p:nvCxnSpPr>
+        <p:spPr>
+          <a:xfrm>
+            <a:off x="4817685" y="3949037"/>
+            <a:ext cx="0" cy="293459"/>
+          </a:xfrm>
+          <a:prstGeom prst="line">
+            <a:avLst/>
+          </a:prstGeom>
+          <a:effectLst/>
+        </p:spPr>
+        <p:style>
+          <a:lnRef idx="3">
+            <a:schemeClr val="dk1"/>
+          </a:lnRef>
+          <a:fillRef idx="0">
+            <a:schemeClr val="dk1"/>
+          </a:fillRef>
+          <a:effectRef idx="2">
+            <a:schemeClr val="dk1"/>
+          </a:effectRef>
+          <a:fontRef idx="minor">
+            <a:schemeClr val="tx1"/>
+          </a:fontRef>
+        </p:style>
+      </p:cxnSp>
+      <p:cxnSp>
+        <p:nvCxnSpPr>
+          <p:cNvPr id="104" name="Straight Connector 103"/>
+          <p:cNvCxnSpPr/>
+          <p:nvPr/>
+        </p:nvCxnSpPr>
+        <p:spPr>
+          <a:xfrm>
+            <a:off x="7816805" y="3949037"/>
+            <a:ext cx="0" cy="293459"/>
+          </a:xfrm>
+          <a:prstGeom prst="line">
+            <a:avLst/>
+          </a:prstGeom>
+          <a:effectLst/>
+        </p:spPr>
+        <p:style>
+          <a:lnRef idx="3">
+            <a:schemeClr val="dk1"/>
+          </a:lnRef>
+          <a:fillRef idx="0">
+            <a:schemeClr val="dk1"/>
+          </a:fillRef>
+          <a:effectRef idx="2">
+            <a:schemeClr val="dk1"/>
+          </a:effectRef>
+          <a:fontRef idx="minor">
+            <a:schemeClr val="tx1"/>
+          </a:fontRef>
+        </p:style>
+      </p:cxnSp>
+      <p:cxnSp>
+        <p:nvCxnSpPr>
+          <p:cNvPr id="105" name="Straight Connector 104"/>
+          <p:cNvCxnSpPr/>
+          <p:nvPr/>
+        </p:nvCxnSpPr>
+        <p:spPr>
+          <a:xfrm>
+            <a:off x="7821904" y="3959708"/>
+            <a:ext cx="0" cy="293459"/>
+          </a:xfrm>
+          <a:prstGeom prst="line">
+            <a:avLst/>
+          </a:prstGeom>
+          <a:effectLst/>
+        </p:spPr>
+        <p:style>
+          <a:lnRef idx="3">
+            <a:schemeClr val="dk1"/>
+          </a:lnRef>
+          <a:fillRef idx="0">
+            <a:schemeClr val="dk1"/>
+          </a:fillRef>
+          <a:effectRef idx="2">
+            <a:schemeClr val="dk1"/>
+          </a:effectRef>
+          <a:fontRef idx="minor">
+            <a:schemeClr val="tx1"/>
+          </a:fontRef>
+        </p:style>
+      </p:cxnSp>
+      <p:sp>
+        <p:nvSpPr>
+          <p:cNvPr id="106" name="TextBox 105"/>
+          <p:cNvSpPr txBox="1"/>
+          <p:nvPr/>
+        </p:nvSpPr>
+        <p:spPr>
+          <a:xfrm>
+            <a:off x="2814935" y="5289189"/>
+            <a:ext cx="2148207" cy="369332"/>
+          </a:xfrm>
+          <a:prstGeom prst="rect">
+            <a:avLst/>
+          </a:prstGeom>
+          <a:noFill/>
+        </p:spPr>
+        <p:txBody>
+          <a:bodyPr wrap="none" rtlCol="0">
+            <a:spAutoFit/>
+          </a:bodyPr>
+          <a:lstStyle/>
+          <a:p>
+            <a:r>
+              <a:rPr lang="en-US" dirty="0" smtClean="0">
+                <a:solidFill>
+                  <a:srgbClr val="FF0000"/>
+                </a:solidFill>
+                <a:latin typeface="Helvetica"/>
+                <a:cs typeface="Helvetica"/>
+              </a:rPr>
+              <a:t>17.0/8 (</a:t>
+            </a:r>
+            <a:r>
+              <a:rPr lang="is-IS" dirty="0" smtClean="0">
+                <a:solidFill>
+                  <a:srgbClr val="FF0000"/>
+                </a:solidFill>
+                <a:latin typeface="Helvetica"/>
+                <a:cs typeface="Helvetica"/>
+              </a:rPr>
+              <a:t>4352-4607</a:t>
+            </a:r>
+            <a:r>
+              <a:rPr lang="en-US" dirty="0" smtClean="0">
+                <a:solidFill>
+                  <a:srgbClr val="FF0000"/>
+                </a:solidFill>
+                <a:latin typeface="Helvetica"/>
+                <a:cs typeface="Helvetica"/>
+              </a:rPr>
+              <a:t>)</a:t>
+            </a:r>
+            <a:endParaRPr lang="en-US" baseline="-25000" dirty="0">
+              <a:solidFill>
+                <a:srgbClr val="FF0000"/>
+              </a:solidFill>
+              <a:latin typeface="Helvetica"/>
+              <a:cs typeface="Helvetica"/>
+            </a:endParaRPr>
+          </a:p>
+        </p:txBody>
+      </p:sp>
+      <p:sp>
+        <p:nvSpPr>
+          <p:cNvPr id="107" name="TextBox 106"/>
+          <p:cNvSpPr txBox="1"/>
+          <p:nvPr/>
+        </p:nvSpPr>
+        <p:spPr>
+          <a:xfrm>
+            <a:off x="5044164" y="4640833"/>
+            <a:ext cx="2404963" cy="369332"/>
+          </a:xfrm>
+          <a:prstGeom prst="rect">
+            <a:avLst/>
+          </a:prstGeom>
+          <a:noFill/>
+        </p:spPr>
+        <p:txBody>
+          <a:bodyPr wrap="none" rtlCol="0">
+            <a:spAutoFit/>
+          </a:bodyPr>
+          <a:lstStyle/>
+          <a:p>
+            <a:r>
+              <a:rPr lang="en-US" dirty="0" smtClean="0">
+                <a:solidFill>
+                  <a:srgbClr val="FF0000"/>
+                </a:solidFill>
+                <a:latin typeface="Helvetica"/>
+                <a:cs typeface="Helvetica"/>
+              </a:rPr>
+              <a:t>89.0/8 (22784-23039)</a:t>
+            </a:r>
+            <a:endParaRPr lang="en-US" baseline="-25000" dirty="0">
+              <a:solidFill>
+                <a:srgbClr val="FF0000"/>
+              </a:solidFill>
+              <a:latin typeface="Helvetica"/>
+              <a:cs typeface="Helvetica"/>
+            </a:endParaRPr>
+          </a:p>
+        </p:txBody>
+      </p:sp>
+      <p:sp>
+        <p:nvSpPr>
+          <p:cNvPr id="108" name="TextBox 107"/>
+          <p:cNvSpPr txBox="1"/>
+          <p:nvPr/>
+        </p:nvSpPr>
+        <p:spPr>
+          <a:xfrm>
+            <a:off x="3501757" y="5902192"/>
+            <a:ext cx="2533341" cy="369332"/>
+          </a:xfrm>
+          <a:prstGeom prst="rect">
+            <a:avLst/>
+          </a:prstGeom>
+          <a:noFill/>
+        </p:spPr>
+        <p:txBody>
+          <a:bodyPr wrap="none" rtlCol="0">
+            <a:spAutoFit/>
+          </a:bodyPr>
+          <a:lstStyle/>
+          <a:p>
+            <a:r>
+              <a:rPr lang="en-US" dirty="0" smtClean="0">
+                <a:solidFill>
+                  <a:srgbClr val="FF0000"/>
+                </a:solidFill>
+                <a:latin typeface="Helvetica"/>
+                <a:cs typeface="Helvetica"/>
+              </a:rPr>
+              <a:t>123.0/8 (31488-31743)</a:t>
+            </a:r>
+            <a:endParaRPr lang="en-US" baseline="-25000" dirty="0">
+              <a:solidFill>
+                <a:srgbClr val="FF0000"/>
+              </a:solidFill>
+              <a:latin typeface="Helvetica"/>
+              <a:cs typeface="Helvetica"/>
+            </a:endParaRPr>
+          </a:p>
+        </p:txBody>
+      </p:sp>
+      <p:cxnSp>
+        <p:nvCxnSpPr>
+          <p:cNvPr id="109" name="Straight Connector 108"/>
+          <p:cNvCxnSpPr/>
+          <p:nvPr/>
+        </p:nvCxnSpPr>
+        <p:spPr>
+          <a:xfrm>
+            <a:off x="4302102" y="4168500"/>
+            <a:ext cx="0" cy="900635"/>
+          </a:xfrm>
+          <a:prstGeom prst="line">
+            <a:avLst/>
+          </a:prstGeom>
+          <a:ln w="28575" cmpd="sng">
+            <a:prstDash val="sysDash"/>
+          </a:ln>
+          <a:effectLst/>
+        </p:spPr>
+        <p:style>
+          <a:lnRef idx="3">
+            <a:schemeClr val="dk1"/>
+          </a:lnRef>
+          <a:fillRef idx="0">
+            <a:schemeClr val="dk1"/>
+          </a:fillRef>
+          <a:effectRef idx="2">
+            <a:schemeClr val="dk1"/>
+          </a:effectRef>
+          <a:fontRef idx="minor">
+            <a:schemeClr val="tx1"/>
+          </a:fontRef>
+        </p:style>
+      </p:cxnSp>
+      <p:cxnSp>
+        <p:nvCxnSpPr>
+          <p:cNvPr id="110" name="Straight Connector 109"/>
+          <p:cNvCxnSpPr/>
+          <p:nvPr/>
+        </p:nvCxnSpPr>
+        <p:spPr>
+          <a:xfrm>
+            <a:off x="4302102" y="3959708"/>
+            <a:ext cx="0" cy="293459"/>
+          </a:xfrm>
+          <a:prstGeom prst="line">
+            <a:avLst/>
+          </a:prstGeom>
+          <a:effectLst/>
+        </p:spPr>
+        <p:style>
+          <a:lnRef idx="3">
+            <a:schemeClr val="dk1"/>
+          </a:lnRef>
+          <a:fillRef idx="0">
+            <a:schemeClr val="dk1"/>
+          </a:fillRef>
+          <a:effectRef idx="2">
+            <a:schemeClr val="dk1"/>
+          </a:effectRef>
+          <a:fontRef idx="minor">
+            <a:schemeClr val="tx1"/>
+          </a:fontRef>
+        </p:style>
+      </p:cxnSp>
+      <p:sp>
+        <p:nvSpPr>
+          <p:cNvPr id="111" name="TextBox 110"/>
+          <p:cNvSpPr txBox="1"/>
+          <p:nvPr/>
+        </p:nvSpPr>
+        <p:spPr>
+          <a:xfrm>
+            <a:off x="568332" y="5637770"/>
+            <a:ext cx="471253" cy="369332"/>
+          </a:xfrm>
+          <a:prstGeom prst="rect">
+            <a:avLst/>
+          </a:prstGeom>
+          <a:noFill/>
+        </p:spPr>
+        <p:txBody>
+          <a:bodyPr wrap="none" rtlCol="0">
+            <a:spAutoFit/>
+          </a:bodyPr>
+          <a:lstStyle/>
+          <a:p>
+            <a:r>
+              <a:rPr lang="en-US" dirty="0" smtClean="0">
+                <a:latin typeface="Helvetica"/>
+                <a:cs typeface="Helvetica"/>
+              </a:rPr>
+              <a:t>s</a:t>
+            </a:r>
+            <a:r>
+              <a:rPr lang="en-US" baseline="-25000" dirty="0" smtClean="0">
+                <a:latin typeface="Helvetica"/>
+                <a:cs typeface="Helvetica"/>
+              </a:rPr>
+              <a:t>0</a:t>
+            </a:r>
+            <a:r>
+              <a:rPr lang="en-US" baseline="-25000" dirty="0">
+                <a:latin typeface="Helvetica"/>
+                <a:cs typeface="Helvetica"/>
+              </a:rPr>
+              <a:t>2</a:t>
+            </a:r>
+          </a:p>
+        </p:txBody>
+      </p:sp>
+      <p:sp>
+        <p:nvSpPr>
+          <p:cNvPr id="112" name="TextBox 111"/>
+          <p:cNvSpPr txBox="1"/>
+          <p:nvPr/>
+        </p:nvSpPr>
+        <p:spPr>
+          <a:xfrm>
+            <a:off x="7872820" y="5639263"/>
+            <a:ext cx="484215" cy="369332"/>
+          </a:xfrm>
+          <a:prstGeom prst="rect">
+            <a:avLst/>
+          </a:prstGeom>
+          <a:noFill/>
+        </p:spPr>
+        <p:txBody>
+          <a:bodyPr wrap="none" rtlCol="0">
+            <a:spAutoFit/>
+          </a:bodyPr>
+          <a:lstStyle/>
+          <a:p>
+            <a:r>
+              <a:rPr lang="en-US" dirty="0" smtClean="0">
+                <a:latin typeface="Helvetica"/>
+                <a:cs typeface="Helvetica"/>
+              </a:rPr>
+              <a:t>e</a:t>
+            </a:r>
+            <a:r>
+              <a:rPr lang="en-US" baseline="-25000" dirty="0" smtClean="0">
+                <a:latin typeface="Helvetica"/>
+                <a:cs typeface="Helvetica"/>
+              </a:rPr>
+              <a:t>02</a:t>
+            </a:r>
+            <a:endParaRPr lang="en-US" baseline="-25000" dirty="0">
+              <a:latin typeface="Helvetica"/>
+              <a:cs typeface="Helvetica"/>
+            </a:endParaRPr>
+          </a:p>
+        </p:txBody>
+      </p:sp>
+      <p:sp>
+        <p:nvSpPr>
+          <p:cNvPr id="113" name="TextBox 112"/>
+          <p:cNvSpPr txBox="1"/>
+          <p:nvPr/>
+        </p:nvSpPr>
+        <p:spPr>
+          <a:xfrm>
+            <a:off x="1812949" y="3703735"/>
+            <a:ext cx="436951" cy="369332"/>
+          </a:xfrm>
+          <a:prstGeom prst="rect">
+            <a:avLst/>
+          </a:prstGeom>
+          <a:noFill/>
+        </p:spPr>
+        <p:txBody>
+          <a:bodyPr wrap="none" rtlCol="0">
+            <a:spAutoFit/>
+          </a:bodyPr>
+          <a:lstStyle/>
+          <a:p>
+            <a:r>
+              <a:rPr lang="en-US" dirty="0" smtClean="0">
+                <a:solidFill>
+                  <a:schemeClr val="tx2">
+                    <a:lumMod val="60000"/>
+                    <a:lumOff val="40000"/>
+                  </a:schemeClr>
+                </a:solidFill>
+                <a:latin typeface="Helvetica"/>
+                <a:cs typeface="Helvetica"/>
+              </a:rPr>
+              <a:t>R</a:t>
+            </a:r>
+            <a:r>
+              <a:rPr lang="en-US" baseline="-25000" dirty="0" smtClean="0">
+                <a:solidFill>
+                  <a:schemeClr val="tx2">
+                    <a:lumMod val="60000"/>
+                    <a:lumOff val="40000"/>
+                  </a:schemeClr>
+                </a:solidFill>
+                <a:latin typeface="Helvetica"/>
+                <a:cs typeface="Helvetica"/>
+              </a:rPr>
+              <a:t>0</a:t>
+            </a:r>
             <a:endParaRPr lang="en-US" baseline="-25000" dirty="0">
               <a:solidFill>
                 <a:schemeClr val="tx2">
@@ -7176,1199 +8507,16 @@
           </a:p>
         </p:txBody>
       </p:sp>
-      <p:cxnSp>
-        <p:nvCxnSpPr>
-          <p:cNvPr id="61" name="Straight Connector 60"/>
-          <p:cNvCxnSpPr/>
-          <p:nvPr/>
-        </p:nvCxnSpPr>
-        <p:spPr>
-          <a:xfrm>
-            <a:off x="1074820" y="5873235"/>
-            <a:ext cx="6747084" cy="0"/>
-          </a:xfrm>
-          <a:prstGeom prst="line">
-            <a:avLst/>
-          </a:prstGeom>
-          <a:effectLst/>
-        </p:spPr>
-        <p:style>
-          <a:lnRef idx="3">
-            <a:schemeClr val="dk1"/>
-          </a:lnRef>
-          <a:fillRef idx="0">
-            <a:schemeClr val="dk1"/>
-          </a:fillRef>
-          <a:effectRef idx="2">
-            <a:schemeClr val="dk1"/>
-          </a:effectRef>
-          <a:fontRef idx="minor">
-            <a:schemeClr val="tx1"/>
-          </a:fontRef>
-        </p:style>
-      </p:cxnSp>
-      <p:cxnSp>
-        <p:nvCxnSpPr>
-          <p:cNvPr id="62" name="Straight Connector 61"/>
-          <p:cNvCxnSpPr/>
-          <p:nvPr/>
-        </p:nvCxnSpPr>
-        <p:spPr>
-          <a:xfrm>
-            <a:off x="7826884" y="5725813"/>
-            <a:ext cx="0" cy="293459"/>
-          </a:xfrm>
-          <a:prstGeom prst="line">
-            <a:avLst/>
-          </a:prstGeom>
-          <a:effectLst/>
-        </p:spPr>
-        <p:style>
-          <a:lnRef idx="3">
-            <a:schemeClr val="dk1"/>
-          </a:lnRef>
-          <a:fillRef idx="0">
-            <a:schemeClr val="dk1"/>
-          </a:fillRef>
-          <a:effectRef idx="2">
-            <a:schemeClr val="dk1"/>
-          </a:effectRef>
-          <a:fontRef idx="minor">
-            <a:schemeClr val="tx1"/>
-          </a:fontRef>
-        </p:style>
-      </p:cxnSp>
-      <p:cxnSp>
-        <p:nvCxnSpPr>
-          <p:cNvPr id="63" name="Straight Connector 62"/>
-          <p:cNvCxnSpPr/>
-          <p:nvPr/>
-        </p:nvCxnSpPr>
-        <p:spPr>
-          <a:xfrm>
-            <a:off x="1073445" y="5731483"/>
-            <a:ext cx="0" cy="293459"/>
-          </a:xfrm>
-          <a:prstGeom prst="line">
-            <a:avLst/>
-          </a:prstGeom>
-          <a:effectLst/>
-        </p:spPr>
-        <p:style>
-          <a:lnRef idx="3">
-            <a:schemeClr val="dk1"/>
-          </a:lnRef>
-          <a:fillRef idx="0">
-            <a:schemeClr val="dk1"/>
-          </a:fillRef>
-          <a:effectRef idx="2">
-            <a:schemeClr val="dk1"/>
-          </a:effectRef>
-          <a:fontRef idx="minor">
-            <a:schemeClr val="tx1"/>
-          </a:fontRef>
-        </p:style>
-      </p:cxnSp>
-      <p:sp>
-        <p:nvSpPr>
-          <p:cNvPr id="69" name="TextBox 68"/>
+      <p:sp>
+        <p:nvSpPr>
+          <p:cNvPr id="114" name="TextBox 113"/>
           <p:cNvSpPr txBox="1"/>
           <p:nvPr/>
         </p:nvSpPr>
         <p:spPr>
           <a:xfrm>
-            <a:off x="922373" y="5957210"/>
-            <a:ext cx="313044" cy="369332"/>
-          </a:xfrm>
-          <a:prstGeom prst="rect">
-            <a:avLst/>
-          </a:prstGeom>
-          <a:noFill/>
-        </p:spPr>
-        <p:txBody>
-          <a:bodyPr wrap="none" rtlCol="0">
-            <a:spAutoFit/>
-          </a:bodyPr>
-          <a:lstStyle/>
-          <a:p>
-            <a:r>
-              <a:rPr lang="en-US" dirty="0" smtClean="0">
-                <a:latin typeface="Helvetica"/>
-                <a:cs typeface="Helvetica"/>
-              </a:rPr>
-              <a:t>0</a:t>
-            </a:r>
-            <a:endParaRPr lang="en-US" baseline="-25000" dirty="0">
-              <a:latin typeface="Helvetica"/>
-              <a:cs typeface="Helvetica"/>
-            </a:endParaRPr>
-          </a:p>
-        </p:txBody>
-      </p:sp>
-      <p:sp>
-        <p:nvSpPr>
-          <p:cNvPr id="72" name="TextBox 71"/>
-          <p:cNvSpPr txBox="1"/>
-          <p:nvPr/>
-        </p:nvSpPr>
-        <p:spPr>
-          <a:xfrm>
-            <a:off x="7417568" y="6022320"/>
-            <a:ext cx="826556" cy="369332"/>
-          </a:xfrm>
-          <a:prstGeom prst="rect">
-            <a:avLst/>
-          </a:prstGeom>
-          <a:noFill/>
-        </p:spPr>
-        <p:txBody>
-          <a:bodyPr wrap="none" rtlCol="0">
-            <a:spAutoFit/>
-          </a:bodyPr>
-          <a:lstStyle/>
-          <a:p>
-            <a:r>
-              <a:rPr lang="en-US" dirty="0" smtClean="0">
-                <a:latin typeface="Helvetica"/>
-                <a:cs typeface="Helvetica"/>
-              </a:rPr>
-              <a:t>65536</a:t>
-            </a:r>
-            <a:endParaRPr lang="en-US" baseline="-25000" dirty="0">
-              <a:latin typeface="Helvetica"/>
-              <a:cs typeface="Helvetica"/>
-            </a:endParaRPr>
-          </a:p>
-        </p:txBody>
-      </p:sp>
-      <p:cxnSp>
-        <p:nvCxnSpPr>
-          <p:cNvPr id="81" name="Straight Connector 80"/>
-          <p:cNvCxnSpPr/>
-          <p:nvPr/>
-        </p:nvCxnSpPr>
-        <p:spPr>
-          <a:xfrm>
-            <a:off x="1070160" y="4303226"/>
-            <a:ext cx="9640" cy="1377458"/>
-          </a:xfrm>
-          <a:prstGeom prst="line">
-            <a:avLst/>
-          </a:prstGeom>
-          <a:ln w="28575" cmpd="sng">
-            <a:prstDash val="sysDash"/>
-          </a:ln>
-          <a:effectLst/>
-        </p:spPr>
-        <p:style>
-          <a:lnRef idx="3">
-            <a:schemeClr val="dk1"/>
-          </a:lnRef>
-          <a:fillRef idx="0">
-            <a:schemeClr val="dk1"/>
-          </a:fillRef>
-          <a:effectRef idx="2">
-            <a:schemeClr val="dk1"/>
-          </a:effectRef>
-          <a:fontRef idx="minor">
-            <a:schemeClr val="tx1"/>
-          </a:fontRef>
-        </p:style>
-      </p:cxnSp>
-      <p:cxnSp>
-        <p:nvCxnSpPr>
-          <p:cNvPr id="82" name="Straight Connector 81"/>
-          <p:cNvCxnSpPr/>
-          <p:nvPr/>
-        </p:nvCxnSpPr>
-        <p:spPr>
-          <a:xfrm>
-            <a:off x="3345403" y="5160085"/>
-            <a:ext cx="946850" cy="0"/>
-          </a:xfrm>
-          <a:prstGeom prst="line">
-            <a:avLst/>
-          </a:prstGeom>
-          <a:effectLst/>
-        </p:spPr>
-        <p:style>
-          <a:lnRef idx="3">
-            <a:schemeClr val="dk1"/>
-          </a:lnRef>
-          <a:fillRef idx="0">
-            <a:schemeClr val="dk1"/>
-          </a:fillRef>
-          <a:effectRef idx="2">
-            <a:schemeClr val="dk1"/>
-          </a:effectRef>
-          <a:fontRef idx="minor">
-            <a:schemeClr val="tx1"/>
-          </a:fontRef>
-        </p:style>
-      </p:cxnSp>
-      <p:cxnSp>
-        <p:nvCxnSpPr>
-          <p:cNvPr id="83" name="Straight Connector 82"/>
-          <p:cNvCxnSpPr/>
-          <p:nvPr/>
-        </p:nvCxnSpPr>
-        <p:spPr>
-          <a:xfrm>
-            <a:off x="3345403" y="5012663"/>
-            <a:ext cx="0" cy="293459"/>
-          </a:xfrm>
-          <a:prstGeom prst="line">
-            <a:avLst/>
-          </a:prstGeom>
-          <a:effectLst/>
-        </p:spPr>
-        <p:style>
-          <a:lnRef idx="3">
-            <a:schemeClr val="dk1"/>
-          </a:lnRef>
-          <a:fillRef idx="0">
-            <a:schemeClr val="dk1"/>
-          </a:fillRef>
-          <a:effectRef idx="2">
-            <a:schemeClr val="dk1"/>
-          </a:effectRef>
-          <a:fontRef idx="minor">
-            <a:schemeClr val="tx1"/>
-          </a:fontRef>
-        </p:style>
-      </p:cxnSp>
-      <p:cxnSp>
-        <p:nvCxnSpPr>
-          <p:cNvPr id="84" name="Straight Connector 83"/>
-          <p:cNvCxnSpPr/>
-          <p:nvPr/>
-        </p:nvCxnSpPr>
-        <p:spPr>
-          <a:xfrm>
-            <a:off x="4302102" y="5018333"/>
-            <a:ext cx="0" cy="293459"/>
-          </a:xfrm>
-          <a:prstGeom prst="line">
-            <a:avLst/>
-          </a:prstGeom>
-          <a:effectLst/>
-        </p:spPr>
-        <p:style>
-          <a:lnRef idx="3">
-            <a:schemeClr val="dk1"/>
-          </a:lnRef>
-          <a:fillRef idx="0">
-            <a:schemeClr val="dk1"/>
-          </a:fillRef>
-          <a:effectRef idx="2">
-            <a:schemeClr val="dk1"/>
-          </a:effectRef>
-          <a:fontRef idx="minor">
-            <a:schemeClr val="tx1"/>
-          </a:fontRef>
-        </p:style>
-      </p:cxnSp>
-      <p:sp>
-        <p:nvSpPr>
-          <p:cNvPr id="85" name="TextBox 84"/>
-          <p:cNvSpPr txBox="1"/>
-          <p:nvPr/>
-        </p:nvSpPr>
-        <p:spPr>
-          <a:xfrm>
-            <a:off x="2879951" y="4905400"/>
-            <a:ext cx="471253" cy="369332"/>
-          </a:xfrm>
-          <a:prstGeom prst="rect">
-            <a:avLst/>
-          </a:prstGeom>
-          <a:noFill/>
-        </p:spPr>
-        <p:txBody>
-          <a:bodyPr wrap="none" rtlCol="0">
-            <a:spAutoFit/>
-          </a:bodyPr>
-          <a:lstStyle/>
-          <a:p>
-            <a:r>
-              <a:rPr lang="en-US" dirty="0" smtClean="0">
-                <a:latin typeface="Helvetica"/>
-                <a:cs typeface="Helvetica"/>
-              </a:rPr>
-              <a:t>s</a:t>
-            </a:r>
-            <a:r>
-              <a:rPr lang="en-US" baseline="-25000" dirty="0" smtClean="0">
-                <a:latin typeface="Helvetica"/>
-                <a:cs typeface="Helvetica"/>
-              </a:rPr>
-              <a:t>12</a:t>
-            </a:r>
-            <a:endParaRPr lang="en-US" baseline="-25000" dirty="0">
-              <a:latin typeface="Helvetica"/>
-              <a:cs typeface="Helvetica"/>
-            </a:endParaRPr>
-          </a:p>
-        </p:txBody>
-      </p:sp>
-      <p:sp>
-        <p:nvSpPr>
-          <p:cNvPr id="90" name="TextBox 89"/>
-          <p:cNvSpPr txBox="1"/>
-          <p:nvPr/>
-        </p:nvSpPr>
-        <p:spPr>
-          <a:xfrm>
-            <a:off x="4326032" y="4940863"/>
-            <a:ext cx="484215" cy="369332"/>
-          </a:xfrm>
-          <a:prstGeom prst="rect">
-            <a:avLst/>
-          </a:prstGeom>
-          <a:noFill/>
-        </p:spPr>
-        <p:txBody>
-          <a:bodyPr wrap="none" rtlCol="0">
-            <a:spAutoFit/>
-          </a:bodyPr>
-          <a:lstStyle/>
-          <a:p>
-            <a:r>
-              <a:rPr lang="en-US" dirty="0" smtClean="0">
-                <a:latin typeface="Helvetica"/>
-                <a:cs typeface="Helvetica"/>
-              </a:rPr>
-              <a:t>e</a:t>
-            </a:r>
-            <a:r>
-              <a:rPr lang="en-US" baseline="-25000" dirty="0" smtClean="0">
-                <a:latin typeface="Helvetica"/>
-                <a:cs typeface="Helvetica"/>
-              </a:rPr>
-              <a:t>12</a:t>
-            </a:r>
-            <a:endParaRPr lang="en-US" baseline="-25000" dirty="0">
-              <a:latin typeface="Helvetica"/>
-              <a:cs typeface="Helvetica"/>
-            </a:endParaRPr>
-          </a:p>
-        </p:txBody>
-      </p:sp>
-      <p:cxnSp>
-        <p:nvCxnSpPr>
-          <p:cNvPr id="91" name="Straight Connector 90"/>
-          <p:cNvCxnSpPr/>
-          <p:nvPr/>
-        </p:nvCxnSpPr>
-        <p:spPr>
-          <a:xfrm>
-            <a:off x="4807102" y="4644193"/>
-            <a:ext cx="3021157" cy="0"/>
-          </a:xfrm>
-          <a:prstGeom prst="line">
-            <a:avLst/>
-          </a:prstGeom>
-          <a:effectLst/>
-        </p:spPr>
-        <p:style>
-          <a:lnRef idx="3">
-            <a:schemeClr val="dk1"/>
-          </a:lnRef>
-          <a:fillRef idx="0">
-            <a:schemeClr val="dk1"/>
-          </a:fillRef>
-          <a:effectRef idx="2">
-            <a:schemeClr val="dk1"/>
-          </a:effectRef>
-          <a:fontRef idx="minor">
-            <a:schemeClr val="tx1"/>
-          </a:fontRef>
-        </p:style>
-      </p:cxnSp>
-      <p:cxnSp>
-        <p:nvCxnSpPr>
-          <p:cNvPr id="92" name="Straight Connector 91"/>
-          <p:cNvCxnSpPr/>
-          <p:nvPr/>
-        </p:nvCxnSpPr>
-        <p:spPr>
-          <a:xfrm>
-            <a:off x="4815699" y="4529167"/>
-            <a:ext cx="0" cy="293459"/>
-          </a:xfrm>
-          <a:prstGeom prst="line">
-            <a:avLst/>
-          </a:prstGeom>
-          <a:effectLst/>
-        </p:spPr>
-        <p:style>
-          <a:lnRef idx="3">
-            <a:schemeClr val="dk1"/>
-          </a:lnRef>
-          <a:fillRef idx="0">
-            <a:schemeClr val="dk1"/>
-          </a:fillRef>
-          <a:effectRef idx="2">
-            <a:schemeClr val="dk1"/>
-          </a:effectRef>
-          <a:fontRef idx="minor">
-            <a:schemeClr val="tx1"/>
-          </a:fontRef>
-        </p:style>
-      </p:cxnSp>
-      <p:cxnSp>
-        <p:nvCxnSpPr>
-          <p:cNvPr id="93" name="Straight Connector 92"/>
-          <p:cNvCxnSpPr/>
-          <p:nvPr/>
-        </p:nvCxnSpPr>
-        <p:spPr>
-          <a:xfrm>
-            <a:off x="7816805" y="4512234"/>
-            <a:ext cx="0" cy="293459"/>
-          </a:xfrm>
-          <a:prstGeom prst="line">
-            <a:avLst/>
-          </a:prstGeom>
-          <a:effectLst/>
-        </p:spPr>
-        <p:style>
-          <a:lnRef idx="3">
-            <a:schemeClr val="dk1"/>
-          </a:lnRef>
-          <a:fillRef idx="0">
-            <a:schemeClr val="dk1"/>
-          </a:fillRef>
-          <a:effectRef idx="2">
-            <a:schemeClr val="dk1"/>
-          </a:effectRef>
-          <a:fontRef idx="minor">
-            <a:schemeClr val="tx1"/>
-          </a:fontRef>
-        </p:style>
-      </p:cxnSp>
-      <p:sp>
-        <p:nvSpPr>
-          <p:cNvPr id="94" name="TextBox 93"/>
-          <p:cNvSpPr txBox="1"/>
-          <p:nvPr/>
-        </p:nvSpPr>
-        <p:spPr>
-          <a:xfrm>
-            <a:off x="4355927" y="4458623"/>
-            <a:ext cx="471253" cy="369332"/>
-          </a:xfrm>
-          <a:prstGeom prst="rect">
-            <a:avLst/>
-          </a:prstGeom>
-          <a:noFill/>
-        </p:spPr>
-        <p:txBody>
-          <a:bodyPr wrap="none" rtlCol="0">
-            <a:spAutoFit/>
-          </a:bodyPr>
-          <a:lstStyle/>
-          <a:p>
-            <a:r>
-              <a:rPr lang="en-US" dirty="0" smtClean="0">
-                <a:latin typeface="Helvetica"/>
-                <a:cs typeface="Helvetica"/>
-              </a:rPr>
-              <a:t>s</a:t>
-            </a:r>
-            <a:r>
-              <a:rPr lang="en-US" baseline="-25000" dirty="0" smtClean="0">
-                <a:latin typeface="Helvetica"/>
-                <a:cs typeface="Helvetica"/>
-              </a:rPr>
-              <a:t>22</a:t>
-            </a:r>
-            <a:endParaRPr lang="en-US" baseline="-25000" dirty="0">
-              <a:latin typeface="Helvetica"/>
-              <a:cs typeface="Helvetica"/>
-            </a:endParaRPr>
-          </a:p>
-        </p:txBody>
-      </p:sp>
-      <p:sp>
-        <p:nvSpPr>
-          <p:cNvPr id="95" name="TextBox 94"/>
-          <p:cNvSpPr txBox="1"/>
-          <p:nvPr/>
-        </p:nvSpPr>
-        <p:spPr>
-          <a:xfrm>
-            <a:off x="7777266" y="4478368"/>
-            <a:ext cx="484215" cy="369332"/>
-          </a:xfrm>
-          <a:prstGeom prst="rect">
-            <a:avLst/>
-          </a:prstGeom>
-          <a:noFill/>
-        </p:spPr>
-        <p:txBody>
-          <a:bodyPr wrap="none" rtlCol="0">
-            <a:spAutoFit/>
-          </a:bodyPr>
-          <a:lstStyle/>
-          <a:p>
-            <a:r>
-              <a:rPr lang="en-US" dirty="0" smtClean="0">
-                <a:latin typeface="Helvetica"/>
-                <a:cs typeface="Helvetica"/>
-              </a:rPr>
-              <a:t>e</a:t>
-            </a:r>
-            <a:r>
-              <a:rPr lang="en-US" baseline="-25000" dirty="0" smtClean="0">
-                <a:latin typeface="Helvetica"/>
-                <a:cs typeface="Helvetica"/>
-              </a:rPr>
-              <a:t>22</a:t>
-            </a:r>
-            <a:endParaRPr lang="en-US" baseline="-25000" dirty="0">
-              <a:latin typeface="Helvetica"/>
-              <a:cs typeface="Helvetica"/>
-            </a:endParaRPr>
-          </a:p>
-        </p:txBody>
-      </p:sp>
-      <p:cxnSp>
-        <p:nvCxnSpPr>
-          <p:cNvPr id="96" name="Straight Connector 95"/>
-          <p:cNvCxnSpPr/>
-          <p:nvPr/>
-        </p:nvCxnSpPr>
-        <p:spPr>
-          <a:xfrm>
-            <a:off x="1079800" y="4100768"/>
-            <a:ext cx="6747084" cy="0"/>
-          </a:xfrm>
-          <a:prstGeom prst="line">
-            <a:avLst/>
-          </a:prstGeom>
-          <a:effectLst/>
-        </p:spPr>
-        <p:style>
-          <a:lnRef idx="3">
-            <a:schemeClr val="dk1"/>
-          </a:lnRef>
-          <a:fillRef idx="0">
-            <a:schemeClr val="dk1"/>
-          </a:fillRef>
-          <a:effectRef idx="2">
-            <a:schemeClr val="dk1"/>
-          </a:effectRef>
-          <a:fontRef idx="minor">
-            <a:schemeClr val="tx1"/>
-          </a:fontRef>
-        </p:style>
-      </p:cxnSp>
-      <p:cxnSp>
-        <p:nvCxnSpPr>
-          <p:cNvPr id="97" name="Straight Connector 96"/>
-          <p:cNvCxnSpPr/>
-          <p:nvPr/>
-        </p:nvCxnSpPr>
-        <p:spPr>
-          <a:xfrm>
-            <a:off x="1069217" y="3954038"/>
-            <a:ext cx="0" cy="293459"/>
-          </a:xfrm>
-          <a:prstGeom prst="line">
-            <a:avLst/>
-          </a:prstGeom>
-          <a:effectLst/>
-        </p:spPr>
-        <p:style>
-          <a:lnRef idx="3">
-            <a:schemeClr val="dk1"/>
-          </a:lnRef>
-          <a:fillRef idx="0">
-            <a:schemeClr val="dk1"/>
-          </a:fillRef>
-          <a:effectRef idx="2">
-            <a:schemeClr val="dk1"/>
-          </a:effectRef>
-          <a:fontRef idx="minor">
-            <a:schemeClr val="tx1"/>
-          </a:fontRef>
-        </p:style>
-      </p:cxnSp>
-      <p:cxnSp>
-        <p:nvCxnSpPr>
-          <p:cNvPr id="98" name="Straight Connector 97"/>
-          <p:cNvCxnSpPr/>
-          <p:nvPr/>
-        </p:nvCxnSpPr>
-        <p:spPr>
-          <a:xfrm>
-            <a:off x="3350383" y="4258837"/>
-            <a:ext cx="0" cy="738410"/>
-          </a:xfrm>
-          <a:prstGeom prst="line">
-            <a:avLst/>
-          </a:prstGeom>
-          <a:ln w="28575" cmpd="sng">
-            <a:prstDash val="sysDash"/>
-          </a:ln>
-          <a:effectLst/>
-        </p:spPr>
-        <p:style>
-          <a:lnRef idx="3">
-            <a:schemeClr val="dk1"/>
-          </a:lnRef>
-          <a:fillRef idx="0">
-            <a:schemeClr val="dk1"/>
-          </a:fillRef>
-          <a:effectRef idx="2">
-            <a:schemeClr val="dk1"/>
-          </a:effectRef>
-          <a:fontRef idx="minor">
-            <a:schemeClr val="tx1"/>
-          </a:fontRef>
-        </p:style>
-      </p:cxnSp>
-      <p:cxnSp>
-        <p:nvCxnSpPr>
-          <p:cNvPr id="99" name="Straight Connector 98"/>
-          <p:cNvCxnSpPr/>
-          <p:nvPr/>
-        </p:nvCxnSpPr>
-        <p:spPr>
-          <a:xfrm>
-            <a:off x="4817685" y="4242496"/>
-            <a:ext cx="0" cy="496025"/>
-          </a:xfrm>
-          <a:prstGeom prst="line">
-            <a:avLst/>
-          </a:prstGeom>
-          <a:ln w="28575" cmpd="sng">
-            <a:prstDash val="sysDash"/>
-          </a:ln>
-          <a:effectLst/>
-        </p:spPr>
-        <p:style>
-          <a:lnRef idx="3">
-            <a:schemeClr val="dk1"/>
-          </a:lnRef>
-          <a:fillRef idx="0">
-            <a:schemeClr val="dk1"/>
-          </a:fillRef>
-          <a:effectRef idx="2">
-            <a:schemeClr val="dk1"/>
-          </a:effectRef>
-          <a:fontRef idx="minor">
-            <a:schemeClr val="tx1"/>
-          </a:fontRef>
-        </p:style>
-      </p:cxnSp>
-      <p:cxnSp>
-        <p:nvCxnSpPr>
-          <p:cNvPr id="100" name="Straight Connector 99"/>
-          <p:cNvCxnSpPr/>
-          <p:nvPr/>
-        </p:nvCxnSpPr>
-        <p:spPr>
-          <a:xfrm>
-            <a:off x="7816805" y="4247497"/>
-            <a:ext cx="0" cy="396696"/>
-          </a:xfrm>
-          <a:prstGeom prst="line">
-            <a:avLst/>
-          </a:prstGeom>
-          <a:ln w="28575" cmpd="sng">
-            <a:prstDash val="sysDash"/>
-          </a:ln>
-          <a:effectLst/>
-        </p:spPr>
-        <p:style>
-          <a:lnRef idx="3">
-            <a:schemeClr val="dk1"/>
-          </a:lnRef>
-          <a:fillRef idx="0">
-            <a:schemeClr val="dk1"/>
-          </a:fillRef>
-          <a:effectRef idx="2">
-            <a:schemeClr val="dk1"/>
-          </a:effectRef>
-          <a:fontRef idx="minor">
-            <a:schemeClr val="tx1"/>
-          </a:fontRef>
-        </p:style>
-      </p:cxnSp>
-      <p:cxnSp>
-        <p:nvCxnSpPr>
-          <p:cNvPr id="101" name="Straight Connector 100"/>
-          <p:cNvCxnSpPr/>
-          <p:nvPr/>
-        </p:nvCxnSpPr>
-        <p:spPr>
-          <a:xfrm>
-            <a:off x="7826884" y="4268552"/>
-            <a:ext cx="0" cy="1406462"/>
-          </a:xfrm>
-          <a:prstGeom prst="line">
-            <a:avLst/>
-          </a:prstGeom>
-          <a:ln w="28575" cmpd="sng">
-            <a:prstDash val="sysDash"/>
-          </a:ln>
-          <a:effectLst/>
-        </p:spPr>
-        <p:style>
-          <a:lnRef idx="3">
-            <a:schemeClr val="dk1"/>
-          </a:lnRef>
-          <a:fillRef idx="0">
-            <a:schemeClr val="dk1"/>
-          </a:fillRef>
-          <a:effectRef idx="2">
-            <a:schemeClr val="dk1"/>
-          </a:effectRef>
-          <a:fontRef idx="minor">
-            <a:schemeClr val="tx1"/>
-          </a:fontRef>
-        </p:style>
-      </p:cxnSp>
-      <p:cxnSp>
-        <p:nvCxnSpPr>
-          <p:cNvPr id="102" name="Straight Connector 101"/>
-          <p:cNvCxnSpPr/>
-          <p:nvPr/>
-        </p:nvCxnSpPr>
-        <p:spPr>
-          <a:xfrm>
-            <a:off x="3345403" y="3959708"/>
-            <a:ext cx="0" cy="293459"/>
-          </a:xfrm>
-          <a:prstGeom prst="line">
-            <a:avLst/>
-          </a:prstGeom>
-          <a:effectLst/>
-        </p:spPr>
-        <p:style>
-          <a:lnRef idx="3">
-            <a:schemeClr val="dk1"/>
-          </a:lnRef>
-          <a:fillRef idx="0">
-            <a:schemeClr val="dk1"/>
-          </a:fillRef>
-          <a:effectRef idx="2">
-            <a:schemeClr val="dk1"/>
-          </a:effectRef>
-          <a:fontRef idx="minor">
-            <a:schemeClr val="tx1"/>
-          </a:fontRef>
-        </p:style>
-      </p:cxnSp>
-      <p:cxnSp>
-        <p:nvCxnSpPr>
-          <p:cNvPr id="103" name="Straight Connector 102"/>
-          <p:cNvCxnSpPr/>
-          <p:nvPr/>
-        </p:nvCxnSpPr>
-        <p:spPr>
-          <a:xfrm>
-            <a:off x="4817685" y="3949037"/>
-            <a:ext cx="0" cy="293459"/>
-          </a:xfrm>
-          <a:prstGeom prst="line">
-            <a:avLst/>
-          </a:prstGeom>
-          <a:effectLst/>
-        </p:spPr>
-        <p:style>
-          <a:lnRef idx="3">
-            <a:schemeClr val="dk1"/>
-          </a:lnRef>
-          <a:fillRef idx="0">
-            <a:schemeClr val="dk1"/>
-          </a:fillRef>
-          <a:effectRef idx="2">
-            <a:schemeClr val="dk1"/>
-          </a:effectRef>
-          <a:fontRef idx="minor">
-            <a:schemeClr val="tx1"/>
-          </a:fontRef>
-        </p:style>
-      </p:cxnSp>
-      <p:cxnSp>
-        <p:nvCxnSpPr>
-          <p:cNvPr id="104" name="Straight Connector 103"/>
-          <p:cNvCxnSpPr/>
-          <p:nvPr/>
-        </p:nvCxnSpPr>
-        <p:spPr>
-          <a:xfrm>
-            <a:off x="7816805" y="3949037"/>
-            <a:ext cx="0" cy="293459"/>
-          </a:xfrm>
-          <a:prstGeom prst="line">
-            <a:avLst/>
-          </a:prstGeom>
-          <a:effectLst/>
-        </p:spPr>
-        <p:style>
-          <a:lnRef idx="3">
-            <a:schemeClr val="dk1"/>
-          </a:lnRef>
-          <a:fillRef idx="0">
-            <a:schemeClr val="dk1"/>
-          </a:fillRef>
-          <a:effectRef idx="2">
-            <a:schemeClr val="dk1"/>
-          </a:effectRef>
-          <a:fontRef idx="minor">
-            <a:schemeClr val="tx1"/>
-          </a:fontRef>
-        </p:style>
-      </p:cxnSp>
-      <p:cxnSp>
-        <p:nvCxnSpPr>
-          <p:cNvPr id="105" name="Straight Connector 104"/>
-          <p:cNvCxnSpPr/>
-          <p:nvPr/>
-        </p:nvCxnSpPr>
-        <p:spPr>
-          <a:xfrm>
-            <a:off x="7821904" y="3959708"/>
-            <a:ext cx="0" cy="293459"/>
-          </a:xfrm>
-          <a:prstGeom prst="line">
-            <a:avLst/>
-          </a:prstGeom>
-          <a:effectLst/>
-        </p:spPr>
-        <p:style>
-          <a:lnRef idx="3">
-            <a:schemeClr val="dk1"/>
-          </a:lnRef>
-          <a:fillRef idx="0">
-            <a:schemeClr val="dk1"/>
-          </a:fillRef>
-          <a:effectRef idx="2">
-            <a:schemeClr val="dk1"/>
-          </a:effectRef>
-          <a:fontRef idx="minor">
-            <a:schemeClr val="tx1"/>
-          </a:fontRef>
-        </p:style>
-      </p:cxnSp>
-      <p:sp>
-        <p:nvSpPr>
-          <p:cNvPr id="106" name="TextBox 105"/>
-          <p:cNvSpPr txBox="1"/>
-          <p:nvPr/>
-        </p:nvSpPr>
-        <p:spPr>
-          <a:xfrm>
-            <a:off x="2814935" y="5289189"/>
-            <a:ext cx="2148207" cy="369332"/>
-          </a:xfrm>
-          <a:prstGeom prst="rect">
-            <a:avLst/>
-          </a:prstGeom>
-          <a:noFill/>
-        </p:spPr>
-        <p:txBody>
-          <a:bodyPr wrap="none" rtlCol="0">
-            <a:spAutoFit/>
-          </a:bodyPr>
-          <a:lstStyle/>
-          <a:p>
-            <a:r>
-              <a:rPr lang="en-US" dirty="0" smtClean="0">
-                <a:solidFill>
-                  <a:srgbClr val="FF0000"/>
-                </a:solidFill>
-                <a:latin typeface="Helvetica"/>
-                <a:cs typeface="Helvetica"/>
-              </a:rPr>
-              <a:t>17.0/8 (</a:t>
-            </a:r>
-            <a:r>
-              <a:rPr lang="is-IS" dirty="0" smtClean="0">
-                <a:solidFill>
-                  <a:srgbClr val="FF0000"/>
-                </a:solidFill>
-                <a:latin typeface="Helvetica"/>
-                <a:cs typeface="Helvetica"/>
-              </a:rPr>
-              <a:t>4352-4607</a:t>
-            </a:r>
-            <a:r>
-              <a:rPr lang="en-US" dirty="0" smtClean="0">
-                <a:solidFill>
-                  <a:srgbClr val="FF0000"/>
-                </a:solidFill>
-                <a:latin typeface="Helvetica"/>
-                <a:cs typeface="Helvetica"/>
-              </a:rPr>
-              <a:t>)</a:t>
-            </a:r>
-            <a:endParaRPr lang="en-US" baseline="-25000" dirty="0">
-              <a:solidFill>
-                <a:srgbClr val="FF0000"/>
-              </a:solidFill>
-              <a:latin typeface="Helvetica"/>
-              <a:cs typeface="Helvetica"/>
-            </a:endParaRPr>
-          </a:p>
-        </p:txBody>
-      </p:sp>
-      <p:sp>
-        <p:nvSpPr>
-          <p:cNvPr id="107" name="TextBox 106"/>
-          <p:cNvSpPr txBox="1"/>
-          <p:nvPr/>
-        </p:nvSpPr>
-        <p:spPr>
-          <a:xfrm>
-            <a:off x="5044164" y="4640833"/>
-            <a:ext cx="2404963" cy="369332"/>
-          </a:xfrm>
-          <a:prstGeom prst="rect">
-            <a:avLst/>
-          </a:prstGeom>
-          <a:noFill/>
-        </p:spPr>
-        <p:txBody>
-          <a:bodyPr wrap="none" rtlCol="0">
-            <a:spAutoFit/>
-          </a:bodyPr>
-          <a:lstStyle/>
-          <a:p>
-            <a:r>
-              <a:rPr lang="en-US" dirty="0" smtClean="0">
-                <a:solidFill>
-                  <a:srgbClr val="FF0000"/>
-                </a:solidFill>
-                <a:latin typeface="Helvetica"/>
-                <a:cs typeface="Helvetica"/>
-              </a:rPr>
-              <a:t>89.0/8 (22784-23039)</a:t>
-            </a:r>
-            <a:endParaRPr lang="en-US" baseline="-25000" dirty="0">
-              <a:solidFill>
-                <a:srgbClr val="FF0000"/>
-              </a:solidFill>
-              <a:latin typeface="Helvetica"/>
-              <a:cs typeface="Helvetica"/>
-            </a:endParaRPr>
-          </a:p>
-        </p:txBody>
-      </p:sp>
-      <p:sp>
-        <p:nvSpPr>
-          <p:cNvPr id="108" name="TextBox 107"/>
-          <p:cNvSpPr txBox="1"/>
-          <p:nvPr/>
-        </p:nvSpPr>
-        <p:spPr>
-          <a:xfrm>
-            <a:off x="3501757" y="5902192"/>
-            <a:ext cx="2533341" cy="369332"/>
-          </a:xfrm>
-          <a:prstGeom prst="rect">
-            <a:avLst/>
-          </a:prstGeom>
-          <a:noFill/>
-        </p:spPr>
-        <p:txBody>
-          <a:bodyPr wrap="none" rtlCol="0">
-            <a:spAutoFit/>
-          </a:bodyPr>
-          <a:lstStyle/>
-          <a:p>
-            <a:r>
-              <a:rPr lang="en-US" dirty="0" smtClean="0">
-                <a:solidFill>
-                  <a:srgbClr val="FF0000"/>
-                </a:solidFill>
-                <a:latin typeface="Helvetica"/>
-                <a:cs typeface="Helvetica"/>
-              </a:rPr>
-              <a:t>123.0/8 (31488-31743)</a:t>
-            </a:r>
-            <a:endParaRPr lang="en-US" baseline="-25000" dirty="0">
-              <a:solidFill>
-                <a:srgbClr val="FF0000"/>
-              </a:solidFill>
-              <a:latin typeface="Helvetica"/>
-              <a:cs typeface="Helvetica"/>
-            </a:endParaRPr>
-          </a:p>
-        </p:txBody>
-      </p:sp>
-      <p:cxnSp>
-        <p:nvCxnSpPr>
-          <p:cNvPr id="109" name="Straight Connector 108"/>
-          <p:cNvCxnSpPr/>
-          <p:nvPr/>
-        </p:nvCxnSpPr>
-        <p:spPr>
-          <a:xfrm>
-            <a:off x="4302102" y="4168500"/>
-            <a:ext cx="0" cy="900635"/>
-          </a:xfrm>
-          <a:prstGeom prst="line">
-            <a:avLst/>
-          </a:prstGeom>
-          <a:ln w="28575" cmpd="sng">
-            <a:prstDash val="sysDash"/>
-          </a:ln>
-          <a:effectLst/>
-        </p:spPr>
-        <p:style>
-          <a:lnRef idx="3">
-            <a:schemeClr val="dk1"/>
-          </a:lnRef>
-          <a:fillRef idx="0">
-            <a:schemeClr val="dk1"/>
-          </a:fillRef>
-          <a:effectRef idx="2">
-            <a:schemeClr val="dk1"/>
-          </a:effectRef>
-          <a:fontRef idx="minor">
-            <a:schemeClr val="tx1"/>
-          </a:fontRef>
-        </p:style>
-      </p:cxnSp>
-      <p:cxnSp>
-        <p:nvCxnSpPr>
-          <p:cNvPr id="110" name="Straight Connector 109"/>
-          <p:cNvCxnSpPr/>
-          <p:nvPr/>
-        </p:nvCxnSpPr>
-        <p:spPr>
-          <a:xfrm>
-            <a:off x="4302102" y="3959708"/>
-            <a:ext cx="0" cy="293459"/>
-          </a:xfrm>
-          <a:prstGeom prst="line">
-            <a:avLst/>
-          </a:prstGeom>
-          <a:effectLst/>
-        </p:spPr>
-        <p:style>
-          <a:lnRef idx="3">
-            <a:schemeClr val="dk1"/>
-          </a:lnRef>
-          <a:fillRef idx="0">
-            <a:schemeClr val="dk1"/>
-          </a:fillRef>
-          <a:effectRef idx="2">
-            <a:schemeClr val="dk1"/>
-          </a:effectRef>
-          <a:fontRef idx="minor">
-            <a:schemeClr val="tx1"/>
-          </a:fontRef>
-        </p:style>
-      </p:cxnSp>
-      <p:sp>
-        <p:nvSpPr>
-          <p:cNvPr id="111" name="TextBox 110"/>
-          <p:cNvSpPr txBox="1"/>
-          <p:nvPr/>
-        </p:nvSpPr>
-        <p:spPr>
-          <a:xfrm>
-            <a:off x="568332" y="5637770"/>
-            <a:ext cx="471253" cy="369332"/>
-          </a:xfrm>
-          <a:prstGeom prst="rect">
-            <a:avLst/>
-          </a:prstGeom>
-          <a:noFill/>
-        </p:spPr>
-        <p:txBody>
-          <a:bodyPr wrap="none" rtlCol="0">
-            <a:spAutoFit/>
-          </a:bodyPr>
-          <a:lstStyle/>
-          <a:p>
-            <a:r>
-              <a:rPr lang="en-US" dirty="0" smtClean="0">
-                <a:latin typeface="Helvetica"/>
-                <a:cs typeface="Helvetica"/>
-              </a:rPr>
-              <a:t>s</a:t>
-            </a:r>
-            <a:r>
-              <a:rPr lang="en-US" baseline="-25000" dirty="0" smtClean="0">
-                <a:latin typeface="Helvetica"/>
-                <a:cs typeface="Helvetica"/>
-              </a:rPr>
-              <a:t>0</a:t>
-            </a:r>
-            <a:r>
-              <a:rPr lang="en-US" baseline="-25000" dirty="0">
-                <a:latin typeface="Helvetica"/>
-                <a:cs typeface="Helvetica"/>
-              </a:rPr>
-              <a:t>2</a:t>
-            </a:r>
-            <a:endParaRPr lang="en-US" baseline="-25000" dirty="0">
-              <a:latin typeface="Helvetica"/>
-              <a:cs typeface="Helvetica"/>
-            </a:endParaRPr>
-          </a:p>
-        </p:txBody>
-      </p:sp>
-      <p:sp>
-        <p:nvSpPr>
-          <p:cNvPr id="112" name="TextBox 111"/>
-          <p:cNvSpPr txBox="1"/>
-          <p:nvPr/>
-        </p:nvSpPr>
-        <p:spPr>
-          <a:xfrm>
-            <a:off x="7872820" y="5639263"/>
-            <a:ext cx="484215" cy="369332"/>
-          </a:xfrm>
-          <a:prstGeom prst="rect">
-            <a:avLst/>
-          </a:prstGeom>
-          <a:noFill/>
-        </p:spPr>
-        <p:txBody>
-          <a:bodyPr wrap="none" rtlCol="0">
-            <a:spAutoFit/>
-          </a:bodyPr>
-          <a:lstStyle/>
-          <a:p>
-            <a:r>
-              <a:rPr lang="en-US" dirty="0" smtClean="0">
-                <a:latin typeface="Helvetica"/>
-                <a:cs typeface="Helvetica"/>
-              </a:rPr>
-              <a:t>e</a:t>
-            </a:r>
-            <a:r>
-              <a:rPr lang="en-US" baseline="-25000" dirty="0" smtClean="0">
-                <a:latin typeface="Helvetica"/>
-                <a:cs typeface="Helvetica"/>
-              </a:rPr>
-              <a:t>02</a:t>
-            </a:r>
-            <a:endParaRPr lang="en-US" baseline="-25000" dirty="0">
-              <a:latin typeface="Helvetica"/>
-              <a:cs typeface="Helvetica"/>
-            </a:endParaRPr>
-          </a:p>
-        </p:txBody>
-      </p:sp>
-      <p:sp>
-        <p:nvSpPr>
-          <p:cNvPr id="113" name="TextBox 112"/>
-          <p:cNvSpPr txBox="1"/>
-          <p:nvPr/>
-        </p:nvSpPr>
-        <p:spPr>
-          <a:xfrm>
-            <a:off x="1812949" y="3703735"/>
-            <a:ext cx="436951" cy="369332"/>
+            <a:off x="3567984" y="3431368"/>
+            <a:ext cx="436951" cy="646331"/>
           </a:xfrm>
           <a:prstGeom prst="rect">
             <a:avLst/>
@@ -8406,6 +8554,44 @@
                 <a:cs typeface="Helvetica"/>
               </a:rPr>
               <a:t>0</a:t>
+            </a:r>
+            <a:endParaRPr lang="en-US" dirty="0" smtClean="0">
+              <a:solidFill>
+                <a:schemeClr val="tx2">
+                  <a:lumMod val="60000"/>
+                  <a:lumOff val="40000"/>
+                </a:schemeClr>
+              </a:solidFill>
+              <a:latin typeface="Helvetica"/>
+              <a:cs typeface="Helvetica"/>
+            </a:endParaRPr>
+          </a:p>
+          <a:p>
+            <a:r>
+              <a:rPr lang="en-US" dirty="0" smtClean="0">
+                <a:solidFill>
+                  <a:schemeClr val="tx2">
+                    <a:lumMod val="60000"/>
+                    <a:lumOff val="40000"/>
+                  </a:schemeClr>
+                </a:solidFill>
+                <a:latin typeface="Helvetica"/>
+                <a:cs typeface="Helvetica"/>
+              </a:rPr>
+              <a:t>R</a:t>
+            </a:r>
+            <a:r>
+              <a:rPr lang="en-US" baseline="-25000" dirty="0" smtClean="0">
+                <a:solidFill>
+                  <a:schemeClr val="tx2">
+                    <a:lumMod val="60000"/>
+                    <a:lumOff val="40000"/>
+                  </a:schemeClr>
+                </a:solidFill>
+                <a:latin typeface="Helvetica"/>
+                <a:cs typeface="Helvetica"/>
+              </a:rPr>
+              <a:t>1</a:t>
             </a:r>
             <a:endParaRPr lang="en-US" baseline="-25000" dirty="0">
               <a:solidFill>
@@ -8422,14 +8608,14 @@
       </p:sp>
       <p:sp>
         <p:nvSpPr>
-          <p:cNvPr id="114" name="TextBox 113"/>
+          <p:cNvPr id="115" name="TextBox 114"/>
           <p:cNvSpPr txBox="1"/>
           <p:nvPr/>
         </p:nvSpPr>
         <p:spPr>
           <a:xfrm>
-            <a:off x="3567984" y="3431368"/>
-            <a:ext cx="436951" cy="646331"/>
+            <a:off x="6093118" y="3431368"/>
+            <a:ext cx="488436" cy="646331"/>
           </a:xfrm>
           <a:prstGeom prst="rect">
             <a:avLst/>
@@ -8437,7 +8623,7 @@
           <a:noFill/>
         </p:spPr>
         <p:txBody>
-          <a:bodyPr wrap="none" rtlCol="0">
+          <a:bodyPr wrap="square" rtlCol="0">
             <a:spAutoFit/>
           </a:bodyPr>
           <a:lstStyle/>
@@ -8467,6 +8653,44 @@
                 <a:cs typeface="Helvetica"/>
               </a:rPr>
               <a:t>0</a:t>
+            </a:r>
+            <a:endParaRPr lang="en-US" dirty="0">
+              <a:solidFill>
+                <a:schemeClr val="tx2">
+                  <a:lumMod val="60000"/>
+                  <a:lumOff val="40000"/>
+                </a:schemeClr>
+              </a:solidFill>
+              <a:latin typeface="Helvetica"/>
+              <a:cs typeface="Helvetica"/>
+            </a:endParaRPr>
+          </a:p>
+          <a:p>
+            <a:r>
+              <a:rPr lang="en-US" dirty="0" smtClean="0">
+                <a:solidFill>
+                  <a:schemeClr val="tx2">
+                    <a:lumMod val="60000"/>
+                    <a:lumOff val="40000"/>
+                  </a:schemeClr>
+                </a:solidFill>
+                <a:latin typeface="Helvetica"/>
+                <a:cs typeface="Helvetica"/>
+              </a:rPr>
+              <a:t>R</a:t>
+            </a:r>
+            <a:r>
+              <a:rPr lang="en-US" baseline="-25000" dirty="0">
+                <a:solidFill>
+                  <a:schemeClr val="tx2">
+                    <a:lumMod val="60000"/>
+                    <a:lumOff val="40000"/>
+                  </a:schemeClr>
+                </a:solidFill>
+                <a:latin typeface="Helvetica"/>
+                <a:cs typeface="Helvetica"/>
+              </a:rPr>
+              <a:t>2</a:t>
             </a:r>
             <a:endParaRPr lang="en-US" dirty="0" smtClean="0">
               <a:solidFill>
@@ -8479,6 +8703,29 @@
               <a:cs typeface="Helvetica"/>
             </a:endParaRPr>
           </a:p>
+        </p:txBody>
+      </p:sp>
+      <p:sp>
+        <p:nvSpPr>
+          <p:cNvPr id="117" name="TextBox 116"/>
+          <p:cNvSpPr txBox="1"/>
+          <p:nvPr/>
+        </p:nvSpPr>
+        <p:spPr>
+          <a:xfrm>
+            <a:off x="4326032" y="3703735"/>
+            <a:ext cx="436951" cy="369332"/>
+          </a:xfrm>
+          <a:prstGeom prst="rect">
+            <a:avLst/>
+          </a:prstGeom>
+          <a:noFill/>
+        </p:spPr>
+        <p:txBody>
+          <a:bodyPr wrap="none" rtlCol="0">
+            <a:spAutoFit/>
+          </a:bodyPr>
+          <a:lstStyle/>
           <a:p>
             <a:r>
               <a:rPr lang="en-US" dirty="0" smtClean="0">
@@ -8504,7 +8751,7 @@
                 <a:latin typeface="Helvetica"/>
                 <a:cs typeface="Helvetica"/>
               </a:rPr>
-              <a:t>1</a:t>
+              <a:t>0</a:t>
             </a:r>
             <a:endParaRPr lang="en-US" baseline="-25000" dirty="0">
               <a:solidFill>
@@ -8519,16 +8766,746 @@
           </a:p>
         </p:txBody>
       </p:sp>
-      <p:sp>
-        <p:nvSpPr>
-          <p:cNvPr id="115" name="TextBox 114"/>
+    </p:spTree>
+    <p:extLst>
+      <p:ext uri="{BB962C8B-B14F-4D97-AF65-F5344CB8AC3E}">
+        <p14:creationId xmlns:p14="http://schemas.microsoft.com/office/powerpoint/2010/main" val="3558411130"/>
+      </p:ext>
+    </p:extLst>
+  </p:cSld>
+  <p:clrMapOvr>
+    <a:masterClrMapping/>
+  </p:clrMapOvr>
+</p:sld>
+</file>
+
+<file path=ppt/slides/slide3.xml><?xml version="1.0" encoding="utf-8"?>
+<p:sld xmlns:a="http://schemas.openxmlformats.org/drawingml/2006/main" xmlns:r="http://schemas.openxmlformats.org/officeDocument/2006/relationships" xmlns:p="http://schemas.openxmlformats.org/presentationml/2006/main">
+  <p:cSld>
+    <p:spTree>
+      <p:nvGrpSpPr>
+        <p:cNvPr id="1" name=""/>
+        <p:cNvGrpSpPr/>
+        <p:nvPr/>
+      </p:nvGrpSpPr>
+      <p:grpSpPr>
+        <a:xfrm>
+          <a:off x="0" y="0"/>
+          <a:ext cx="0" cy="0"/>
+          <a:chOff x="0" y="0"/>
+          <a:chExt cx="0" cy="0"/>
+        </a:xfrm>
+      </p:grpSpPr>
+      <p:sp>
+        <p:nvSpPr>
+          <p:cNvPr id="21" name="TextBox 20"/>
           <p:cNvSpPr txBox="1"/>
           <p:nvPr/>
         </p:nvSpPr>
         <p:spPr>
           <a:xfrm>
-            <a:off x="6093118" y="3431368"/>
-            <a:ext cx="488436" cy="646331"/>
+            <a:off x="620033" y="4504559"/>
+            <a:ext cx="890576" cy="369332"/>
+          </a:xfrm>
+          <a:prstGeom prst="rect">
+            <a:avLst/>
+          </a:prstGeom>
+          <a:noFill/>
+        </p:spPr>
+        <p:txBody>
+          <a:bodyPr wrap="none" rtlCol="0">
+            <a:spAutoFit/>
+          </a:bodyPr>
+          <a:lstStyle/>
+          <a:p>
+            <a:r>
+              <a:rPr lang="en-US" dirty="0" smtClean="0">
+                <a:latin typeface="Helvetica"/>
+                <a:cs typeface="Helvetica"/>
+              </a:rPr>
+              <a:t>0.0.0.0</a:t>
+            </a:r>
+            <a:endParaRPr lang="en-US" baseline="-25000" dirty="0">
+              <a:latin typeface="Helvetica"/>
+              <a:cs typeface="Helvetica"/>
+            </a:endParaRPr>
+          </a:p>
+        </p:txBody>
+      </p:sp>
+      <p:sp>
+        <p:nvSpPr>
+          <p:cNvPr id="22" name="TextBox 21"/>
+          <p:cNvSpPr txBox="1"/>
+          <p:nvPr/>
+        </p:nvSpPr>
+        <p:spPr>
+          <a:xfrm>
+            <a:off x="7289854" y="4449684"/>
+            <a:ext cx="1147332" cy="369332"/>
+          </a:xfrm>
+          <a:prstGeom prst="rect">
+            <a:avLst/>
+          </a:prstGeom>
+          <a:noFill/>
+        </p:spPr>
+        <p:txBody>
+          <a:bodyPr wrap="none" rtlCol="0">
+            <a:spAutoFit/>
+          </a:bodyPr>
+          <a:lstStyle/>
+          <a:p>
+            <a:r>
+              <a:rPr lang="en-US" dirty="0" smtClean="0">
+                <a:latin typeface="Helvetica"/>
+                <a:cs typeface="Helvetica"/>
+              </a:rPr>
+              <a:t>256.0.0.0</a:t>
+            </a:r>
+            <a:endParaRPr lang="en-US" baseline="-25000" dirty="0">
+              <a:latin typeface="Helvetica"/>
+              <a:cs typeface="Helvetica"/>
+            </a:endParaRPr>
+          </a:p>
+        </p:txBody>
+      </p:sp>
+      <p:cxnSp>
+        <p:nvCxnSpPr>
+          <p:cNvPr id="23" name="Straight Connector 22"/>
+          <p:cNvCxnSpPr/>
+          <p:nvPr/>
+        </p:nvCxnSpPr>
+        <p:spPr>
+          <a:xfrm>
+            <a:off x="1053512" y="2904723"/>
+            <a:ext cx="5595" cy="1189801"/>
+          </a:xfrm>
+          <a:prstGeom prst="line">
+            <a:avLst/>
+          </a:prstGeom>
+          <a:ln w="28575" cmpd="sng">
+            <a:prstDash val="sysDash"/>
+          </a:ln>
+          <a:effectLst/>
+        </p:spPr>
+        <p:style>
+          <a:lnRef idx="3">
+            <a:schemeClr val="dk1"/>
+          </a:lnRef>
+          <a:fillRef idx="0">
+            <a:schemeClr val="dk1"/>
+          </a:fillRef>
+          <a:effectRef idx="2">
+            <a:schemeClr val="dk1"/>
+          </a:effectRef>
+          <a:fontRef idx="minor">
+            <a:schemeClr val="tx1"/>
+          </a:fontRef>
+        </p:style>
+      </p:cxnSp>
+      <p:cxnSp>
+        <p:nvCxnSpPr>
+          <p:cNvPr id="65" name="Straight Connector 64"/>
+          <p:cNvCxnSpPr/>
+          <p:nvPr/>
+        </p:nvCxnSpPr>
+        <p:spPr>
+          <a:xfrm>
+            <a:off x="1057235" y="4276614"/>
+            <a:ext cx="6747084" cy="0"/>
+          </a:xfrm>
+          <a:prstGeom prst="line">
+            <a:avLst/>
+          </a:prstGeom>
+          <a:effectLst/>
+        </p:spPr>
+        <p:style>
+          <a:lnRef idx="3">
+            <a:schemeClr val="dk1"/>
+          </a:lnRef>
+          <a:fillRef idx="0">
+            <a:schemeClr val="dk1"/>
+          </a:fillRef>
+          <a:effectRef idx="2">
+            <a:schemeClr val="dk1"/>
+          </a:effectRef>
+          <a:fontRef idx="minor">
+            <a:schemeClr val="tx1"/>
+          </a:fontRef>
+        </p:style>
+      </p:cxnSp>
+      <p:cxnSp>
+        <p:nvCxnSpPr>
+          <p:cNvPr id="66" name="Straight Connector 65"/>
+          <p:cNvCxnSpPr/>
+          <p:nvPr/>
+        </p:nvCxnSpPr>
+        <p:spPr>
+          <a:xfrm>
+            <a:off x="1046652" y="4129884"/>
+            <a:ext cx="0" cy="293459"/>
+          </a:xfrm>
+          <a:prstGeom prst="line">
+            <a:avLst/>
+          </a:prstGeom>
+          <a:effectLst/>
+        </p:spPr>
+        <p:style>
+          <a:lnRef idx="3">
+            <a:schemeClr val="dk1"/>
+          </a:lnRef>
+          <a:fillRef idx="0">
+            <a:schemeClr val="dk1"/>
+          </a:fillRef>
+          <a:effectRef idx="2">
+            <a:schemeClr val="dk1"/>
+          </a:effectRef>
+          <a:fontRef idx="minor">
+            <a:schemeClr val="tx1"/>
+          </a:fontRef>
+        </p:style>
+      </p:cxnSp>
+      <p:cxnSp>
+        <p:nvCxnSpPr>
+          <p:cNvPr id="67" name="Straight Connector 66"/>
+          <p:cNvCxnSpPr/>
+          <p:nvPr/>
+        </p:nvCxnSpPr>
+        <p:spPr>
+          <a:xfrm>
+            <a:off x="3327818" y="3432358"/>
+            <a:ext cx="0" cy="738410"/>
+          </a:xfrm>
+          <a:prstGeom prst="line">
+            <a:avLst/>
+          </a:prstGeom>
+          <a:ln w="28575" cmpd="sng">
+            <a:solidFill>
+              <a:srgbClr val="0C30FA"/>
+            </a:solidFill>
+            <a:prstDash val="sysDash"/>
+          </a:ln>
+          <a:effectLst/>
+        </p:spPr>
+        <p:style>
+          <a:lnRef idx="3">
+            <a:schemeClr val="dk1"/>
+          </a:lnRef>
+          <a:fillRef idx="0">
+            <a:schemeClr val="dk1"/>
+          </a:fillRef>
+          <a:effectRef idx="2">
+            <a:schemeClr val="dk1"/>
+          </a:effectRef>
+          <a:fontRef idx="minor">
+            <a:schemeClr val="tx1"/>
+          </a:fontRef>
+        </p:style>
+      </p:cxnSp>
+      <p:cxnSp>
+        <p:nvCxnSpPr>
+          <p:cNvPr id="68" name="Straight Connector 67"/>
+          <p:cNvCxnSpPr/>
+          <p:nvPr/>
+        </p:nvCxnSpPr>
+        <p:spPr>
+          <a:xfrm>
+            <a:off x="4795120" y="3697365"/>
+            <a:ext cx="0" cy="496025"/>
+          </a:xfrm>
+          <a:prstGeom prst="line">
+            <a:avLst/>
+          </a:prstGeom>
+          <a:ln w="28575" cmpd="sng">
+            <a:solidFill>
+              <a:srgbClr val="00B050"/>
+            </a:solidFill>
+            <a:prstDash val="sysDash"/>
+          </a:ln>
+          <a:effectLst/>
+        </p:spPr>
+        <p:style>
+          <a:lnRef idx="3">
+            <a:schemeClr val="dk1"/>
+          </a:lnRef>
+          <a:fillRef idx="0">
+            <a:schemeClr val="dk1"/>
+          </a:fillRef>
+          <a:effectRef idx="2">
+            <a:schemeClr val="dk1"/>
+          </a:effectRef>
+          <a:fontRef idx="minor">
+            <a:schemeClr val="tx1"/>
+          </a:fontRef>
+        </p:style>
+      </p:cxnSp>
+      <p:cxnSp>
+        <p:nvCxnSpPr>
+          <p:cNvPr id="70" name="Straight Connector 69"/>
+          <p:cNvCxnSpPr/>
+          <p:nvPr/>
+        </p:nvCxnSpPr>
+        <p:spPr>
+          <a:xfrm>
+            <a:off x="6473466" y="3755127"/>
+            <a:ext cx="0" cy="396696"/>
+          </a:xfrm>
+          <a:prstGeom prst="line">
+            <a:avLst/>
+          </a:prstGeom>
+          <a:ln w="28575" cmpd="sng">
+            <a:solidFill>
+              <a:srgbClr val="00B050"/>
+            </a:solidFill>
+            <a:prstDash val="sysDash"/>
+          </a:ln>
+          <a:effectLst/>
+        </p:spPr>
+        <p:style>
+          <a:lnRef idx="3">
+            <a:schemeClr val="dk1"/>
+          </a:lnRef>
+          <a:fillRef idx="0">
+            <a:schemeClr val="dk1"/>
+          </a:fillRef>
+          <a:effectRef idx="2">
+            <a:schemeClr val="dk1"/>
+          </a:effectRef>
+          <a:fontRef idx="minor">
+            <a:schemeClr val="tx1"/>
+          </a:fontRef>
+        </p:style>
+      </p:cxnSp>
+      <p:cxnSp>
+        <p:nvCxnSpPr>
+          <p:cNvPr id="71" name="Straight Connector 70"/>
+          <p:cNvCxnSpPr/>
+          <p:nvPr/>
+        </p:nvCxnSpPr>
+        <p:spPr>
+          <a:xfrm>
+            <a:off x="7805694" y="2701168"/>
+            <a:ext cx="0" cy="1406462"/>
+          </a:xfrm>
+          <a:prstGeom prst="line">
+            <a:avLst/>
+          </a:prstGeom>
+          <a:ln w="28575" cmpd="sng">
+            <a:prstDash val="sysDash"/>
+          </a:ln>
+          <a:effectLst/>
+        </p:spPr>
+        <p:style>
+          <a:lnRef idx="3">
+            <a:schemeClr val="dk1"/>
+          </a:lnRef>
+          <a:fillRef idx="0">
+            <a:schemeClr val="dk1"/>
+          </a:fillRef>
+          <a:effectRef idx="2">
+            <a:schemeClr val="dk1"/>
+          </a:effectRef>
+          <a:fontRef idx="minor">
+            <a:schemeClr val="tx1"/>
+          </a:fontRef>
+        </p:style>
+      </p:cxnSp>
+      <p:cxnSp>
+        <p:nvCxnSpPr>
+          <p:cNvPr id="73" name="Straight Connector 72"/>
+          <p:cNvCxnSpPr/>
+          <p:nvPr/>
+        </p:nvCxnSpPr>
+        <p:spPr>
+          <a:xfrm>
+            <a:off x="3322838" y="4135554"/>
+            <a:ext cx="0" cy="293459"/>
+          </a:xfrm>
+          <a:prstGeom prst="line">
+            <a:avLst/>
+          </a:prstGeom>
+          <a:ln>
+            <a:solidFill>
+              <a:srgbClr val="0C30FA"/>
+            </a:solidFill>
+          </a:ln>
+          <a:effectLst/>
+        </p:spPr>
+        <p:style>
+          <a:lnRef idx="3">
+            <a:schemeClr val="dk1"/>
+          </a:lnRef>
+          <a:fillRef idx="0">
+            <a:schemeClr val="dk1"/>
+          </a:fillRef>
+          <a:effectRef idx="2">
+            <a:schemeClr val="dk1"/>
+          </a:effectRef>
+          <a:fontRef idx="minor">
+            <a:schemeClr val="tx1"/>
+          </a:fontRef>
+        </p:style>
+      </p:cxnSp>
+      <p:cxnSp>
+        <p:nvCxnSpPr>
+          <p:cNvPr id="74" name="Straight Connector 73"/>
+          <p:cNvCxnSpPr/>
+          <p:nvPr/>
+        </p:nvCxnSpPr>
+        <p:spPr>
+          <a:xfrm>
+            <a:off x="4795120" y="4124883"/>
+            <a:ext cx="0" cy="293459"/>
+          </a:xfrm>
+          <a:prstGeom prst="line">
+            <a:avLst/>
+          </a:prstGeom>
+          <a:ln>
+            <a:solidFill>
+              <a:srgbClr val="00B050"/>
+            </a:solidFill>
+          </a:ln>
+          <a:effectLst/>
+        </p:spPr>
+        <p:style>
+          <a:lnRef idx="3">
+            <a:schemeClr val="dk1"/>
+          </a:lnRef>
+          <a:fillRef idx="0">
+            <a:schemeClr val="dk1"/>
+          </a:fillRef>
+          <a:effectRef idx="2">
+            <a:schemeClr val="dk1"/>
+          </a:effectRef>
+          <a:fontRef idx="minor">
+            <a:schemeClr val="tx1"/>
+          </a:fontRef>
+        </p:style>
+      </p:cxnSp>
+      <p:cxnSp>
+        <p:nvCxnSpPr>
+          <p:cNvPr id="75" name="Straight Connector 74"/>
+          <p:cNvCxnSpPr/>
+          <p:nvPr/>
+        </p:nvCxnSpPr>
+        <p:spPr>
+          <a:xfrm>
+            <a:off x="6473466" y="4124883"/>
+            <a:ext cx="0" cy="293459"/>
+          </a:xfrm>
+          <a:prstGeom prst="line">
+            <a:avLst/>
+          </a:prstGeom>
+          <a:ln>
+            <a:solidFill>
+              <a:srgbClr val="00B050"/>
+            </a:solidFill>
+          </a:ln>
+          <a:effectLst/>
+        </p:spPr>
+        <p:style>
+          <a:lnRef idx="3">
+            <a:schemeClr val="dk1"/>
+          </a:lnRef>
+          <a:fillRef idx="0">
+            <a:schemeClr val="dk1"/>
+          </a:fillRef>
+          <a:effectRef idx="2">
+            <a:schemeClr val="dk1"/>
+          </a:effectRef>
+          <a:fontRef idx="minor">
+            <a:schemeClr val="tx1"/>
+          </a:fontRef>
+        </p:style>
+      </p:cxnSp>
+      <p:cxnSp>
+        <p:nvCxnSpPr>
+          <p:cNvPr id="76" name="Straight Connector 75"/>
+          <p:cNvCxnSpPr/>
+          <p:nvPr/>
+        </p:nvCxnSpPr>
+        <p:spPr>
+          <a:xfrm>
+            <a:off x="7799339" y="4135554"/>
+            <a:ext cx="0" cy="293459"/>
+          </a:xfrm>
+          <a:prstGeom prst="line">
+            <a:avLst/>
+          </a:prstGeom>
+          <a:effectLst/>
+        </p:spPr>
+        <p:style>
+          <a:lnRef idx="3">
+            <a:schemeClr val="dk1"/>
+          </a:lnRef>
+          <a:fillRef idx="0">
+            <a:schemeClr val="dk1"/>
+          </a:fillRef>
+          <a:effectRef idx="2">
+            <a:schemeClr val="dk1"/>
+          </a:effectRef>
+          <a:fontRef idx="minor">
+            <a:schemeClr val="tx1"/>
+          </a:fontRef>
+        </p:style>
+      </p:cxnSp>
+      <p:cxnSp>
+        <p:nvCxnSpPr>
+          <p:cNvPr id="42" name="Straight Connector 41"/>
+          <p:cNvCxnSpPr/>
+          <p:nvPr/>
+        </p:nvCxnSpPr>
+        <p:spPr>
+          <a:xfrm>
+            <a:off x="5447914" y="3271685"/>
+            <a:ext cx="0" cy="900635"/>
+          </a:xfrm>
+          <a:prstGeom prst="line">
+            <a:avLst/>
+          </a:prstGeom>
+          <a:ln w="28575" cmpd="sng">
+            <a:solidFill>
+              <a:srgbClr val="0C30FA"/>
+            </a:solidFill>
+            <a:prstDash val="sysDash"/>
+          </a:ln>
+          <a:effectLst/>
+        </p:spPr>
+        <p:style>
+          <a:lnRef idx="3">
+            <a:schemeClr val="dk1"/>
+          </a:lnRef>
+          <a:fillRef idx="0">
+            <a:schemeClr val="dk1"/>
+          </a:fillRef>
+          <a:effectRef idx="2">
+            <a:schemeClr val="dk1"/>
+          </a:effectRef>
+          <a:fontRef idx="minor">
+            <a:schemeClr val="tx1"/>
+          </a:fontRef>
+        </p:style>
+      </p:cxnSp>
+      <p:cxnSp>
+        <p:nvCxnSpPr>
+          <p:cNvPr id="44" name="Straight Connector 43"/>
+          <p:cNvCxnSpPr/>
+          <p:nvPr/>
+        </p:nvCxnSpPr>
+        <p:spPr>
+          <a:xfrm>
+            <a:off x="5447914" y="4135554"/>
+            <a:ext cx="0" cy="293459"/>
+          </a:xfrm>
+          <a:prstGeom prst="line">
+            <a:avLst/>
+          </a:prstGeom>
+          <a:ln>
+            <a:solidFill>
+              <a:srgbClr val="0C30FA"/>
+            </a:solidFill>
+          </a:ln>
+          <a:effectLst/>
+        </p:spPr>
+        <p:style>
+          <a:lnRef idx="3">
+            <a:schemeClr val="dk1"/>
+          </a:lnRef>
+          <a:fillRef idx="0">
+            <a:schemeClr val="dk1"/>
+          </a:fillRef>
+          <a:effectRef idx="2">
+            <a:schemeClr val="dk1"/>
+          </a:effectRef>
+          <a:fontRef idx="minor">
+            <a:schemeClr val="tx1"/>
+          </a:fontRef>
+        </p:style>
+      </p:cxnSp>
+      <p:grpSp>
+        <p:nvGrpSpPr>
+          <p:cNvPr id="6" name="Group 5"/>
+          <p:cNvGrpSpPr/>
+          <p:nvPr/>
+        </p:nvGrpSpPr>
+        <p:grpSpPr>
+          <a:xfrm>
+            <a:off x="3322838" y="2842981"/>
+            <a:ext cx="2125076" cy="552087"/>
+            <a:chOff x="3322838" y="4935551"/>
+            <a:chExt cx="2125076" cy="552087"/>
+          </a:xfrm>
+        </p:grpSpPr>
+        <p:cxnSp>
+          <p:nvCxnSpPr>
+            <p:cNvPr id="29" name="Straight Connector 28"/>
+            <p:cNvCxnSpPr/>
+            <p:nvPr/>
+          </p:nvCxnSpPr>
+          <p:spPr>
+            <a:xfrm>
+              <a:off x="3322838" y="5335931"/>
+              <a:ext cx="2120096" cy="4978"/>
+            </a:xfrm>
+            <a:prstGeom prst="line">
+              <a:avLst/>
+            </a:prstGeom>
+            <a:ln>
+              <a:solidFill>
+                <a:srgbClr val="0C30FA"/>
+              </a:solidFill>
+            </a:ln>
+            <a:effectLst/>
+          </p:spPr>
+          <p:style>
+            <a:lnRef idx="3">
+              <a:schemeClr val="dk1"/>
+            </a:lnRef>
+            <a:fillRef idx="0">
+              <a:schemeClr val="dk1"/>
+            </a:fillRef>
+            <a:effectRef idx="2">
+              <a:schemeClr val="dk1"/>
+            </a:effectRef>
+            <a:fontRef idx="minor">
+              <a:schemeClr val="tx1"/>
+            </a:fontRef>
+          </p:style>
+        </p:cxnSp>
+        <p:cxnSp>
+          <p:nvCxnSpPr>
+            <p:cNvPr id="32" name="Straight Connector 31"/>
+            <p:cNvCxnSpPr/>
+            <p:nvPr/>
+          </p:nvCxnSpPr>
+          <p:spPr>
+            <a:xfrm>
+              <a:off x="3322838" y="5188509"/>
+              <a:ext cx="0" cy="293459"/>
+            </a:xfrm>
+            <a:prstGeom prst="line">
+              <a:avLst/>
+            </a:prstGeom>
+            <a:ln>
+              <a:solidFill>
+                <a:srgbClr val="0C30FA"/>
+              </a:solidFill>
+            </a:ln>
+            <a:effectLst/>
+          </p:spPr>
+          <p:style>
+            <a:lnRef idx="3">
+              <a:schemeClr val="dk1"/>
+            </a:lnRef>
+            <a:fillRef idx="0">
+              <a:schemeClr val="dk1"/>
+            </a:fillRef>
+            <a:effectRef idx="2">
+              <a:schemeClr val="dk1"/>
+            </a:effectRef>
+            <a:fontRef idx="minor">
+              <a:schemeClr val="tx1"/>
+            </a:fontRef>
+          </p:style>
+        </p:cxnSp>
+        <p:cxnSp>
+          <p:nvCxnSpPr>
+            <p:cNvPr id="34" name="Straight Connector 33"/>
+            <p:cNvCxnSpPr/>
+            <p:nvPr/>
+          </p:nvCxnSpPr>
+          <p:spPr>
+            <a:xfrm>
+              <a:off x="5447914" y="5194179"/>
+              <a:ext cx="0" cy="293459"/>
+            </a:xfrm>
+            <a:prstGeom prst="line">
+              <a:avLst/>
+            </a:prstGeom>
+            <a:ln>
+              <a:solidFill>
+                <a:srgbClr val="0C30FA"/>
+              </a:solidFill>
+            </a:ln>
+            <a:effectLst/>
+          </p:spPr>
+          <p:style>
+            <a:lnRef idx="3">
+              <a:schemeClr val="dk1"/>
+            </a:lnRef>
+            <a:fillRef idx="0">
+              <a:schemeClr val="dk1"/>
+            </a:fillRef>
+            <a:effectRef idx="2">
+              <a:schemeClr val="dk1"/>
+            </a:effectRef>
+            <a:fontRef idx="minor">
+              <a:schemeClr val="tx1"/>
+            </a:fontRef>
+          </p:style>
+        </p:cxnSp>
+        <p:sp>
+          <p:nvSpPr>
+            <p:cNvPr id="56" name="TextBox 55"/>
+            <p:cNvSpPr txBox="1"/>
+            <p:nvPr/>
+          </p:nvSpPr>
+          <p:spPr>
+            <a:xfrm>
+              <a:off x="4112825" y="4935551"/>
+              <a:ext cx="423514" cy="369332"/>
+            </a:xfrm>
+            <a:prstGeom prst="rect">
+              <a:avLst/>
+            </a:prstGeom>
+            <a:noFill/>
+          </p:spPr>
+          <p:txBody>
+            <a:bodyPr wrap="none" rtlCol="0">
+              <a:spAutoFit/>
+            </a:bodyPr>
+            <a:lstStyle/>
+            <a:p>
+              <a:r>
+                <a:rPr lang="en-US" b="1" dirty="0" smtClean="0">
+                  <a:solidFill>
+                    <a:srgbClr val="0C30FA"/>
+                  </a:solidFill>
+                  <a:latin typeface="Helvetica"/>
+                  <a:cs typeface="Helvetica"/>
+                </a:rPr>
+                <a:t>P</a:t>
+              </a:r>
+              <a:r>
+                <a:rPr lang="en-US" b="1" baseline="-25000" dirty="0" smtClean="0">
+                  <a:solidFill>
+                    <a:srgbClr val="0C30FA"/>
+                  </a:solidFill>
+                  <a:latin typeface="Helvetica"/>
+                  <a:cs typeface="Helvetica"/>
+                </a:rPr>
+                <a:t>1</a:t>
+              </a:r>
+              <a:endParaRPr lang="en-US" b="1" baseline="-25000" dirty="0">
+                <a:solidFill>
+                  <a:srgbClr val="0C30FA"/>
+                </a:solidFill>
+                <a:latin typeface="Helvetica"/>
+                <a:cs typeface="Helvetica"/>
+              </a:endParaRPr>
+            </a:p>
+          </p:txBody>
+        </p:sp>
+      </p:grpSp>
+      <p:sp>
+        <p:nvSpPr>
+          <p:cNvPr id="57" name="TextBox 56"/>
+          <p:cNvSpPr txBox="1"/>
+          <p:nvPr/>
+        </p:nvSpPr>
+        <p:spPr>
+          <a:xfrm>
+            <a:off x="3953942" y="4298566"/>
+            <a:ext cx="394447" cy="369332"/>
           </a:xfrm>
           <a:prstGeom prst="rect">
             <a:avLst/>
@@ -8542,75 +9519,80 @@
           <a:lstStyle/>
           <a:p>
             <a:r>
-              <a:rPr lang="en-US" dirty="0" smtClean="0">
+              <a:rPr lang="en-US" b="1" dirty="0" smtClean="0">
                 <a:solidFill>
-                  <a:schemeClr val="tx2">
-                    <a:lumMod val="60000"/>
-                    <a:lumOff val="40000"/>
-                  </a:schemeClr>
+                  <a:srgbClr val="FF0000"/>
                 </a:solidFill>
                 <a:latin typeface="Helvetica"/>
                 <a:cs typeface="Helvetica"/>
               </a:rPr>
-              <a:t>R</a:t>
-            </a:r>
-            <a:r>
-              <a:rPr lang="en-US" baseline="-25000" dirty="0" smtClean="0">
+              <a:t>I</a:t>
+            </a:r>
+            <a:r>
+              <a:rPr lang="en-US" b="1" baseline="-25000" dirty="0" smtClean="0">
                 <a:solidFill>
-                  <a:schemeClr val="tx2">
-                    <a:lumMod val="60000"/>
-                    <a:lumOff val="40000"/>
-                  </a:schemeClr>
+                  <a:srgbClr val="FF0000"/>
                 </a:solidFill>
                 <a:latin typeface="Helvetica"/>
                 <a:cs typeface="Helvetica"/>
               </a:rPr>
-              <a:t>0</a:t>
-            </a:r>
-            <a:endParaRPr lang="en-US" dirty="0">
+              <a:t>1</a:t>
+            </a:r>
+            <a:endParaRPr lang="en-US" b="1" baseline="-25000" dirty="0">
               <a:solidFill>
-                <a:schemeClr val="tx2">
-                  <a:lumMod val="60000"/>
-                  <a:lumOff val="40000"/>
-                </a:schemeClr>
+                <a:srgbClr val="FF0000"/>
               </a:solidFill>
               <a:latin typeface="Helvetica"/>
               <a:cs typeface="Helvetica"/>
             </a:endParaRPr>
           </a:p>
-          <a:p>
-            <a:r>
-              <a:rPr lang="en-US" dirty="0" smtClean="0">
+        </p:txBody>
+      </p:sp>
+      <p:sp>
+        <p:nvSpPr>
+          <p:cNvPr id="58" name="TextBox 57"/>
+          <p:cNvSpPr txBox="1"/>
+          <p:nvPr/>
+        </p:nvSpPr>
+        <p:spPr>
+          <a:xfrm>
+            <a:off x="4972127" y="4302308"/>
+            <a:ext cx="488436" cy="369332"/>
+          </a:xfrm>
+          <a:prstGeom prst="rect">
+            <a:avLst/>
+          </a:prstGeom>
+          <a:noFill/>
+        </p:spPr>
+        <p:txBody>
+          <a:bodyPr wrap="square" rtlCol="0">
+            <a:spAutoFit/>
+          </a:bodyPr>
+          <a:lstStyle/>
+          <a:p>
+            <a:r>
+              <a:rPr lang="en-US" b="1" dirty="0" smtClean="0">
                 <a:solidFill>
-                  <a:schemeClr val="tx2">
-                    <a:lumMod val="60000"/>
-                    <a:lumOff val="40000"/>
-                  </a:schemeClr>
+                  <a:srgbClr val="FF0000"/>
                 </a:solidFill>
                 <a:latin typeface="Helvetica"/>
                 <a:cs typeface="Helvetica"/>
               </a:rPr>
-              <a:t>R</a:t>
-            </a:r>
-            <a:r>
-              <a:rPr lang="en-US" baseline="-25000" dirty="0">
+              <a:t>I</a:t>
+            </a:r>
+            <a:r>
+              <a:rPr lang="en-US" b="1" baseline="-25000" dirty="0" smtClean="0">
                 <a:solidFill>
-                  <a:schemeClr val="tx2">
-                    <a:lumMod val="60000"/>
-                    <a:lumOff val="40000"/>
-                  </a:schemeClr>
+                  <a:srgbClr val="FF0000"/>
                 </a:solidFill>
                 <a:latin typeface="Helvetica"/>
                 <a:cs typeface="Helvetica"/>
               </a:rPr>
               <a:t>2</a:t>
             </a:r>
-            <a:endParaRPr lang="en-US" dirty="0" smtClean="0">
+            <a:endParaRPr lang="en-US" b="1" dirty="0" smtClean="0">
               <a:solidFill>
-                <a:schemeClr val="tx2">
-                  <a:lumMod val="60000"/>
-                  <a:lumOff val="40000"/>
-                </a:schemeClr>
+                <a:srgbClr val="FF0000"/>
               </a:solidFill>
               <a:latin typeface="Helvetica"/>
               <a:cs typeface="Helvetica"/>
@@ -8620,14 +9602,14 @@
       </p:sp>
       <p:sp>
         <p:nvSpPr>
-          <p:cNvPr id="117" name="TextBox 116"/>
+          <p:cNvPr id="59" name="TextBox 58"/>
           <p:cNvSpPr txBox="1"/>
           <p:nvPr/>
         </p:nvSpPr>
         <p:spPr>
           <a:xfrm>
-            <a:off x="4326032" y="3703735"/>
-            <a:ext cx="436951" cy="369332"/>
+            <a:off x="5819756" y="4311503"/>
+            <a:ext cx="488436" cy="369332"/>
           </a:xfrm>
           <a:prstGeom prst="rect">
             <a:avLst/>
@@ -8635,43 +9617,34 @@
           <a:noFill/>
         </p:spPr>
         <p:txBody>
-          <a:bodyPr wrap="none" rtlCol="0">
+          <a:bodyPr wrap="square" rtlCol="0">
             <a:spAutoFit/>
           </a:bodyPr>
           <a:lstStyle/>
           <a:p>
             <a:r>
-              <a:rPr lang="en-US" dirty="0" smtClean="0">
+              <a:rPr lang="en-US" b="1" dirty="0" smtClean="0">
                 <a:solidFill>
-                  <a:schemeClr val="tx2">
-                    <a:lumMod val="60000"/>
-                    <a:lumOff val="40000"/>
-                  </a:schemeClr>
+                  <a:srgbClr val="FF0000"/>
                 </a:solidFill>
                 <a:latin typeface="Helvetica"/>
                 <a:cs typeface="Helvetica"/>
               </a:rPr>
-              <a:t>R</a:t>
-            </a:r>
-            <a:r>
-              <a:rPr lang="en-US" baseline="-25000" dirty="0" smtClean="0">
+              <a:t>I</a:t>
+            </a:r>
+            <a:r>
+              <a:rPr lang="en-US" b="1" baseline="-25000" dirty="0" smtClean="0">
                 <a:solidFill>
-                  <a:schemeClr val="tx2">
-                    <a:lumMod val="60000"/>
-                    <a:lumOff val="40000"/>
-                  </a:schemeClr>
+                  <a:srgbClr val="FF0000"/>
                 </a:solidFill>
                 <a:latin typeface="Helvetica"/>
                 <a:cs typeface="Helvetica"/>
               </a:rPr>
-              <a:t>0</a:t>
-            </a:r>
-            <a:endParaRPr lang="en-US" baseline="-25000" dirty="0">
+              <a:t>3</a:t>
+            </a:r>
+            <a:endParaRPr lang="en-US" b="1" dirty="0" smtClean="0">
               <a:solidFill>
-                <a:schemeClr val="tx2">
-                  <a:lumMod val="60000"/>
-                  <a:lumOff val="40000"/>
-                </a:schemeClr>
+                <a:srgbClr val="FF0000"/>
               </a:solidFill>
               <a:latin typeface="Helvetica"/>
               <a:cs typeface="Helvetica"/>
@@ -8679,10 +9652,512 @@
           </a:p>
         </p:txBody>
       </p:sp>
+      <p:sp>
+        <p:nvSpPr>
+          <p:cNvPr id="60" name="TextBox 59"/>
+          <p:cNvSpPr txBox="1"/>
+          <p:nvPr/>
+        </p:nvSpPr>
+        <p:spPr>
+          <a:xfrm>
+            <a:off x="6983241" y="4308249"/>
+            <a:ext cx="333746" cy="369332"/>
+          </a:xfrm>
+          <a:prstGeom prst="rect">
+            <a:avLst/>
+          </a:prstGeom>
+          <a:noFill/>
+        </p:spPr>
+        <p:txBody>
+          <a:bodyPr wrap="none" rtlCol="0">
+            <a:spAutoFit/>
+          </a:bodyPr>
+          <a:lstStyle/>
+          <a:p>
+            <a:r>
+              <a:rPr lang="en-US" b="1" dirty="0" smtClean="0">
+                <a:solidFill>
+                  <a:srgbClr val="FF0000"/>
+                </a:solidFill>
+                <a:latin typeface="Helvetica"/>
+                <a:cs typeface="Helvetica"/>
+              </a:rPr>
+              <a:t>I</a:t>
+            </a:r>
+            <a:r>
+              <a:rPr lang="en-US" b="1" baseline="-25000" dirty="0">
+                <a:solidFill>
+                  <a:srgbClr val="FF0000"/>
+                </a:solidFill>
+                <a:latin typeface="Helvetica"/>
+                <a:cs typeface="Helvetica"/>
+              </a:rPr>
+              <a:t>4</a:t>
+            </a:r>
+            <a:endParaRPr lang="en-US" b="1" baseline="-25000" dirty="0">
+              <a:solidFill>
+                <a:srgbClr val="FF0000"/>
+              </a:solidFill>
+              <a:latin typeface="Helvetica"/>
+              <a:cs typeface="Helvetica"/>
+            </a:endParaRPr>
+          </a:p>
+        </p:txBody>
+      </p:sp>
+      <p:sp>
+        <p:nvSpPr>
+          <p:cNvPr id="78" name="TextBox 77"/>
+          <p:cNvSpPr txBox="1"/>
+          <p:nvPr/>
+        </p:nvSpPr>
+        <p:spPr>
+          <a:xfrm>
+            <a:off x="1942317" y="4313986"/>
+            <a:ext cx="333746" cy="369332"/>
+          </a:xfrm>
+          <a:prstGeom prst="rect">
+            <a:avLst/>
+          </a:prstGeom>
+          <a:noFill/>
+        </p:spPr>
+        <p:txBody>
+          <a:bodyPr wrap="none" rtlCol="0">
+            <a:spAutoFit/>
+          </a:bodyPr>
+          <a:lstStyle/>
+          <a:p>
+            <a:r>
+              <a:rPr lang="en-US" b="1" dirty="0" smtClean="0">
+                <a:solidFill>
+                  <a:srgbClr val="FF0000"/>
+                </a:solidFill>
+                <a:latin typeface="Helvetica"/>
+                <a:cs typeface="Helvetica"/>
+              </a:rPr>
+              <a:t>I</a:t>
+            </a:r>
+            <a:r>
+              <a:rPr lang="en-US" b="1" baseline="-25000" dirty="0" smtClean="0">
+                <a:solidFill>
+                  <a:srgbClr val="FF0000"/>
+                </a:solidFill>
+                <a:latin typeface="Helvetica"/>
+                <a:cs typeface="Helvetica"/>
+              </a:rPr>
+              <a:t>0</a:t>
+            </a:r>
+            <a:endParaRPr lang="en-US" b="1" baseline="-25000" dirty="0">
+              <a:solidFill>
+                <a:srgbClr val="FF0000"/>
+              </a:solidFill>
+              <a:latin typeface="Helvetica"/>
+              <a:cs typeface="Helvetica"/>
+            </a:endParaRPr>
+          </a:p>
+        </p:txBody>
+      </p:sp>
+      <p:grpSp>
+        <p:nvGrpSpPr>
+          <p:cNvPr id="11" name="Group 10"/>
+          <p:cNvGrpSpPr/>
+          <p:nvPr/>
+        </p:nvGrpSpPr>
+        <p:grpSpPr>
+          <a:xfrm>
+            <a:off x="1057235" y="2382889"/>
+            <a:ext cx="6753439" cy="549119"/>
+            <a:chOff x="1057235" y="2224624"/>
+            <a:chExt cx="6753439" cy="549119"/>
+          </a:xfrm>
+        </p:grpSpPr>
+        <p:cxnSp>
+          <p:nvCxnSpPr>
+            <p:cNvPr id="5" name="Straight Connector 4"/>
+            <p:cNvCxnSpPr/>
+            <p:nvPr/>
+          </p:nvCxnSpPr>
+          <p:spPr>
+            <a:xfrm>
+              <a:off x="1065321" y="2621343"/>
+              <a:ext cx="6740373" cy="693"/>
+            </a:xfrm>
+            <a:prstGeom prst="line">
+              <a:avLst/>
+            </a:prstGeom>
+            <a:effectLst/>
+          </p:spPr>
+          <p:style>
+            <a:lnRef idx="3">
+              <a:schemeClr val="dk1"/>
+            </a:lnRef>
+            <a:fillRef idx="0">
+              <a:schemeClr val="dk1"/>
+            </a:fillRef>
+            <a:effectRef idx="2">
+              <a:schemeClr val="dk1"/>
+            </a:effectRef>
+            <a:fontRef idx="minor">
+              <a:schemeClr val="tx1"/>
+            </a:fontRef>
+          </p:style>
+        </p:cxnSp>
+        <p:cxnSp>
+          <p:nvCxnSpPr>
+            <p:cNvPr id="7" name="Straight Connector 6"/>
+            <p:cNvCxnSpPr/>
+            <p:nvPr/>
+          </p:nvCxnSpPr>
+          <p:spPr>
+            <a:xfrm>
+              <a:off x="7810674" y="2474614"/>
+              <a:ext cx="0" cy="293459"/>
+            </a:xfrm>
+            <a:prstGeom prst="line">
+              <a:avLst/>
+            </a:prstGeom>
+            <a:effectLst/>
+          </p:spPr>
+          <p:style>
+            <a:lnRef idx="3">
+              <a:schemeClr val="dk1"/>
+            </a:lnRef>
+            <a:fillRef idx="0">
+              <a:schemeClr val="dk1"/>
+            </a:fillRef>
+            <a:effectRef idx="2">
+              <a:schemeClr val="dk1"/>
+            </a:effectRef>
+            <a:fontRef idx="minor">
+              <a:schemeClr val="tx1"/>
+            </a:fontRef>
+          </p:style>
+        </p:cxnSp>
+        <p:cxnSp>
+          <p:nvCxnSpPr>
+            <p:cNvPr id="9" name="Straight Connector 8"/>
+            <p:cNvCxnSpPr/>
+            <p:nvPr/>
+          </p:nvCxnSpPr>
+          <p:spPr>
+            <a:xfrm>
+              <a:off x="1057235" y="2480284"/>
+              <a:ext cx="0" cy="293459"/>
+            </a:xfrm>
+            <a:prstGeom prst="line">
+              <a:avLst/>
+            </a:prstGeom>
+            <a:effectLst/>
+          </p:spPr>
+          <p:style>
+            <a:lnRef idx="3">
+              <a:schemeClr val="dk1"/>
+            </a:lnRef>
+            <a:fillRef idx="0">
+              <a:schemeClr val="dk1"/>
+            </a:fillRef>
+            <a:effectRef idx="2">
+              <a:schemeClr val="dk1"/>
+            </a:effectRef>
+            <a:fontRef idx="minor">
+              <a:schemeClr val="tx1"/>
+            </a:fontRef>
+          </p:style>
+        </p:cxnSp>
+        <p:sp>
+          <p:nvSpPr>
+            <p:cNvPr id="79" name="TextBox 78"/>
+            <p:cNvSpPr txBox="1"/>
+            <p:nvPr/>
+          </p:nvSpPr>
+          <p:spPr>
+            <a:xfrm>
+              <a:off x="4326032" y="2224624"/>
+              <a:ext cx="423514" cy="369332"/>
+            </a:xfrm>
+            <a:prstGeom prst="rect">
+              <a:avLst/>
+            </a:prstGeom>
+            <a:noFill/>
+          </p:spPr>
+          <p:txBody>
+            <a:bodyPr wrap="none" rtlCol="0">
+              <a:spAutoFit/>
+            </a:bodyPr>
+            <a:lstStyle/>
+            <a:p>
+              <a:r>
+                <a:rPr lang="en-US" b="1" dirty="0" smtClean="0">
+                  <a:latin typeface="Helvetica"/>
+                  <a:cs typeface="Helvetica"/>
+                </a:rPr>
+                <a:t>P</a:t>
+              </a:r>
+              <a:r>
+                <a:rPr lang="en-US" b="1" baseline="-25000" dirty="0">
+                  <a:latin typeface="Helvetica"/>
+                  <a:cs typeface="Helvetica"/>
+                </a:rPr>
+                <a:t>0</a:t>
+              </a:r>
+              <a:endParaRPr lang="en-US" b="1" baseline="-25000" dirty="0">
+                <a:latin typeface="Helvetica"/>
+                <a:cs typeface="Helvetica"/>
+              </a:endParaRPr>
+            </a:p>
+          </p:txBody>
+        </p:sp>
+      </p:grpSp>
+      <p:grpSp>
+        <p:nvGrpSpPr>
+          <p:cNvPr id="8" name="Group 7"/>
+          <p:cNvGrpSpPr/>
+          <p:nvPr/>
+        </p:nvGrpSpPr>
+        <p:grpSpPr>
+          <a:xfrm>
+            <a:off x="4784537" y="3152395"/>
+            <a:ext cx="1688929" cy="562396"/>
+            <a:chOff x="4784537" y="4436076"/>
+            <a:chExt cx="1688929" cy="562396"/>
+          </a:xfrm>
+        </p:grpSpPr>
+        <p:cxnSp>
+          <p:nvCxnSpPr>
+            <p:cNvPr id="46" name="Straight Connector 45"/>
+            <p:cNvCxnSpPr/>
+            <p:nvPr/>
+          </p:nvCxnSpPr>
+          <p:spPr>
+            <a:xfrm>
+              <a:off x="4784537" y="4820039"/>
+              <a:ext cx="1680331" cy="4978"/>
+            </a:xfrm>
+            <a:prstGeom prst="line">
+              <a:avLst/>
+            </a:prstGeom>
+            <a:ln>
+              <a:solidFill>
+                <a:srgbClr val="00B050"/>
+              </a:solidFill>
+            </a:ln>
+            <a:effectLst/>
+          </p:spPr>
+          <p:style>
+            <a:lnRef idx="3">
+              <a:schemeClr val="dk1"/>
+            </a:lnRef>
+            <a:fillRef idx="0">
+              <a:schemeClr val="dk1"/>
+            </a:fillRef>
+            <a:effectRef idx="2">
+              <a:schemeClr val="dk1"/>
+            </a:effectRef>
+            <a:fontRef idx="minor">
+              <a:schemeClr val="tx1"/>
+            </a:fontRef>
+          </p:style>
+        </p:cxnSp>
+        <p:cxnSp>
+          <p:nvCxnSpPr>
+            <p:cNvPr id="50" name="Straight Connector 49"/>
+            <p:cNvCxnSpPr/>
+            <p:nvPr/>
+          </p:nvCxnSpPr>
+          <p:spPr>
+            <a:xfrm>
+              <a:off x="4793134" y="4705013"/>
+              <a:ext cx="0" cy="293459"/>
+            </a:xfrm>
+            <a:prstGeom prst="line">
+              <a:avLst/>
+            </a:prstGeom>
+            <a:ln>
+              <a:solidFill>
+                <a:srgbClr val="00B050"/>
+              </a:solidFill>
+            </a:ln>
+            <a:effectLst/>
+          </p:spPr>
+          <p:style>
+            <a:lnRef idx="3">
+              <a:schemeClr val="dk1"/>
+            </a:lnRef>
+            <a:fillRef idx="0">
+              <a:schemeClr val="dk1"/>
+            </a:fillRef>
+            <a:effectRef idx="2">
+              <a:schemeClr val="dk1"/>
+            </a:effectRef>
+            <a:fontRef idx="minor">
+              <a:schemeClr val="tx1"/>
+            </a:fontRef>
+          </p:style>
+        </p:cxnSp>
+        <p:cxnSp>
+          <p:nvCxnSpPr>
+            <p:cNvPr id="52" name="Straight Connector 51"/>
+            <p:cNvCxnSpPr/>
+            <p:nvPr/>
+          </p:nvCxnSpPr>
+          <p:spPr>
+            <a:xfrm>
+              <a:off x="6473466" y="4688080"/>
+              <a:ext cx="0" cy="293459"/>
+            </a:xfrm>
+            <a:prstGeom prst="line">
+              <a:avLst/>
+            </a:prstGeom>
+            <a:ln>
+              <a:solidFill>
+                <a:srgbClr val="00B050"/>
+              </a:solidFill>
+            </a:ln>
+            <a:effectLst/>
+          </p:spPr>
+          <p:style>
+            <a:lnRef idx="3">
+              <a:schemeClr val="dk1"/>
+            </a:lnRef>
+            <a:fillRef idx="0">
+              <a:schemeClr val="dk1"/>
+            </a:fillRef>
+            <a:effectRef idx="2">
+              <a:schemeClr val="dk1"/>
+            </a:effectRef>
+            <a:fontRef idx="minor">
+              <a:schemeClr val="tx1"/>
+            </a:fontRef>
+          </p:style>
+        </p:cxnSp>
+        <p:sp>
+          <p:nvSpPr>
+            <p:cNvPr id="80" name="TextBox 79"/>
+            <p:cNvSpPr txBox="1"/>
+            <p:nvPr/>
+          </p:nvSpPr>
+          <p:spPr>
+            <a:xfrm>
+              <a:off x="5460797" y="4436076"/>
+              <a:ext cx="423514" cy="369332"/>
+            </a:xfrm>
+            <a:prstGeom prst="rect">
+              <a:avLst/>
+            </a:prstGeom>
+            <a:noFill/>
+          </p:spPr>
+          <p:txBody>
+            <a:bodyPr wrap="none" rtlCol="0">
+              <a:spAutoFit/>
+            </a:bodyPr>
+            <a:lstStyle/>
+            <a:p>
+              <a:r>
+                <a:rPr lang="en-US" b="1" dirty="0" smtClean="0">
+                  <a:solidFill>
+                    <a:srgbClr val="00B050"/>
+                  </a:solidFill>
+                  <a:latin typeface="Helvetica"/>
+                  <a:cs typeface="Helvetica"/>
+                </a:rPr>
+                <a:t>P</a:t>
+              </a:r>
+              <a:r>
+                <a:rPr lang="en-US" b="1" baseline="-25000" dirty="0">
+                  <a:solidFill>
+                    <a:srgbClr val="00B050"/>
+                  </a:solidFill>
+                  <a:latin typeface="Helvetica"/>
+                  <a:cs typeface="Helvetica"/>
+                </a:rPr>
+                <a:t>2</a:t>
+              </a:r>
+              <a:endParaRPr lang="en-US" b="1" baseline="-25000" dirty="0">
+                <a:solidFill>
+                  <a:srgbClr val="00B050"/>
+                </a:solidFill>
+                <a:latin typeface="Helvetica"/>
+                <a:cs typeface="Helvetica"/>
+              </a:endParaRPr>
+            </a:p>
+          </p:txBody>
+        </p:sp>
+      </p:grpSp>
+      <p:cxnSp>
+        <p:nvCxnSpPr>
+          <p:cNvPr id="86" name="Straight Connector 85"/>
+          <p:cNvCxnSpPr/>
+          <p:nvPr/>
+        </p:nvCxnSpPr>
+        <p:spPr>
+          <a:xfrm>
+            <a:off x="3313595" y="4222417"/>
+            <a:ext cx="2120096" cy="4978"/>
+          </a:xfrm>
+          <a:prstGeom prst="line">
+            <a:avLst/>
+          </a:prstGeom>
+          <a:ln>
+            <a:solidFill>
+              <a:srgbClr val="0C30FA"/>
+            </a:solidFill>
+          </a:ln>
+          <a:effectLst/>
+        </p:spPr>
+        <p:style>
+          <a:lnRef idx="3">
+            <a:schemeClr val="dk1"/>
+          </a:lnRef>
+          <a:fillRef idx="0">
+            <a:schemeClr val="dk1"/>
+          </a:fillRef>
+          <a:effectRef idx="2">
+            <a:schemeClr val="dk1"/>
+          </a:effectRef>
+          <a:fontRef idx="minor">
+            <a:schemeClr val="tx1"/>
+          </a:fontRef>
+        </p:style>
+      </p:cxnSp>
+      <p:cxnSp>
+        <p:nvCxnSpPr>
+          <p:cNvPr id="89" name="Straight Connector 88"/>
+          <p:cNvCxnSpPr/>
+          <p:nvPr/>
+        </p:nvCxnSpPr>
+        <p:spPr>
+          <a:xfrm>
+            <a:off x="4812408" y="4163818"/>
+            <a:ext cx="1652460" cy="6646"/>
+          </a:xfrm>
+          <a:prstGeom prst="line">
+            <a:avLst/>
+          </a:prstGeom>
+          <a:ln>
+            <a:solidFill>
+              <a:srgbClr val="00B050"/>
+            </a:solidFill>
+          </a:ln>
+          <a:effectLst/>
+        </p:spPr>
+        <p:style>
+          <a:lnRef idx="3">
+            <a:schemeClr val="dk1"/>
+          </a:lnRef>
+          <a:fillRef idx="0">
+            <a:schemeClr val="dk1"/>
+          </a:fillRef>
+          <a:effectRef idx="2">
+            <a:schemeClr val="dk1"/>
+          </a:effectRef>
+          <a:fontRef idx="minor">
+            <a:schemeClr val="tx1"/>
+          </a:fontRef>
+        </p:style>
+      </p:cxnSp>
     </p:spTree>
     <p:extLst>
       <p:ext uri="{BB962C8B-B14F-4D97-AF65-F5344CB8AC3E}">
-        <p14:creationId xmlns:p14="http://schemas.microsoft.com/office/powerpoint/2010/main" val="3558411130"/>
+        <p14:creationId xmlns:p14="http://schemas.microsoft.com/office/powerpoint/2010/main" val="549080539"/>
       </p:ext>
     </p:extLst>
   </p:cSld>

</xml_diff>

<commit_message>
revisions to prefix match; including figures and all moved to ipv6
</commit_message>
<xml_diff>
--- a/doc/cr/fig/rangeopts.pptx
+++ b/doc/cr/fig/rangeopts.pptx
@@ -210,7 +210,7 @@
           <a:p>
             <a:fld id="{A3BA0E75-03DD-AA41-809E-9EBE88800E47}" type="datetimeFigureOut">
               <a:rPr lang="en-US" smtClean="0"/>
-              <a:t>2/6/16</a:t>
+              <a:t>2/16/16</a:t>
             </a:fld>
             <a:endParaRPr lang="en-US"/>
           </a:p>
@@ -911,7 +911,7 @@
           <a:p>
             <a:fld id="{CD6DB08C-E64A-724A-8604-E954791B8CDC}" type="datetimeFigureOut">
               <a:rPr lang="en-US" smtClean="0"/>
-              <a:t>2/6/16</a:t>
+              <a:t>2/16/16</a:t>
             </a:fld>
             <a:endParaRPr lang="en-US"/>
           </a:p>
@@ -1081,7 +1081,7 @@
           <a:p>
             <a:fld id="{CD6DB08C-E64A-724A-8604-E954791B8CDC}" type="datetimeFigureOut">
               <a:rPr lang="en-US" smtClean="0"/>
-              <a:t>2/6/16</a:t>
+              <a:t>2/16/16</a:t>
             </a:fld>
             <a:endParaRPr lang="en-US"/>
           </a:p>
@@ -1261,7 +1261,7 @@
           <a:p>
             <a:fld id="{CD6DB08C-E64A-724A-8604-E954791B8CDC}" type="datetimeFigureOut">
               <a:rPr lang="en-US" smtClean="0"/>
-              <a:t>2/6/16</a:t>
+              <a:t>2/16/16</a:t>
             </a:fld>
             <a:endParaRPr lang="en-US"/>
           </a:p>
@@ -1431,7 +1431,7 @@
           <a:p>
             <a:fld id="{CD6DB08C-E64A-724A-8604-E954791B8CDC}" type="datetimeFigureOut">
               <a:rPr lang="en-US" smtClean="0"/>
-              <a:t>2/6/16</a:t>
+              <a:t>2/16/16</a:t>
             </a:fld>
             <a:endParaRPr lang="en-US"/>
           </a:p>
@@ -1677,7 +1677,7 @@
           <a:p>
             <a:fld id="{CD6DB08C-E64A-724A-8604-E954791B8CDC}" type="datetimeFigureOut">
               <a:rPr lang="en-US" smtClean="0"/>
-              <a:t>2/6/16</a:t>
+              <a:t>2/16/16</a:t>
             </a:fld>
             <a:endParaRPr lang="en-US"/>
           </a:p>
@@ -1965,7 +1965,7 @@
           <a:p>
             <a:fld id="{CD6DB08C-E64A-724A-8604-E954791B8CDC}" type="datetimeFigureOut">
               <a:rPr lang="en-US" smtClean="0"/>
-              <a:t>2/6/16</a:t>
+              <a:t>2/16/16</a:t>
             </a:fld>
             <a:endParaRPr lang="en-US"/>
           </a:p>
@@ -2387,7 +2387,7 @@
           <a:p>
             <a:fld id="{CD6DB08C-E64A-724A-8604-E954791B8CDC}" type="datetimeFigureOut">
               <a:rPr lang="en-US" smtClean="0"/>
-              <a:t>2/6/16</a:t>
+              <a:t>2/16/16</a:t>
             </a:fld>
             <a:endParaRPr lang="en-US"/>
           </a:p>
@@ -2505,7 +2505,7 @@
           <a:p>
             <a:fld id="{CD6DB08C-E64A-724A-8604-E954791B8CDC}" type="datetimeFigureOut">
               <a:rPr lang="en-US" smtClean="0"/>
-              <a:t>2/6/16</a:t>
+              <a:t>2/16/16</a:t>
             </a:fld>
             <a:endParaRPr lang="en-US"/>
           </a:p>
@@ -2600,7 +2600,7 @@
           <a:p>
             <a:fld id="{CD6DB08C-E64A-724A-8604-E954791B8CDC}" type="datetimeFigureOut">
               <a:rPr lang="en-US" smtClean="0"/>
-              <a:t>2/6/16</a:t>
+              <a:t>2/16/16</a:t>
             </a:fld>
             <a:endParaRPr lang="en-US"/>
           </a:p>
@@ -2877,7 +2877,7 @@
           <a:p>
             <a:fld id="{CD6DB08C-E64A-724A-8604-E954791B8CDC}" type="datetimeFigureOut">
               <a:rPr lang="en-US" smtClean="0"/>
-              <a:t>2/6/16</a:t>
+              <a:t>2/16/16</a:t>
             </a:fld>
             <a:endParaRPr lang="en-US"/>
           </a:p>
@@ -3130,7 +3130,7 @@
           <a:p>
             <a:fld id="{CD6DB08C-E64A-724A-8604-E954791B8CDC}" type="datetimeFigureOut">
               <a:rPr lang="en-US" smtClean="0"/>
-              <a:t>2/6/16</a:t>
+              <a:t>2/16/16</a:t>
             </a:fld>
             <a:endParaRPr lang="en-US"/>
           </a:p>
@@ -3343,7 +3343,7 @@
           <a:p>
             <a:fld id="{CD6DB08C-E64A-724A-8604-E954791B8CDC}" type="datetimeFigureOut">
               <a:rPr lang="en-US" smtClean="0"/>
-              <a:t>2/6/16</a:t>
+              <a:t>2/16/16</a:t>
             </a:fld>
             <a:endParaRPr lang="en-US"/>
           </a:p>
@@ -8805,7 +8805,7 @@
         <p:spPr>
           <a:xfrm>
             <a:off x="620033" y="4504559"/>
-            <a:ext cx="890576" cy="369332"/>
+            <a:ext cx="800219" cy="369332"/>
           </a:xfrm>
           <a:prstGeom prst="rect">
             <a:avLst/>
@@ -8819,11 +8819,18 @@
           <a:lstStyle/>
           <a:p>
             <a:r>
+              <a:rPr lang="en-US" smtClean="0">
+                <a:latin typeface="Helvetica"/>
+                <a:cs typeface="Helvetica"/>
+              </a:rPr>
+              <a:t>0:…:</a:t>
+            </a:r>
+            <a:r>
               <a:rPr lang="en-US" dirty="0" smtClean="0">
                 <a:latin typeface="Helvetica"/>
                 <a:cs typeface="Helvetica"/>
               </a:rPr>
-              <a:t>0.0.0.0</a:t>
+              <a:t>0</a:t>
             </a:r>
             <a:endParaRPr lang="en-US" baseline="-25000" dirty="0">
               <a:latin typeface="Helvetica"/>
@@ -8841,7 +8848,7 @@
         <p:spPr>
           <a:xfrm>
             <a:off x="7289854" y="4449684"/>
-            <a:ext cx="1147332" cy="369332"/>
+            <a:ext cx="994759" cy="369332"/>
           </a:xfrm>
           <a:prstGeom prst="rect">
             <a:avLst/>
@@ -8855,11 +8862,32 @@
           <a:lstStyle/>
           <a:p>
             <a:r>
+              <a:rPr lang="en-US" dirty="0" err="1">
+                <a:latin typeface="Helvetica"/>
+                <a:cs typeface="Helvetica"/>
+              </a:rPr>
+              <a:t>f</a:t>
+            </a:r>
+            <a:r>
+              <a:rPr lang="en-US" dirty="0" err="1" smtClean="0">
+                <a:latin typeface="Helvetica"/>
+                <a:cs typeface="Helvetica"/>
+              </a:rPr>
+              <a:t>fff</a:t>
+            </a:r>
+            <a:r>
               <a:rPr lang="en-US" dirty="0" smtClean="0">
                 <a:latin typeface="Helvetica"/>
                 <a:cs typeface="Helvetica"/>
               </a:rPr>
-              <a:t>256.0.0.0</a:t>
+              <a:t>:...:</a:t>
+            </a:r>
+            <a:r>
+              <a:rPr lang="en-US" dirty="0" err="1" smtClean="0">
+                <a:latin typeface="Helvetica"/>
+                <a:cs typeface="Helvetica"/>
+              </a:rPr>
+              <a:t>ffff</a:t>
             </a:r>
             <a:endParaRPr lang="en-US" baseline="-25000" dirty="0">
               <a:latin typeface="Helvetica"/>
@@ -9694,13 +9722,6 @@
               </a:rPr>
               <a:t>4</a:t>
             </a:r>
-            <a:endParaRPr lang="en-US" b="1" baseline="-25000" dirty="0">
-              <a:solidFill>
-                <a:srgbClr val="FF0000"/>
-              </a:solidFill>
-              <a:latin typeface="Helvetica"/>
-              <a:cs typeface="Helvetica"/>
-            </a:endParaRPr>
           </a:p>
         </p:txBody>
       </p:sp>
@@ -9899,10 +9920,6 @@
                 </a:rPr>
                 <a:t>0</a:t>
               </a:r>
-              <a:endParaRPr lang="en-US" b="1" baseline="-25000" dirty="0">
-                <a:latin typeface="Helvetica"/>
-                <a:cs typeface="Helvetica"/>
-              </a:endParaRPr>
             </a:p>
           </p:txBody>
         </p:sp>
@@ -10071,13 +10088,6 @@
                 </a:rPr>
                 <a:t>2</a:t>
               </a:r>
-              <a:endParaRPr lang="en-US" b="1" baseline="-25000" dirty="0">
-                <a:solidFill>
-                  <a:srgbClr val="00B050"/>
-                </a:solidFill>
-                <a:latin typeface="Helvetica"/>
-                <a:cs typeface="Helvetica"/>
-              </a:endParaRPr>
             </a:p>
           </p:txBody>
         </p:sp>

</xml_diff>